<commit_message>
update presentation with scenario presets
</commit_message>
<xml_diff>
--- a/presentation.pptx
+++ b/presentation.pptx
@@ -12,6 +12,10 @@
     <p:sldId id="260" r:id="rId6"/>
     <p:sldId id="262" r:id="rId7"/>
     <p:sldId id="261" r:id="rId8"/>
+    <p:sldId id="264" r:id="rId9"/>
+    <p:sldId id="266" r:id="rId10"/>
+    <p:sldId id="267" r:id="rId11"/>
+    <p:sldId id="269" r:id="rId12"/>
   </p:sldIdLst>
   <p:sldSz cx="12192000" cy="6858000"/>
   <p:notesSz cx="6858000" cy="9144000"/>
@@ -6250,7 +6254,7 @@
             <a:fld id="{B61BEF0D-F0BB-DE4B-95CE-6DB70DBA9567}" type="datetimeFigureOut">
               <a:rPr lang="en-US" dirty="0"/>
               <a:pPr/>
-              <a:t>5/14/2021</a:t>
+              <a:t>6/1/2021</a:t>
             </a:fld>
             <a:endParaRPr lang="en-US"/>
           </a:p>
@@ -6543,7 +6547,7 @@
             <a:fld id="{B61BEF0D-F0BB-DE4B-95CE-6DB70DBA9567}" type="datetimeFigureOut">
               <a:rPr lang="en-US" dirty="0"/>
               <a:pPr/>
-              <a:t>5/14/2021</a:t>
+              <a:t>6/1/2021</a:t>
             </a:fld>
             <a:endParaRPr lang="en-US"/>
           </a:p>
@@ -6792,7 +6796,7 @@
             <a:fld id="{B61BEF0D-F0BB-DE4B-95CE-6DB70DBA9567}" type="datetimeFigureOut">
               <a:rPr lang="en-US" dirty="0"/>
               <a:pPr/>
-              <a:t>5/14/2021</a:t>
+              <a:t>6/1/2021</a:t>
             </a:fld>
             <a:endParaRPr lang="en-US"/>
           </a:p>
@@ -7333,7 +7337,7 @@
             <a:fld id="{B61BEF0D-F0BB-DE4B-95CE-6DB70DBA9567}" type="datetimeFigureOut">
               <a:rPr lang="en-US" dirty="0"/>
               <a:pPr/>
-              <a:t>5/14/2021</a:t>
+              <a:t>6/1/2021</a:t>
             </a:fld>
             <a:endParaRPr lang="en-US"/>
           </a:p>
@@ -7582,7 +7586,7 @@
             <a:fld id="{B61BEF0D-F0BB-DE4B-95CE-6DB70DBA9567}" type="datetimeFigureOut">
               <a:rPr lang="en-US" dirty="0"/>
               <a:pPr/>
-              <a:t>5/14/2021</a:t>
+              <a:t>6/1/2021</a:t>
             </a:fld>
             <a:endParaRPr lang="en-US"/>
           </a:p>
@@ -8115,7 +8119,7 @@
             <a:fld id="{B61BEF0D-F0BB-DE4B-95CE-6DB70DBA9567}" type="datetimeFigureOut">
               <a:rPr lang="en-US" dirty="0"/>
               <a:pPr/>
-              <a:t>5/14/2021</a:t>
+              <a:t>6/1/2021</a:t>
             </a:fld>
             <a:endParaRPr lang="en-US"/>
           </a:p>
@@ -8413,7 +8417,7 @@
             <a:fld id="{B61BEF0D-F0BB-DE4B-95CE-6DB70DBA9567}" type="datetimeFigureOut">
               <a:rPr lang="en-US" dirty="0"/>
               <a:pPr/>
-              <a:t>5/14/2021</a:t>
+              <a:t>6/1/2021</a:t>
             </a:fld>
             <a:endParaRPr lang="en-US"/>
           </a:p>
@@ -8587,7 +8591,7 @@
             <a:fld id="{B61BEF0D-F0BB-DE4B-95CE-6DB70DBA9567}" type="datetimeFigureOut">
               <a:rPr lang="en-US" dirty="0"/>
               <a:pPr/>
-              <a:t>5/14/2021</a:t>
+              <a:t>6/1/2021</a:t>
             </a:fld>
             <a:endParaRPr lang="en-US"/>
           </a:p>
@@ -8767,7 +8771,7 @@
             <a:fld id="{B61BEF0D-F0BB-DE4B-95CE-6DB70DBA9567}" type="datetimeFigureOut">
               <a:rPr lang="en-US" dirty="0"/>
               <a:pPr/>
-              <a:t>5/14/2021</a:t>
+              <a:t>6/1/2021</a:t>
             </a:fld>
             <a:endParaRPr lang="en-US"/>
           </a:p>
@@ -8937,7 +8941,7 @@
             <a:fld id="{B61BEF0D-F0BB-DE4B-95CE-6DB70DBA9567}" type="datetimeFigureOut">
               <a:rPr lang="en-US" dirty="0"/>
               <a:pPr/>
-              <a:t>5/14/2021</a:t>
+              <a:t>6/1/2021</a:t>
             </a:fld>
             <a:endParaRPr lang="en-US"/>
           </a:p>
@@ -9189,7 +9193,7 @@
             <a:fld id="{B61BEF0D-F0BB-DE4B-95CE-6DB70DBA9567}" type="datetimeFigureOut">
               <a:rPr lang="en-US" dirty="0"/>
               <a:pPr/>
-              <a:t>5/14/2021</a:t>
+              <a:t>6/1/2021</a:t>
             </a:fld>
             <a:endParaRPr lang="en-US"/>
           </a:p>
@@ -9485,7 +9489,7 @@
             <a:fld id="{B61BEF0D-F0BB-DE4B-95CE-6DB70DBA9567}" type="datetimeFigureOut">
               <a:rPr lang="en-US" dirty="0"/>
               <a:pPr/>
-              <a:t>5/14/2021</a:t>
+              <a:t>6/1/2021</a:t>
             </a:fld>
             <a:endParaRPr lang="en-US"/>
           </a:p>
@@ -9926,7 +9930,7 @@
             <a:fld id="{B61BEF0D-F0BB-DE4B-95CE-6DB70DBA9567}" type="datetimeFigureOut">
               <a:rPr lang="en-US" dirty="0"/>
               <a:pPr/>
-              <a:t>5/14/2021</a:t>
+              <a:t>6/1/2021</a:t>
             </a:fld>
             <a:endParaRPr lang="en-US"/>
           </a:p>
@@ -10045,7 +10049,7 @@
             <a:fld id="{B61BEF0D-F0BB-DE4B-95CE-6DB70DBA9567}" type="datetimeFigureOut">
               <a:rPr lang="en-US" dirty="0"/>
               <a:pPr/>
-              <a:t>5/14/2021</a:t>
+              <a:t>6/1/2021</a:t>
             </a:fld>
             <a:endParaRPr lang="en-US"/>
           </a:p>
@@ -10142,7 +10146,7 @@
             <a:fld id="{B61BEF0D-F0BB-DE4B-95CE-6DB70DBA9567}" type="datetimeFigureOut">
               <a:rPr lang="en-US" dirty="0"/>
               <a:pPr/>
-              <a:t>5/14/2021</a:t>
+              <a:t>6/1/2021</a:t>
             </a:fld>
             <a:endParaRPr lang="en-US"/>
           </a:p>
@@ -10425,7 +10429,7 @@
             <a:fld id="{B61BEF0D-F0BB-DE4B-95CE-6DB70DBA9567}" type="datetimeFigureOut">
               <a:rPr lang="en-US" dirty="0"/>
               <a:pPr/>
-              <a:t>5/14/2021</a:t>
+              <a:t>6/1/2021</a:t>
             </a:fld>
             <a:endParaRPr lang="en-US"/>
           </a:p>
@@ -10713,7 +10717,7 @@
             <a:fld id="{B61BEF0D-F0BB-DE4B-95CE-6DB70DBA9567}" type="datetimeFigureOut">
               <a:rPr lang="en-US" dirty="0"/>
               <a:pPr/>
-              <a:t>5/14/2021</a:t>
+              <a:t>6/1/2021</a:t>
             </a:fld>
             <a:endParaRPr lang="en-US"/>
           </a:p>
@@ -11243,7 +11247,7 @@
             <a:fld id="{B61BEF0D-F0BB-DE4B-95CE-6DB70DBA9567}" type="datetimeFigureOut">
               <a:rPr lang="en-US" dirty="0"/>
               <a:pPr/>
-              <a:t>5/14/2021</a:t>
+              <a:t>6/1/2021</a:t>
             </a:fld>
             <a:endParaRPr lang="en-US"/>
           </a:p>
@@ -12691,6 +12695,1254 @@
       <p:bldP spid="3" grpId="0" build="p"/>
     </p:bldLst>
   </p:timing>
+</p:sld>
+</file>
+
+<file path=ppt/slides/slide10.xml><?xml version="1.0" encoding="utf-8"?>
+<p:sld xmlns:a="http://schemas.openxmlformats.org/drawingml/2006/main" xmlns:r="http://schemas.openxmlformats.org/officeDocument/2006/relationships" xmlns:p="http://schemas.openxmlformats.org/presentationml/2006/main">
+  <p:cSld>
+    <p:bg>
+      <p:bgPr>
+        <a:solidFill>
+          <a:schemeClr val="bg2"/>
+        </a:solidFill>
+        <a:effectLst/>
+      </p:bgPr>
+    </p:bg>
+    <p:spTree>
+      <p:nvGrpSpPr>
+        <p:cNvPr id="1" name=""/>
+        <p:cNvGrpSpPr/>
+        <p:nvPr/>
+      </p:nvGrpSpPr>
+      <p:grpSpPr>
+        <a:xfrm>
+          <a:off x="0" y="0"/>
+          <a:ext cx="0" cy="0"/>
+          <a:chOff x="0" y="0"/>
+          <a:chExt cx="0" cy="0"/>
+        </a:xfrm>
+      </p:grpSpPr>
+      <p:sp useBgFill="1">
+        <p:nvSpPr>
+          <p:cNvPr id="28" name="Rectangle 7">
+            <a:extLst>
+              <a:ext uri="{FF2B5EF4-FFF2-40B4-BE49-F238E27FC236}">
+                <a16:creationId xmlns:a16="http://schemas.microsoft.com/office/drawing/2014/main" id="{99CAC3B1-4879-424D-8F15-206277196159}"/>
+              </a:ext>
+              <a:ext uri="{C183D7F6-B498-43B3-948B-1728B52AA6E4}">
+                <adec:decorative xmlns:adec="http://schemas.microsoft.com/office/drawing/2017/decorative" val="1"/>
+              </a:ext>
+            </a:extLst>
+          </p:cNvPr>
+          <p:cNvSpPr>
+            <a:spLocks noGrp="1" noRot="1" noChangeAspect="1" noMove="1" noResize="1" noEditPoints="1" noAdjustHandles="1" noChangeArrowheads="1" noChangeShapeType="1" noTextEdit="1"/>
+          </p:cNvSpPr>
+          <p:nvPr>
+            <p:extLst>
+              <p:ext uri="{386F3935-93C4-4BCD-93E2-E3B085C9AB24}">
+                <p16:designElem xmlns:p16="http://schemas.microsoft.com/office/powerpoint/2015/main" val="1"/>
+              </p:ext>
+            </p:extLst>
+          </p:nvPr>
+        </p:nvSpPr>
+        <p:spPr>
+          <a:xfrm>
+            <a:off x="0" y="0"/>
+            <a:ext cx="12192000" cy="6858000"/>
+          </a:xfrm>
+          <a:prstGeom prst="rect">
+            <a:avLst/>
+          </a:prstGeom>
+          <a:ln>
+            <a:noFill/>
+          </a:ln>
+        </p:spPr>
+        <p:style>
+          <a:lnRef idx="2">
+            <a:schemeClr val="accent1">
+              <a:shade val="50000"/>
+            </a:schemeClr>
+          </a:lnRef>
+          <a:fillRef idx="1">
+            <a:schemeClr val="accent1"/>
+          </a:fillRef>
+          <a:effectRef idx="0">
+            <a:schemeClr val="accent1"/>
+          </a:effectRef>
+          <a:fontRef idx="minor">
+            <a:schemeClr val="lt1"/>
+          </a:fontRef>
+        </p:style>
+        <p:txBody>
+          <a:bodyPr rtlCol="0" anchor="ctr"/>
+          <a:lstStyle/>
+          <a:p>
+            <a:pPr algn="ctr"/>
+            <a:endParaRPr lang="en-US"/>
+          </a:p>
+        </p:txBody>
+      </p:sp>
+      <p:grpSp>
+        <p:nvGrpSpPr>
+          <p:cNvPr id="10" name="Group 9">
+            <a:extLst>
+              <a:ext uri="{FF2B5EF4-FFF2-40B4-BE49-F238E27FC236}">
+                <a16:creationId xmlns:a16="http://schemas.microsoft.com/office/drawing/2014/main" id="{4B8492CB-DFBA-4A82-9778-F21493DA36C1}"/>
+              </a:ext>
+              <a:ext uri="{C183D7F6-B498-43B3-948B-1728B52AA6E4}">
+                <adec:decorative xmlns:adec="http://schemas.microsoft.com/office/drawing/2017/decorative" val="1"/>
+              </a:ext>
+            </a:extLst>
+          </p:cNvPr>
+          <p:cNvGrpSpPr>
+            <a:grpSpLocks noGrp="1" noUngrp="1" noRot="1" noChangeAspect="1" noMove="1" noResize="1"/>
+          </p:cNvGrpSpPr>
+          <p:nvPr>
+            <p:extLst>
+              <p:ext uri="{386F3935-93C4-4BCD-93E2-E3B085C9AB24}">
+                <p16:designElem xmlns:p16="http://schemas.microsoft.com/office/powerpoint/2015/main" val="1"/>
+              </p:ext>
+            </p:extLst>
+          </p:nvPr>
+        </p:nvGrpSpPr>
+        <p:grpSpPr>
+          <a:xfrm flipH="1">
+            <a:off x="6526211" y="0"/>
+            <a:ext cx="5014912" cy="6862763"/>
+            <a:chOff x="2928938" y="-4763"/>
+            <a:chExt cx="5014912" cy="6862763"/>
+          </a:xfrm>
+        </p:grpSpPr>
+        <p:sp>
+          <p:nvSpPr>
+            <p:cNvPr id="11" name="Freeform 6">
+              <a:extLst>
+                <a:ext uri="{FF2B5EF4-FFF2-40B4-BE49-F238E27FC236}">
+                  <a16:creationId xmlns:a16="http://schemas.microsoft.com/office/drawing/2014/main" id="{E34CC1C8-EBDD-4AEA-83E6-B27575B62E2E}"/>
+                </a:ext>
+                <a:ext uri="{C183D7F6-B498-43B3-948B-1728B52AA6E4}">
+                  <adec:decorative xmlns:adec="http://schemas.microsoft.com/office/drawing/2017/decorative" val="1"/>
+                </a:ext>
+              </a:extLst>
+            </p:cNvPr>
+            <p:cNvSpPr/>
+            <p:nvPr>
+              <p:extLst>
+                <p:ext uri="{386F3935-93C4-4BCD-93E2-E3B085C9AB24}">
+                  <p16:designElem xmlns:p16="http://schemas.microsoft.com/office/powerpoint/2015/main" val="1"/>
+                </p:ext>
+              </p:extLst>
+            </p:nvPr>
+          </p:nvSpPr>
+          <p:spPr bwMode="auto">
+            <a:xfrm>
+              <a:off x="3367088" y="-4763"/>
+              <a:ext cx="1063625" cy="2782888"/>
+            </a:xfrm>
+            <a:custGeom>
+              <a:avLst/>
+              <a:gdLst/>
+              <a:ahLst/>
+              <a:cxnLst/>
+              <a:rect l="0" t="0" r="r" b="b"/>
+              <a:pathLst>
+                <a:path w="670" h="1753">
+                  <a:moveTo>
+                    <a:pt x="0" y="1696"/>
+                  </a:moveTo>
+                  <a:lnTo>
+                    <a:pt x="225" y="1753"/>
+                  </a:lnTo>
+                  <a:lnTo>
+                    <a:pt x="670" y="0"/>
+                  </a:lnTo>
+                  <a:lnTo>
+                    <a:pt x="430" y="0"/>
+                  </a:lnTo>
+                  <a:lnTo>
+                    <a:pt x="0" y="1696"/>
+                  </a:lnTo>
+                  <a:close/>
+                </a:path>
+              </a:pathLst>
+            </a:custGeom>
+            <a:solidFill>
+              <a:schemeClr val="accent1"/>
+            </a:solidFill>
+            <a:ln>
+              <a:noFill/>
+            </a:ln>
+          </p:spPr>
+        </p:sp>
+        <p:sp>
+          <p:nvSpPr>
+            <p:cNvPr id="12" name="Freeform 7">
+              <a:extLst>
+                <a:ext uri="{FF2B5EF4-FFF2-40B4-BE49-F238E27FC236}">
+                  <a16:creationId xmlns:a16="http://schemas.microsoft.com/office/drawing/2014/main" id="{D6B38644-B85D-4211-9526-5B4C2A662BF7}"/>
+                </a:ext>
+                <a:ext uri="{C183D7F6-B498-43B3-948B-1728B52AA6E4}">
+                  <adec:decorative xmlns:adec="http://schemas.microsoft.com/office/drawing/2017/decorative" val="1"/>
+                </a:ext>
+              </a:extLst>
+            </p:cNvPr>
+            <p:cNvSpPr/>
+            <p:nvPr>
+              <p:extLst>
+                <p:ext uri="{386F3935-93C4-4BCD-93E2-E3B085C9AB24}">
+                  <p16:designElem xmlns:p16="http://schemas.microsoft.com/office/powerpoint/2015/main" val="1"/>
+                </p:ext>
+              </p:extLst>
+            </p:nvPr>
+          </p:nvSpPr>
+          <p:spPr bwMode="auto">
+            <a:xfrm>
+              <a:off x="2928938" y="-4763"/>
+              <a:ext cx="1035050" cy="2673350"/>
+            </a:xfrm>
+            <a:custGeom>
+              <a:avLst/>
+              <a:gdLst/>
+              <a:ahLst/>
+              <a:cxnLst/>
+              <a:rect l="0" t="0" r="r" b="b"/>
+              <a:pathLst>
+                <a:path w="652" h="1684">
+                  <a:moveTo>
+                    <a:pt x="225" y="1684"/>
+                  </a:moveTo>
+                  <a:lnTo>
+                    <a:pt x="652" y="0"/>
+                  </a:lnTo>
+                  <a:lnTo>
+                    <a:pt x="411" y="0"/>
+                  </a:lnTo>
+                  <a:lnTo>
+                    <a:pt x="0" y="1627"/>
+                  </a:lnTo>
+                  <a:lnTo>
+                    <a:pt x="219" y="1681"/>
+                  </a:lnTo>
+                  <a:lnTo>
+                    <a:pt x="225" y="1684"/>
+                  </a:lnTo>
+                  <a:close/>
+                </a:path>
+              </a:pathLst>
+            </a:custGeom>
+            <a:solidFill>
+              <a:srgbClr val="595959"/>
+            </a:solidFill>
+            <a:ln>
+              <a:noFill/>
+            </a:ln>
+          </p:spPr>
+        </p:sp>
+        <p:sp>
+          <p:nvSpPr>
+            <p:cNvPr id="13" name="Freeform 12">
+              <a:extLst>
+                <a:ext uri="{FF2B5EF4-FFF2-40B4-BE49-F238E27FC236}">
+                  <a16:creationId xmlns:a16="http://schemas.microsoft.com/office/drawing/2014/main" id="{8A8B2820-6B8F-4C19-BFC5-D28EE44E54CB}"/>
+                </a:ext>
+                <a:ext uri="{C183D7F6-B498-43B3-948B-1728B52AA6E4}">
+                  <adec:decorative xmlns:adec="http://schemas.microsoft.com/office/drawing/2017/decorative" val="1"/>
+                </a:ext>
+              </a:extLst>
+            </p:cNvPr>
+            <p:cNvSpPr/>
+            <p:nvPr>
+              <p:extLst>
+                <p:ext uri="{386F3935-93C4-4BCD-93E2-E3B085C9AB24}">
+                  <p16:designElem xmlns:p16="http://schemas.microsoft.com/office/powerpoint/2015/main" val="1"/>
+                </p:ext>
+              </p:extLst>
+            </p:nvPr>
+          </p:nvSpPr>
+          <p:spPr bwMode="auto">
+            <a:xfrm>
+              <a:off x="2928938" y="2582862"/>
+              <a:ext cx="2693987" cy="4275138"/>
+            </a:xfrm>
+            <a:custGeom>
+              <a:avLst/>
+              <a:gdLst/>
+              <a:ahLst/>
+              <a:cxnLst/>
+              <a:rect l="0" t="0" r="r" b="b"/>
+              <a:pathLst>
+                <a:path w="1697" h="2693">
+                  <a:moveTo>
+                    <a:pt x="0" y="0"/>
+                  </a:moveTo>
+                  <a:lnTo>
+                    <a:pt x="1622" y="2693"/>
+                  </a:lnTo>
+                  <a:lnTo>
+                    <a:pt x="1697" y="2693"/>
+                  </a:lnTo>
+                  <a:lnTo>
+                    <a:pt x="0" y="0"/>
+                  </a:lnTo>
+                  <a:close/>
+                </a:path>
+              </a:pathLst>
+            </a:custGeom>
+            <a:solidFill>
+              <a:srgbClr val="262626"/>
+            </a:solidFill>
+            <a:ln>
+              <a:noFill/>
+            </a:ln>
+          </p:spPr>
+        </p:sp>
+        <p:sp>
+          <p:nvSpPr>
+            <p:cNvPr id="14" name="Freeform 13">
+              <a:extLst>
+                <a:ext uri="{FF2B5EF4-FFF2-40B4-BE49-F238E27FC236}">
+                  <a16:creationId xmlns:a16="http://schemas.microsoft.com/office/drawing/2014/main" id="{773528ED-4D37-4A77-A8CA-86B6221C5E82}"/>
+                </a:ext>
+                <a:ext uri="{C183D7F6-B498-43B3-948B-1728B52AA6E4}">
+                  <adec:decorative xmlns:adec="http://schemas.microsoft.com/office/drawing/2017/decorative" val="1"/>
+                </a:ext>
+              </a:extLst>
+            </p:cNvPr>
+            <p:cNvSpPr/>
+            <p:nvPr>
+              <p:extLst>
+                <p:ext uri="{386F3935-93C4-4BCD-93E2-E3B085C9AB24}">
+                  <p16:designElem xmlns:p16="http://schemas.microsoft.com/office/powerpoint/2015/main" val="1"/>
+                </p:ext>
+              </p:extLst>
+            </p:nvPr>
+          </p:nvSpPr>
+          <p:spPr bwMode="auto">
+            <a:xfrm>
+              <a:off x="3371850" y="2692400"/>
+              <a:ext cx="3332162" cy="4165600"/>
+            </a:xfrm>
+            <a:custGeom>
+              <a:avLst/>
+              <a:gdLst/>
+              <a:ahLst/>
+              <a:cxnLst/>
+              <a:rect l="0" t="0" r="r" b="b"/>
+              <a:pathLst>
+                <a:path w="2099" h="2624">
+                  <a:moveTo>
+                    <a:pt x="2099" y="2624"/>
+                  </a:moveTo>
+                  <a:lnTo>
+                    <a:pt x="0" y="0"/>
+                  </a:lnTo>
+                  <a:lnTo>
+                    <a:pt x="2021" y="2624"/>
+                  </a:lnTo>
+                  <a:lnTo>
+                    <a:pt x="2099" y="2624"/>
+                  </a:lnTo>
+                  <a:close/>
+                </a:path>
+              </a:pathLst>
+            </a:custGeom>
+            <a:solidFill>
+              <a:schemeClr val="accent1">
+                <a:lumMod val="50000"/>
+              </a:schemeClr>
+            </a:solidFill>
+            <a:ln>
+              <a:noFill/>
+            </a:ln>
+          </p:spPr>
+        </p:sp>
+        <p:sp>
+          <p:nvSpPr>
+            <p:cNvPr id="15" name="Freeform 14">
+              <a:extLst>
+                <a:ext uri="{FF2B5EF4-FFF2-40B4-BE49-F238E27FC236}">
+                  <a16:creationId xmlns:a16="http://schemas.microsoft.com/office/drawing/2014/main" id="{8A58A902-E944-4399-9A93-A91A6A82B166}"/>
+                </a:ext>
+                <a:ext uri="{C183D7F6-B498-43B3-948B-1728B52AA6E4}">
+                  <adec:decorative xmlns:adec="http://schemas.microsoft.com/office/drawing/2017/decorative" val="1"/>
+                </a:ext>
+              </a:extLst>
+            </p:cNvPr>
+            <p:cNvSpPr/>
+            <p:nvPr>
+              <p:extLst>
+                <p:ext uri="{386F3935-93C4-4BCD-93E2-E3B085C9AB24}">
+                  <p16:designElem xmlns:p16="http://schemas.microsoft.com/office/powerpoint/2015/main" val="1"/>
+                </p:ext>
+              </p:extLst>
+            </p:nvPr>
+          </p:nvSpPr>
+          <p:spPr bwMode="auto">
+            <a:xfrm>
+              <a:off x="3367088" y="2687637"/>
+              <a:ext cx="4576762" cy="4170363"/>
+            </a:xfrm>
+            <a:custGeom>
+              <a:avLst/>
+              <a:gdLst/>
+              <a:ahLst/>
+              <a:cxnLst/>
+              <a:rect l="0" t="0" r="r" b="b"/>
+              <a:pathLst>
+                <a:path w="2883" h="2627">
+                  <a:moveTo>
+                    <a:pt x="0" y="0"/>
+                  </a:moveTo>
+                  <a:lnTo>
+                    <a:pt x="3" y="3"/>
+                  </a:lnTo>
+                  <a:lnTo>
+                    <a:pt x="2102" y="2627"/>
+                  </a:lnTo>
+                  <a:lnTo>
+                    <a:pt x="2883" y="2627"/>
+                  </a:lnTo>
+                  <a:lnTo>
+                    <a:pt x="225" y="57"/>
+                  </a:lnTo>
+                  <a:lnTo>
+                    <a:pt x="0" y="0"/>
+                  </a:lnTo>
+                  <a:close/>
+                </a:path>
+              </a:pathLst>
+            </a:custGeom>
+            <a:solidFill>
+              <a:schemeClr val="accent1">
+                <a:lumMod val="75000"/>
+              </a:schemeClr>
+            </a:solidFill>
+            <a:ln>
+              <a:noFill/>
+            </a:ln>
+          </p:spPr>
+        </p:sp>
+        <p:sp>
+          <p:nvSpPr>
+            <p:cNvPr id="29" name="Freeform 15">
+              <a:extLst>
+                <a:ext uri="{FF2B5EF4-FFF2-40B4-BE49-F238E27FC236}">
+                  <a16:creationId xmlns:a16="http://schemas.microsoft.com/office/drawing/2014/main" id="{4EDB1155-2E8E-4FB8-AD42-101FE4383231}"/>
+                </a:ext>
+                <a:ext uri="{C183D7F6-B498-43B3-948B-1728B52AA6E4}">
+                  <adec:decorative xmlns:adec="http://schemas.microsoft.com/office/drawing/2017/decorative" val="1"/>
+                </a:ext>
+              </a:extLst>
+            </p:cNvPr>
+            <p:cNvSpPr/>
+            <p:nvPr>
+              <p:extLst>
+                <p:ext uri="{386F3935-93C4-4BCD-93E2-E3B085C9AB24}">
+                  <p16:designElem xmlns:p16="http://schemas.microsoft.com/office/powerpoint/2015/main" val="1"/>
+                </p:ext>
+              </p:extLst>
+            </p:nvPr>
+          </p:nvSpPr>
+          <p:spPr bwMode="auto">
+            <a:xfrm>
+              <a:off x="2928938" y="2578100"/>
+              <a:ext cx="3584575" cy="4279900"/>
+            </a:xfrm>
+            <a:custGeom>
+              <a:avLst/>
+              <a:gdLst/>
+              <a:ahLst/>
+              <a:cxnLst/>
+              <a:rect l="0" t="0" r="r" b="b"/>
+              <a:pathLst>
+                <a:path w="2258" h="2696">
+                  <a:moveTo>
+                    <a:pt x="2258" y="2696"/>
+                  </a:moveTo>
+                  <a:lnTo>
+                    <a:pt x="264" y="111"/>
+                  </a:lnTo>
+                  <a:lnTo>
+                    <a:pt x="228" y="60"/>
+                  </a:lnTo>
+                  <a:lnTo>
+                    <a:pt x="225" y="57"/>
+                  </a:lnTo>
+                  <a:lnTo>
+                    <a:pt x="0" y="0"/>
+                  </a:lnTo>
+                  <a:lnTo>
+                    <a:pt x="0" y="3"/>
+                  </a:lnTo>
+                  <a:lnTo>
+                    <a:pt x="1697" y="2696"/>
+                  </a:lnTo>
+                  <a:lnTo>
+                    <a:pt x="2258" y="2696"/>
+                  </a:lnTo>
+                  <a:close/>
+                </a:path>
+              </a:pathLst>
+            </a:custGeom>
+            <a:solidFill>
+              <a:srgbClr val="404040"/>
+            </a:solidFill>
+            <a:ln>
+              <a:noFill/>
+            </a:ln>
+          </p:spPr>
+        </p:sp>
+      </p:grpSp>
+      <p:sp>
+        <p:nvSpPr>
+          <p:cNvPr id="2" name="Titolo 1">
+            <a:extLst>
+              <a:ext uri="{FF2B5EF4-FFF2-40B4-BE49-F238E27FC236}">
+                <a16:creationId xmlns:a16="http://schemas.microsoft.com/office/drawing/2014/main" id="{8FC44078-66EB-4CB9-B8A6-6B0170193DEE}"/>
+              </a:ext>
+            </a:extLst>
+          </p:cNvPr>
+          <p:cNvSpPr>
+            <a:spLocks noGrp="1"/>
+          </p:cNvSpPr>
+          <p:nvPr>
+            <p:ph type="title"/>
+          </p:nvPr>
+        </p:nvSpPr>
+        <p:spPr>
+          <a:xfrm>
+            <a:off x="1301062" y="134827"/>
+            <a:ext cx="7817538" cy="990306"/>
+          </a:xfrm>
+        </p:spPr>
+        <p:txBody>
+          <a:bodyPr>
+            <a:normAutofit/>
+          </a:bodyPr>
+          <a:lstStyle/>
+          <a:p>
+            <a:r>
+              <a:rPr lang="it-IT" sz="4400" dirty="0" err="1"/>
+              <a:t>HandBrake</a:t>
+            </a:r>
+            <a:r>
+              <a:rPr lang="it-IT" sz="4400" dirty="0"/>
+              <a:t> Self </a:t>
+            </a:r>
+            <a:r>
+              <a:rPr lang="it-IT" sz="4400" dirty="0" err="1"/>
+              <a:t>Benchmarks</a:t>
+            </a:r>
+            <a:endParaRPr lang="it-IT" sz="3200" dirty="0"/>
+          </a:p>
+        </p:txBody>
+      </p:sp>
+      <p:pic>
+        <p:nvPicPr>
+          <p:cNvPr id="7" name="Immagine 6" descr="Immagine che contiene tavolo&#10;&#10;Descrizione generata automaticamente">
+            <a:extLst>
+              <a:ext uri="{FF2B5EF4-FFF2-40B4-BE49-F238E27FC236}">
+                <a16:creationId xmlns:a16="http://schemas.microsoft.com/office/drawing/2014/main" id="{386255C2-5DA3-44C4-B665-951DAD3B3B08}"/>
+              </a:ext>
+            </a:extLst>
+          </p:cNvPr>
+          <p:cNvPicPr>
+            <a:picLocks noChangeAspect="1"/>
+          </p:cNvPicPr>
+          <p:nvPr/>
+        </p:nvPicPr>
+        <p:blipFill>
+          <a:blip r:embed="rId2">
+            <a:extLst>
+              <a:ext uri="{28A0092B-C50C-407E-A947-70E740481C1C}">
+                <a14:useLocalDpi xmlns:a14="http://schemas.microsoft.com/office/drawing/2010/main" val="0"/>
+              </a:ext>
+            </a:extLst>
+          </a:blip>
+          <a:stretch>
+            <a:fillRect/>
+          </a:stretch>
+        </p:blipFill>
+        <p:spPr>
+          <a:xfrm>
+            <a:off x="997624" y="1129895"/>
+            <a:ext cx="10196752" cy="5028535"/>
+          </a:xfrm>
+          <a:prstGeom prst="rect">
+            <a:avLst/>
+          </a:prstGeom>
+        </p:spPr>
+      </p:pic>
+      <p:sp>
+        <p:nvSpPr>
+          <p:cNvPr id="17" name="CasellaDiTesto 16">
+            <a:extLst>
+              <a:ext uri="{FF2B5EF4-FFF2-40B4-BE49-F238E27FC236}">
+                <a16:creationId xmlns:a16="http://schemas.microsoft.com/office/drawing/2014/main" id="{05B6CD06-8A53-4580-8D61-DB55C424D612}"/>
+              </a:ext>
+            </a:extLst>
+          </p:cNvPr>
+          <p:cNvSpPr txBox="1"/>
+          <p:nvPr/>
+        </p:nvSpPr>
+        <p:spPr>
+          <a:xfrm>
+            <a:off x="924718" y="6265310"/>
+            <a:ext cx="9713911" cy="353943"/>
+          </a:xfrm>
+          <a:prstGeom prst="rect">
+            <a:avLst/>
+          </a:prstGeom>
+          <a:noFill/>
+        </p:spPr>
+        <p:txBody>
+          <a:bodyPr wrap="square" rtlCol="0">
+            <a:spAutoFit/>
+          </a:bodyPr>
+          <a:lstStyle/>
+          <a:p>
+            <a:r>
+              <a:rPr lang="it-IT" sz="1700" dirty="0"/>
+              <a:t>https://handbrake.fr/docs/en/latest/technical/performance.html</a:t>
+            </a:r>
+          </a:p>
+        </p:txBody>
+      </p:sp>
+    </p:spTree>
+    <p:extLst>
+      <p:ext uri="{BB962C8B-B14F-4D97-AF65-F5344CB8AC3E}">
+        <p14:creationId xmlns:p14="http://schemas.microsoft.com/office/powerpoint/2010/main" val="3912147992"/>
+      </p:ext>
+    </p:extLst>
+  </p:cSld>
+  <p:clrMapOvr>
+    <a:overrideClrMapping bg1="dk1" tx1="lt1" bg2="dk2" tx2="lt2" accent1="accent1" accent2="accent2" accent3="accent3" accent4="accent4" accent5="accent5" accent6="accent6" hlink="hlink" folHlink="folHlink"/>
+  </p:clrMapOvr>
+</p:sld>
+</file>
+
+<file path=ppt/slides/slide11.xml><?xml version="1.0" encoding="utf-8"?>
+<p:sld xmlns:a="http://schemas.openxmlformats.org/drawingml/2006/main" xmlns:r="http://schemas.openxmlformats.org/officeDocument/2006/relationships" xmlns:p="http://schemas.openxmlformats.org/presentationml/2006/main">
+  <p:cSld>
+    <p:bg>
+      <p:bgPr>
+        <a:solidFill>
+          <a:schemeClr val="bg2"/>
+        </a:solidFill>
+        <a:effectLst/>
+      </p:bgPr>
+    </p:bg>
+    <p:spTree>
+      <p:nvGrpSpPr>
+        <p:cNvPr id="1" name=""/>
+        <p:cNvGrpSpPr/>
+        <p:nvPr/>
+      </p:nvGrpSpPr>
+      <p:grpSpPr>
+        <a:xfrm>
+          <a:off x="0" y="0"/>
+          <a:ext cx="0" cy="0"/>
+          <a:chOff x="0" y="0"/>
+          <a:chExt cx="0" cy="0"/>
+        </a:xfrm>
+      </p:grpSpPr>
+      <p:sp useBgFill="1">
+        <p:nvSpPr>
+          <p:cNvPr id="28" name="Rectangle 7">
+            <a:extLst>
+              <a:ext uri="{FF2B5EF4-FFF2-40B4-BE49-F238E27FC236}">
+                <a16:creationId xmlns:a16="http://schemas.microsoft.com/office/drawing/2014/main" id="{99CAC3B1-4879-424D-8F15-206277196159}"/>
+              </a:ext>
+              <a:ext uri="{C183D7F6-B498-43B3-948B-1728B52AA6E4}">
+                <adec:decorative xmlns:adec="http://schemas.microsoft.com/office/drawing/2017/decorative" val="1"/>
+              </a:ext>
+            </a:extLst>
+          </p:cNvPr>
+          <p:cNvSpPr>
+            <a:spLocks noGrp="1" noRot="1" noChangeAspect="1" noMove="1" noResize="1" noEditPoints="1" noAdjustHandles="1" noChangeArrowheads="1" noChangeShapeType="1" noTextEdit="1"/>
+          </p:cNvSpPr>
+          <p:nvPr>
+            <p:extLst>
+              <p:ext uri="{386F3935-93C4-4BCD-93E2-E3B085C9AB24}">
+                <p16:designElem xmlns:p16="http://schemas.microsoft.com/office/powerpoint/2015/main" val="1"/>
+              </p:ext>
+            </p:extLst>
+          </p:nvPr>
+        </p:nvSpPr>
+        <p:spPr>
+          <a:xfrm>
+            <a:off x="0" y="0"/>
+            <a:ext cx="12192000" cy="6858000"/>
+          </a:xfrm>
+          <a:prstGeom prst="rect">
+            <a:avLst/>
+          </a:prstGeom>
+          <a:ln>
+            <a:noFill/>
+          </a:ln>
+        </p:spPr>
+        <p:style>
+          <a:lnRef idx="2">
+            <a:schemeClr val="accent1">
+              <a:shade val="50000"/>
+            </a:schemeClr>
+          </a:lnRef>
+          <a:fillRef idx="1">
+            <a:schemeClr val="accent1"/>
+          </a:fillRef>
+          <a:effectRef idx="0">
+            <a:schemeClr val="accent1"/>
+          </a:effectRef>
+          <a:fontRef idx="minor">
+            <a:schemeClr val="lt1"/>
+          </a:fontRef>
+        </p:style>
+        <p:txBody>
+          <a:bodyPr rtlCol="0" anchor="ctr"/>
+          <a:lstStyle/>
+          <a:p>
+            <a:pPr algn="ctr"/>
+            <a:endParaRPr lang="en-US"/>
+          </a:p>
+        </p:txBody>
+      </p:sp>
+      <p:grpSp>
+        <p:nvGrpSpPr>
+          <p:cNvPr id="10" name="Group 9">
+            <a:extLst>
+              <a:ext uri="{FF2B5EF4-FFF2-40B4-BE49-F238E27FC236}">
+                <a16:creationId xmlns:a16="http://schemas.microsoft.com/office/drawing/2014/main" id="{4B8492CB-DFBA-4A82-9778-F21493DA36C1}"/>
+              </a:ext>
+              <a:ext uri="{C183D7F6-B498-43B3-948B-1728B52AA6E4}">
+                <adec:decorative xmlns:adec="http://schemas.microsoft.com/office/drawing/2017/decorative" val="1"/>
+              </a:ext>
+            </a:extLst>
+          </p:cNvPr>
+          <p:cNvGrpSpPr>
+            <a:grpSpLocks noGrp="1" noUngrp="1" noRot="1" noChangeAspect="1" noMove="1" noResize="1"/>
+          </p:cNvGrpSpPr>
+          <p:nvPr>
+            <p:extLst>
+              <p:ext uri="{386F3935-93C4-4BCD-93E2-E3B085C9AB24}">
+                <p16:designElem xmlns:p16="http://schemas.microsoft.com/office/powerpoint/2015/main" val="1"/>
+              </p:ext>
+            </p:extLst>
+          </p:nvPr>
+        </p:nvGrpSpPr>
+        <p:grpSpPr>
+          <a:xfrm flipH="1">
+            <a:off x="6526211" y="0"/>
+            <a:ext cx="5014912" cy="6862763"/>
+            <a:chOff x="2928938" y="-4763"/>
+            <a:chExt cx="5014912" cy="6862763"/>
+          </a:xfrm>
+        </p:grpSpPr>
+        <p:sp>
+          <p:nvSpPr>
+            <p:cNvPr id="11" name="Freeform 6">
+              <a:extLst>
+                <a:ext uri="{FF2B5EF4-FFF2-40B4-BE49-F238E27FC236}">
+                  <a16:creationId xmlns:a16="http://schemas.microsoft.com/office/drawing/2014/main" id="{E34CC1C8-EBDD-4AEA-83E6-B27575B62E2E}"/>
+                </a:ext>
+                <a:ext uri="{C183D7F6-B498-43B3-948B-1728B52AA6E4}">
+                  <adec:decorative xmlns:adec="http://schemas.microsoft.com/office/drawing/2017/decorative" val="1"/>
+                </a:ext>
+              </a:extLst>
+            </p:cNvPr>
+            <p:cNvSpPr/>
+            <p:nvPr>
+              <p:extLst>
+                <p:ext uri="{386F3935-93C4-4BCD-93E2-E3B085C9AB24}">
+                  <p16:designElem xmlns:p16="http://schemas.microsoft.com/office/powerpoint/2015/main" val="1"/>
+                </p:ext>
+              </p:extLst>
+            </p:nvPr>
+          </p:nvSpPr>
+          <p:spPr bwMode="auto">
+            <a:xfrm>
+              <a:off x="3367088" y="-4763"/>
+              <a:ext cx="1063625" cy="2782888"/>
+            </a:xfrm>
+            <a:custGeom>
+              <a:avLst/>
+              <a:gdLst/>
+              <a:ahLst/>
+              <a:cxnLst/>
+              <a:rect l="0" t="0" r="r" b="b"/>
+              <a:pathLst>
+                <a:path w="670" h="1753">
+                  <a:moveTo>
+                    <a:pt x="0" y="1696"/>
+                  </a:moveTo>
+                  <a:lnTo>
+                    <a:pt x="225" y="1753"/>
+                  </a:lnTo>
+                  <a:lnTo>
+                    <a:pt x="670" y="0"/>
+                  </a:lnTo>
+                  <a:lnTo>
+                    <a:pt x="430" y="0"/>
+                  </a:lnTo>
+                  <a:lnTo>
+                    <a:pt x="0" y="1696"/>
+                  </a:lnTo>
+                  <a:close/>
+                </a:path>
+              </a:pathLst>
+            </a:custGeom>
+            <a:solidFill>
+              <a:schemeClr val="accent1"/>
+            </a:solidFill>
+            <a:ln>
+              <a:noFill/>
+            </a:ln>
+          </p:spPr>
+        </p:sp>
+        <p:sp>
+          <p:nvSpPr>
+            <p:cNvPr id="12" name="Freeform 7">
+              <a:extLst>
+                <a:ext uri="{FF2B5EF4-FFF2-40B4-BE49-F238E27FC236}">
+                  <a16:creationId xmlns:a16="http://schemas.microsoft.com/office/drawing/2014/main" id="{D6B38644-B85D-4211-9526-5B4C2A662BF7}"/>
+                </a:ext>
+                <a:ext uri="{C183D7F6-B498-43B3-948B-1728B52AA6E4}">
+                  <adec:decorative xmlns:adec="http://schemas.microsoft.com/office/drawing/2017/decorative" val="1"/>
+                </a:ext>
+              </a:extLst>
+            </p:cNvPr>
+            <p:cNvSpPr/>
+            <p:nvPr>
+              <p:extLst>
+                <p:ext uri="{386F3935-93C4-4BCD-93E2-E3B085C9AB24}">
+                  <p16:designElem xmlns:p16="http://schemas.microsoft.com/office/powerpoint/2015/main" val="1"/>
+                </p:ext>
+              </p:extLst>
+            </p:nvPr>
+          </p:nvSpPr>
+          <p:spPr bwMode="auto">
+            <a:xfrm>
+              <a:off x="2928938" y="-4763"/>
+              <a:ext cx="1035050" cy="2673350"/>
+            </a:xfrm>
+            <a:custGeom>
+              <a:avLst/>
+              <a:gdLst/>
+              <a:ahLst/>
+              <a:cxnLst/>
+              <a:rect l="0" t="0" r="r" b="b"/>
+              <a:pathLst>
+                <a:path w="652" h="1684">
+                  <a:moveTo>
+                    <a:pt x="225" y="1684"/>
+                  </a:moveTo>
+                  <a:lnTo>
+                    <a:pt x="652" y="0"/>
+                  </a:lnTo>
+                  <a:lnTo>
+                    <a:pt x="411" y="0"/>
+                  </a:lnTo>
+                  <a:lnTo>
+                    <a:pt x="0" y="1627"/>
+                  </a:lnTo>
+                  <a:lnTo>
+                    <a:pt x="219" y="1681"/>
+                  </a:lnTo>
+                  <a:lnTo>
+                    <a:pt x="225" y="1684"/>
+                  </a:lnTo>
+                  <a:close/>
+                </a:path>
+              </a:pathLst>
+            </a:custGeom>
+            <a:solidFill>
+              <a:srgbClr val="595959"/>
+            </a:solidFill>
+            <a:ln>
+              <a:noFill/>
+            </a:ln>
+          </p:spPr>
+        </p:sp>
+        <p:sp>
+          <p:nvSpPr>
+            <p:cNvPr id="13" name="Freeform 12">
+              <a:extLst>
+                <a:ext uri="{FF2B5EF4-FFF2-40B4-BE49-F238E27FC236}">
+                  <a16:creationId xmlns:a16="http://schemas.microsoft.com/office/drawing/2014/main" id="{8A8B2820-6B8F-4C19-BFC5-D28EE44E54CB}"/>
+                </a:ext>
+                <a:ext uri="{C183D7F6-B498-43B3-948B-1728B52AA6E4}">
+                  <adec:decorative xmlns:adec="http://schemas.microsoft.com/office/drawing/2017/decorative" val="1"/>
+                </a:ext>
+              </a:extLst>
+            </p:cNvPr>
+            <p:cNvSpPr/>
+            <p:nvPr>
+              <p:extLst>
+                <p:ext uri="{386F3935-93C4-4BCD-93E2-E3B085C9AB24}">
+                  <p16:designElem xmlns:p16="http://schemas.microsoft.com/office/powerpoint/2015/main" val="1"/>
+                </p:ext>
+              </p:extLst>
+            </p:nvPr>
+          </p:nvSpPr>
+          <p:spPr bwMode="auto">
+            <a:xfrm>
+              <a:off x="2928938" y="2582862"/>
+              <a:ext cx="2693987" cy="4275138"/>
+            </a:xfrm>
+            <a:custGeom>
+              <a:avLst/>
+              <a:gdLst/>
+              <a:ahLst/>
+              <a:cxnLst/>
+              <a:rect l="0" t="0" r="r" b="b"/>
+              <a:pathLst>
+                <a:path w="1697" h="2693">
+                  <a:moveTo>
+                    <a:pt x="0" y="0"/>
+                  </a:moveTo>
+                  <a:lnTo>
+                    <a:pt x="1622" y="2693"/>
+                  </a:lnTo>
+                  <a:lnTo>
+                    <a:pt x="1697" y="2693"/>
+                  </a:lnTo>
+                  <a:lnTo>
+                    <a:pt x="0" y="0"/>
+                  </a:lnTo>
+                  <a:close/>
+                </a:path>
+              </a:pathLst>
+            </a:custGeom>
+            <a:solidFill>
+              <a:srgbClr val="262626"/>
+            </a:solidFill>
+            <a:ln>
+              <a:noFill/>
+            </a:ln>
+          </p:spPr>
+        </p:sp>
+        <p:sp>
+          <p:nvSpPr>
+            <p:cNvPr id="14" name="Freeform 13">
+              <a:extLst>
+                <a:ext uri="{FF2B5EF4-FFF2-40B4-BE49-F238E27FC236}">
+                  <a16:creationId xmlns:a16="http://schemas.microsoft.com/office/drawing/2014/main" id="{773528ED-4D37-4A77-A8CA-86B6221C5E82}"/>
+                </a:ext>
+                <a:ext uri="{C183D7F6-B498-43B3-948B-1728B52AA6E4}">
+                  <adec:decorative xmlns:adec="http://schemas.microsoft.com/office/drawing/2017/decorative" val="1"/>
+                </a:ext>
+              </a:extLst>
+            </p:cNvPr>
+            <p:cNvSpPr/>
+            <p:nvPr>
+              <p:extLst>
+                <p:ext uri="{386F3935-93C4-4BCD-93E2-E3B085C9AB24}">
+                  <p16:designElem xmlns:p16="http://schemas.microsoft.com/office/powerpoint/2015/main" val="1"/>
+                </p:ext>
+              </p:extLst>
+            </p:nvPr>
+          </p:nvSpPr>
+          <p:spPr bwMode="auto">
+            <a:xfrm>
+              <a:off x="3371850" y="2692400"/>
+              <a:ext cx="3332162" cy="4165600"/>
+            </a:xfrm>
+            <a:custGeom>
+              <a:avLst/>
+              <a:gdLst/>
+              <a:ahLst/>
+              <a:cxnLst/>
+              <a:rect l="0" t="0" r="r" b="b"/>
+              <a:pathLst>
+                <a:path w="2099" h="2624">
+                  <a:moveTo>
+                    <a:pt x="2099" y="2624"/>
+                  </a:moveTo>
+                  <a:lnTo>
+                    <a:pt x="0" y="0"/>
+                  </a:lnTo>
+                  <a:lnTo>
+                    <a:pt x="2021" y="2624"/>
+                  </a:lnTo>
+                  <a:lnTo>
+                    <a:pt x="2099" y="2624"/>
+                  </a:lnTo>
+                  <a:close/>
+                </a:path>
+              </a:pathLst>
+            </a:custGeom>
+            <a:solidFill>
+              <a:schemeClr val="accent1">
+                <a:lumMod val="50000"/>
+              </a:schemeClr>
+            </a:solidFill>
+            <a:ln>
+              <a:noFill/>
+            </a:ln>
+          </p:spPr>
+        </p:sp>
+        <p:sp>
+          <p:nvSpPr>
+            <p:cNvPr id="15" name="Freeform 14">
+              <a:extLst>
+                <a:ext uri="{FF2B5EF4-FFF2-40B4-BE49-F238E27FC236}">
+                  <a16:creationId xmlns:a16="http://schemas.microsoft.com/office/drawing/2014/main" id="{8A58A902-E944-4399-9A93-A91A6A82B166}"/>
+                </a:ext>
+                <a:ext uri="{C183D7F6-B498-43B3-948B-1728B52AA6E4}">
+                  <adec:decorative xmlns:adec="http://schemas.microsoft.com/office/drawing/2017/decorative" val="1"/>
+                </a:ext>
+              </a:extLst>
+            </p:cNvPr>
+            <p:cNvSpPr/>
+            <p:nvPr>
+              <p:extLst>
+                <p:ext uri="{386F3935-93C4-4BCD-93E2-E3B085C9AB24}">
+                  <p16:designElem xmlns:p16="http://schemas.microsoft.com/office/powerpoint/2015/main" val="1"/>
+                </p:ext>
+              </p:extLst>
+            </p:nvPr>
+          </p:nvSpPr>
+          <p:spPr bwMode="auto">
+            <a:xfrm>
+              <a:off x="3367088" y="2687637"/>
+              <a:ext cx="4576762" cy="4170363"/>
+            </a:xfrm>
+            <a:custGeom>
+              <a:avLst/>
+              <a:gdLst/>
+              <a:ahLst/>
+              <a:cxnLst/>
+              <a:rect l="0" t="0" r="r" b="b"/>
+              <a:pathLst>
+                <a:path w="2883" h="2627">
+                  <a:moveTo>
+                    <a:pt x="0" y="0"/>
+                  </a:moveTo>
+                  <a:lnTo>
+                    <a:pt x="3" y="3"/>
+                  </a:lnTo>
+                  <a:lnTo>
+                    <a:pt x="2102" y="2627"/>
+                  </a:lnTo>
+                  <a:lnTo>
+                    <a:pt x="2883" y="2627"/>
+                  </a:lnTo>
+                  <a:lnTo>
+                    <a:pt x="225" y="57"/>
+                  </a:lnTo>
+                  <a:lnTo>
+                    <a:pt x="0" y="0"/>
+                  </a:lnTo>
+                  <a:close/>
+                </a:path>
+              </a:pathLst>
+            </a:custGeom>
+            <a:solidFill>
+              <a:schemeClr val="accent1">
+                <a:lumMod val="75000"/>
+              </a:schemeClr>
+            </a:solidFill>
+            <a:ln>
+              <a:noFill/>
+            </a:ln>
+          </p:spPr>
+        </p:sp>
+        <p:sp>
+          <p:nvSpPr>
+            <p:cNvPr id="29" name="Freeform 15">
+              <a:extLst>
+                <a:ext uri="{FF2B5EF4-FFF2-40B4-BE49-F238E27FC236}">
+                  <a16:creationId xmlns:a16="http://schemas.microsoft.com/office/drawing/2014/main" id="{4EDB1155-2E8E-4FB8-AD42-101FE4383231}"/>
+                </a:ext>
+                <a:ext uri="{C183D7F6-B498-43B3-948B-1728B52AA6E4}">
+                  <adec:decorative xmlns:adec="http://schemas.microsoft.com/office/drawing/2017/decorative" val="1"/>
+                </a:ext>
+              </a:extLst>
+            </p:cNvPr>
+            <p:cNvSpPr/>
+            <p:nvPr>
+              <p:extLst>
+                <p:ext uri="{386F3935-93C4-4BCD-93E2-E3B085C9AB24}">
+                  <p16:designElem xmlns:p16="http://schemas.microsoft.com/office/powerpoint/2015/main" val="1"/>
+                </p:ext>
+              </p:extLst>
+            </p:nvPr>
+          </p:nvSpPr>
+          <p:spPr bwMode="auto">
+            <a:xfrm>
+              <a:off x="2928938" y="2578100"/>
+              <a:ext cx="3584575" cy="4279900"/>
+            </a:xfrm>
+            <a:custGeom>
+              <a:avLst/>
+              <a:gdLst/>
+              <a:ahLst/>
+              <a:cxnLst/>
+              <a:rect l="0" t="0" r="r" b="b"/>
+              <a:pathLst>
+                <a:path w="2258" h="2696">
+                  <a:moveTo>
+                    <a:pt x="2258" y="2696"/>
+                  </a:moveTo>
+                  <a:lnTo>
+                    <a:pt x="264" y="111"/>
+                  </a:lnTo>
+                  <a:lnTo>
+                    <a:pt x="228" y="60"/>
+                  </a:lnTo>
+                  <a:lnTo>
+                    <a:pt x="225" y="57"/>
+                  </a:lnTo>
+                  <a:lnTo>
+                    <a:pt x="0" y="0"/>
+                  </a:lnTo>
+                  <a:lnTo>
+                    <a:pt x="0" y="3"/>
+                  </a:lnTo>
+                  <a:lnTo>
+                    <a:pt x="1697" y="2696"/>
+                  </a:lnTo>
+                  <a:lnTo>
+                    <a:pt x="2258" y="2696"/>
+                  </a:lnTo>
+                  <a:close/>
+                </a:path>
+              </a:pathLst>
+            </a:custGeom>
+            <a:solidFill>
+              <a:srgbClr val="404040"/>
+            </a:solidFill>
+            <a:ln>
+              <a:noFill/>
+            </a:ln>
+          </p:spPr>
+        </p:sp>
+      </p:grpSp>
+      <p:sp>
+        <p:nvSpPr>
+          <p:cNvPr id="2" name="Titolo 1">
+            <a:extLst>
+              <a:ext uri="{FF2B5EF4-FFF2-40B4-BE49-F238E27FC236}">
+                <a16:creationId xmlns:a16="http://schemas.microsoft.com/office/drawing/2014/main" id="{8FC44078-66EB-4CB9-B8A6-6B0170193DEE}"/>
+              </a:ext>
+            </a:extLst>
+          </p:cNvPr>
+          <p:cNvSpPr>
+            <a:spLocks noGrp="1"/>
+          </p:cNvSpPr>
+          <p:nvPr>
+            <p:ph type="title"/>
+          </p:nvPr>
+        </p:nvSpPr>
+        <p:spPr>
+          <a:xfrm>
+            <a:off x="1301062" y="134827"/>
+            <a:ext cx="7817538" cy="990306"/>
+          </a:xfrm>
+        </p:spPr>
+        <p:txBody>
+          <a:bodyPr>
+            <a:normAutofit/>
+          </a:bodyPr>
+          <a:lstStyle/>
+          <a:p>
+            <a:r>
+              <a:rPr lang="it-IT" sz="4400" dirty="0" err="1"/>
+              <a:t>HandBrake</a:t>
+            </a:r>
+            <a:r>
+              <a:rPr lang="it-IT" sz="4400" dirty="0"/>
+              <a:t> Self </a:t>
+            </a:r>
+            <a:r>
+              <a:rPr lang="it-IT" sz="4400" dirty="0" err="1"/>
+              <a:t>Benchmarks</a:t>
+            </a:r>
+            <a:endParaRPr lang="it-IT" sz="3200" dirty="0"/>
+          </a:p>
+        </p:txBody>
+      </p:sp>
+      <p:sp>
+        <p:nvSpPr>
+          <p:cNvPr id="17" name="CasellaDiTesto 16">
+            <a:extLst>
+              <a:ext uri="{FF2B5EF4-FFF2-40B4-BE49-F238E27FC236}">
+                <a16:creationId xmlns:a16="http://schemas.microsoft.com/office/drawing/2014/main" id="{05B6CD06-8A53-4580-8D61-DB55C424D612}"/>
+              </a:ext>
+            </a:extLst>
+          </p:cNvPr>
+          <p:cNvSpPr txBox="1"/>
+          <p:nvPr/>
+        </p:nvSpPr>
+        <p:spPr>
+          <a:xfrm>
+            <a:off x="650877" y="6247954"/>
+            <a:ext cx="9713911" cy="353943"/>
+          </a:xfrm>
+          <a:prstGeom prst="rect">
+            <a:avLst/>
+          </a:prstGeom>
+          <a:noFill/>
+        </p:spPr>
+        <p:txBody>
+          <a:bodyPr wrap="square" rtlCol="0">
+            <a:spAutoFit/>
+          </a:bodyPr>
+          <a:lstStyle/>
+          <a:p>
+            <a:r>
+              <a:rPr lang="it-IT" sz="1700" dirty="0"/>
+              <a:t>https://handbrake.fr/docs/en/latest/technical/performance.html</a:t>
+            </a:r>
+          </a:p>
+        </p:txBody>
+      </p:sp>
+      <p:pic>
+        <p:nvPicPr>
+          <p:cNvPr id="4" name="Immagine 3" descr="Immagine che contiene tavolo&#10;&#10;Descrizione generata automaticamente">
+            <a:extLst>
+              <a:ext uri="{FF2B5EF4-FFF2-40B4-BE49-F238E27FC236}">
+                <a16:creationId xmlns:a16="http://schemas.microsoft.com/office/drawing/2014/main" id="{E5FA68BB-4BCB-40F9-9F71-903DC8526DC1}"/>
+              </a:ext>
+            </a:extLst>
+          </p:cNvPr>
+          <p:cNvPicPr>
+            <a:picLocks noChangeAspect="1"/>
+          </p:cNvPicPr>
+          <p:nvPr/>
+        </p:nvPicPr>
+        <p:blipFill>
+          <a:blip r:embed="rId2">
+            <a:extLst>
+              <a:ext uri="{28A0092B-C50C-407E-A947-70E740481C1C}">
+                <a14:useLocalDpi xmlns:a14="http://schemas.microsoft.com/office/drawing/2010/main" val="0"/>
+              </a:ext>
+            </a:extLst>
+          </a:blip>
+          <a:stretch>
+            <a:fillRect/>
+          </a:stretch>
+        </p:blipFill>
+        <p:spPr>
+          <a:xfrm>
+            <a:off x="650877" y="1259960"/>
+            <a:ext cx="10857473" cy="4706938"/>
+          </a:xfrm>
+          <a:prstGeom prst="rect">
+            <a:avLst/>
+          </a:prstGeom>
+        </p:spPr>
+      </p:pic>
+    </p:spTree>
+    <p:extLst>
+      <p:ext uri="{BB962C8B-B14F-4D97-AF65-F5344CB8AC3E}">
+        <p14:creationId xmlns:p14="http://schemas.microsoft.com/office/powerpoint/2010/main" val="2824115227"/>
+      </p:ext>
+    </p:extLst>
+  </p:cSld>
+  <p:clrMapOvr>
+    <a:overrideClrMapping bg1="dk1" tx1="lt1" bg2="dk2" tx2="lt2" accent1="accent1" accent2="accent2" accent3="accent3" accent4="accent4" accent5="accent5" accent6="accent6" hlink="hlink" folHlink="folHlink"/>
+  </p:clrMapOvr>
 </p:sld>
 </file>
 
@@ -16077,7 +17329,7 @@
         <p:spPr>
           <a:xfrm>
             <a:off x="685799" y="2103727"/>
-            <a:ext cx="7391401" cy="3970866"/>
+            <a:ext cx="7666038" cy="3970866"/>
           </a:xfrm>
           <a:prstGeom prst="rect">
             <a:avLst/>
@@ -16088,7 +17340,7 @@
             <a:prstTxWarp prst="textNoShape">
               <a:avLst/>
             </a:prstTxWarp>
-            <a:normAutofit/>
+            <a:normAutofit fontScale="92500"/>
           </a:bodyPr>
           <a:lstStyle/>
           <a:p>
@@ -16166,6 +17418,38 @@
             </a:r>
           </a:p>
           <a:p>
+            <a:pPr marL="571500" indent="-571500" defTabSz="457200">
+              <a:spcBef>
+                <a:spcPct val="20000"/>
+              </a:spcBef>
+              <a:spcAft>
+                <a:spcPts val="600"/>
+              </a:spcAft>
+              <a:buClr>
+                <a:srgbClr val="688727"/>
+              </a:buClr>
+              <a:buSzPct val="145000"/>
+              <a:buFont typeface="Arial"/>
+              <a:buChar char="•"/>
+            </a:pPr>
+            <a:r>
+              <a:rPr lang="en-US" sz="4000" b="1" dirty="0">
+                <a:solidFill>
+                  <a:schemeClr val="bg1"/>
+                </a:solidFill>
+              </a:rPr>
+              <a:t>Claim to be efficient </a:t>
+            </a:r>
+            <a:r>
+              <a:rPr lang="en-US" sz="4000" dirty="0">
+                <a:solidFill>
+                  <a:schemeClr val="bg1"/>
+                </a:solidFill>
+              </a:rPr>
+              <a:t>in term of compression capabilities over time</a:t>
+            </a:r>
+          </a:p>
+          <a:p>
             <a:pPr defTabSz="457200">
               <a:spcBef>
                 <a:spcPct val="20000"/>
@@ -16178,7 +17462,7 @@
               </a:buClr>
               <a:buSzPct val="145000"/>
             </a:pPr>
-            <a:endParaRPr lang="en-US"/>
+            <a:endParaRPr lang="en-US" dirty="0"/>
           </a:p>
         </p:txBody>
       </p:sp>
@@ -16614,6 +17898,1342 @@
   </p:cSld>
   <p:clrMapOvr>
     <a:masterClrMapping/>
+  </p:clrMapOvr>
+</p:sld>
+</file>
+
+<file path=ppt/slides/slide8.xml><?xml version="1.0" encoding="utf-8"?>
+<p:sld xmlns:a="http://schemas.openxmlformats.org/drawingml/2006/main" xmlns:r="http://schemas.openxmlformats.org/officeDocument/2006/relationships" xmlns:p="http://schemas.openxmlformats.org/presentationml/2006/main">
+  <p:cSld>
+    <p:bg>
+      <p:bgPr>
+        <a:blipFill rotWithShape="1">
+          <a:blip r:embed="rId2">
+            <a:duotone>
+              <a:schemeClr val="bg2">
+                <a:shade val="76000"/>
+                <a:satMod val="180000"/>
+              </a:schemeClr>
+              <a:schemeClr val="bg2">
+                <a:tint val="80000"/>
+                <a:satMod val="120000"/>
+                <a:lumMod val="180000"/>
+              </a:schemeClr>
+            </a:duotone>
+          </a:blip>
+          <a:stretch/>
+        </a:blipFill>
+        <a:effectLst/>
+      </p:bgPr>
+    </p:bg>
+    <p:spTree>
+      <p:nvGrpSpPr>
+        <p:cNvPr id="1" name=""/>
+        <p:cNvGrpSpPr/>
+        <p:nvPr/>
+      </p:nvGrpSpPr>
+      <p:grpSpPr>
+        <a:xfrm>
+          <a:off x="0" y="0"/>
+          <a:ext cx="0" cy="0"/>
+          <a:chOff x="0" y="0"/>
+          <a:chExt cx="0" cy="0"/>
+        </a:xfrm>
+      </p:grpSpPr>
+      <p:sp useBgFill="1">
+        <p:nvSpPr>
+          <p:cNvPr id="66" name="Rectangle 65">
+            <a:extLst>
+              <a:ext uri="{FF2B5EF4-FFF2-40B4-BE49-F238E27FC236}">
+                <a16:creationId xmlns:a16="http://schemas.microsoft.com/office/drawing/2014/main" id="{BA79F213-51C2-42E5-A917-142526CC6716}"/>
+              </a:ext>
+              <a:ext uri="{C183D7F6-B498-43B3-948B-1728B52AA6E4}">
+                <adec:decorative xmlns:adec="http://schemas.microsoft.com/office/drawing/2017/decorative" val="1"/>
+              </a:ext>
+            </a:extLst>
+          </p:cNvPr>
+          <p:cNvSpPr>
+            <a:spLocks noGrp="1" noRot="1" noChangeAspect="1" noMove="1" noResize="1" noEditPoints="1" noAdjustHandles="1" noChangeArrowheads="1" noChangeShapeType="1" noTextEdit="1"/>
+          </p:cNvSpPr>
+          <p:nvPr>
+            <p:extLst>
+              <p:ext uri="{386F3935-93C4-4BCD-93E2-E3B085C9AB24}">
+                <p16:designElem xmlns:p16="http://schemas.microsoft.com/office/powerpoint/2015/main" val="1"/>
+              </p:ext>
+            </p:extLst>
+          </p:nvPr>
+        </p:nvSpPr>
+        <p:spPr>
+          <a:xfrm>
+            <a:off x="0" y="0"/>
+            <a:ext cx="12192000" cy="6858000"/>
+          </a:xfrm>
+          <a:prstGeom prst="rect">
+            <a:avLst/>
+          </a:prstGeom>
+          <a:ln>
+            <a:noFill/>
+          </a:ln>
+        </p:spPr>
+        <p:style>
+          <a:lnRef idx="2">
+            <a:schemeClr val="accent1">
+              <a:shade val="50000"/>
+            </a:schemeClr>
+          </a:lnRef>
+          <a:fillRef idx="1">
+            <a:schemeClr val="accent1"/>
+          </a:fillRef>
+          <a:effectRef idx="0">
+            <a:schemeClr val="accent1"/>
+          </a:effectRef>
+          <a:fontRef idx="minor">
+            <a:schemeClr val="lt1"/>
+          </a:fontRef>
+        </p:style>
+        <p:txBody>
+          <a:bodyPr rtlCol="0" anchor="ctr"/>
+          <a:lstStyle/>
+          <a:p>
+            <a:pPr algn="ctr"/>
+            <a:endParaRPr lang="en-US"/>
+          </a:p>
+        </p:txBody>
+      </p:sp>
+      <p:pic>
+        <p:nvPicPr>
+          <p:cNvPr id="14" name="Picture 4" descr="Camera lens">
+            <a:extLst>
+              <a:ext uri="{FF2B5EF4-FFF2-40B4-BE49-F238E27FC236}">
+                <a16:creationId xmlns:a16="http://schemas.microsoft.com/office/drawing/2014/main" id="{EE8FE827-DE07-41C9-AA7C-8D1548D8487B}"/>
+              </a:ext>
+            </a:extLst>
+          </p:cNvPr>
+          <p:cNvPicPr>
+            <a:picLocks noChangeAspect="1"/>
+          </p:cNvPicPr>
+          <p:nvPr/>
+        </p:nvPicPr>
+        <p:blipFill rotWithShape="1">
+          <a:blip r:embed="rId3"/>
+          <a:srcRect t="13111" r="9091" b="10281"/>
+          <a:stretch/>
+        </p:blipFill>
+        <p:spPr>
+          <a:xfrm>
+            <a:off x="20" y="10"/>
+            <a:ext cx="12191980" cy="6857990"/>
+          </a:xfrm>
+          <a:prstGeom prst="rect">
+            <a:avLst/>
+          </a:prstGeom>
+        </p:spPr>
+      </p:pic>
+      <p:sp>
+        <p:nvSpPr>
+          <p:cNvPr id="68" name="Freeform 15">
+            <a:extLst>
+              <a:ext uri="{FF2B5EF4-FFF2-40B4-BE49-F238E27FC236}">
+                <a16:creationId xmlns:a16="http://schemas.microsoft.com/office/drawing/2014/main" id="{C478AE16-9FFE-40EC-B81F-FAD67DA86064}"/>
+              </a:ext>
+              <a:ext uri="{C183D7F6-B498-43B3-948B-1728B52AA6E4}">
+                <adec:decorative xmlns:adec="http://schemas.microsoft.com/office/drawing/2017/decorative" val="1"/>
+              </a:ext>
+            </a:extLst>
+          </p:cNvPr>
+          <p:cNvSpPr>
+            <a:spLocks noGrp="1" noRot="1" noChangeAspect="1" noMove="1" noResize="1" noEditPoints="1" noAdjustHandles="1" noChangeArrowheads="1" noChangeShapeType="1" noTextEdit="1"/>
+          </p:cNvSpPr>
+          <p:nvPr>
+            <p:extLst>
+              <p:ext uri="{386F3935-93C4-4BCD-93E2-E3B085C9AB24}">
+                <p16:designElem xmlns:p16="http://schemas.microsoft.com/office/powerpoint/2015/main" val="1"/>
+              </p:ext>
+            </p:extLst>
+          </p:nvPr>
+        </p:nvSpPr>
+        <p:spPr bwMode="white">
+          <a:xfrm>
+            <a:off x="-16933" y="-16933"/>
+            <a:ext cx="9491133" cy="6883400"/>
+          </a:xfrm>
+          <a:custGeom>
+            <a:avLst/>
+            <a:gdLst>
+              <a:gd name="connsiteX0" fmla="*/ 5427133 w 7340600"/>
+              <a:gd name="connsiteY0" fmla="*/ 8466 h 6883400"/>
+              <a:gd name="connsiteX1" fmla="*/ 4783666 w 7340600"/>
+              <a:gd name="connsiteY1" fmla="*/ 2573866 h 6883400"/>
+              <a:gd name="connsiteX2" fmla="*/ 7340600 w 7340600"/>
+              <a:gd name="connsiteY2" fmla="*/ 6874933 h 6883400"/>
+              <a:gd name="connsiteX3" fmla="*/ 0 w 7340600"/>
+              <a:gd name="connsiteY3" fmla="*/ 6883400 h 6883400"/>
+              <a:gd name="connsiteX4" fmla="*/ 8466 w 7340600"/>
+              <a:gd name="connsiteY4" fmla="*/ 0 h 6883400"/>
+              <a:gd name="connsiteX5" fmla="*/ 5427133 w 7340600"/>
+              <a:gd name="connsiteY5" fmla="*/ 8466 h 6883400"/>
+              <a:gd name="connsiteX0" fmla="*/ 9203266 w 9203266"/>
+              <a:gd name="connsiteY0" fmla="*/ 16933 h 6883400"/>
+              <a:gd name="connsiteX1" fmla="*/ 4783666 w 9203266"/>
+              <a:gd name="connsiteY1" fmla="*/ 2573866 h 6883400"/>
+              <a:gd name="connsiteX2" fmla="*/ 7340600 w 9203266"/>
+              <a:gd name="connsiteY2" fmla="*/ 6874933 h 6883400"/>
+              <a:gd name="connsiteX3" fmla="*/ 0 w 9203266"/>
+              <a:gd name="connsiteY3" fmla="*/ 6883400 h 6883400"/>
+              <a:gd name="connsiteX4" fmla="*/ 8466 w 9203266"/>
+              <a:gd name="connsiteY4" fmla="*/ 0 h 6883400"/>
+              <a:gd name="connsiteX5" fmla="*/ 9203266 w 9203266"/>
+              <a:gd name="connsiteY5" fmla="*/ 16933 h 6883400"/>
+              <a:gd name="connsiteX0" fmla="*/ 9203266 w 9203266"/>
+              <a:gd name="connsiteY0" fmla="*/ 16933 h 6883400"/>
+              <a:gd name="connsiteX1" fmla="*/ 8339666 w 9203266"/>
+              <a:gd name="connsiteY1" fmla="*/ 5240866 h 6883400"/>
+              <a:gd name="connsiteX2" fmla="*/ 7340600 w 9203266"/>
+              <a:gd name="connsiteY2" fmla="*/ 6874933 h 6883400"/>
+              <a:gd name="connsiteX3" fmla="*/ 0 w 9203266"/>
+              <a:gd name="connsiteY3" fmla="*/ 6883400 h 6883400"/>
+              <a:gd name="connsiteX4" fmla="*/ 8466 w 9203266"/>
+              <a:gd name="connsiteY4" fmla="*/ 0 h 6883400"/>
+              <a:gd name="connsiteX5" fmla="*/ 9203266 w 9203266"/>
+              <a:gd name="connsiteY5" fmla="*/ 16933 h 6883400"/>
+              <a:gd name="connsiteX0" fmla="*/ 9203266 w 9491133"/>
+              <a:gd name="connsiteY0" fmla="*/ 16933 h 6883400"/>
+              <a:gd name="connsiteX1" fmla="*/ 8339666 w 9491133"/>
+              <a:gd name="connsiteY1" fmla="*/ 5240866 h 6883400"/>
+              <a:gd name="connsiteX2" fmla="*/ 9491133 w 9491133"/>
+              <a:gd name="connsiteY2" fmla="*/ 6883400 h 6883400"/>
+              <a:gd name="connsiteX3" fmla="*/ 0 w 9491133"/>
+              <a:gd name="connsiteY3" fmla="*/ 6883400 h 6883400"/>
+              <a:gd name="connsiteX4" fmla="*/ 8466 w 9491133"/>
+              <a:gd name="connsiteY4" fmla="*/ 0 h 6883400"/>
+              <a:gd name="connsiteX5" fmla="*/ 9203266 w 9491133"/>
+              <a:gd name="connsiteY5" fmla="*/ 16933 h 6883400"/>
+            </a:gdLst>
+            <a:ahLst/>
+            <a:cxnLst>
+              <a:cxn ang="0">
+                <a:pos x="connsiteX0" y="connsiteY0"/>
+              </a:cxn>
+              <a:cxn ang="0">
+                <a:pos x="connsiteX1" y="connsiteY1"/>
+              </a:cxn>
+              <a:cxn ang="0">
+                <a:pos x="connsiteX2" y="connsiteY2"/>
+              </a:cxn>
+              <a:cxn ang="0">
+                <a:pos x="connsiteX3" y="connsiteY3"/>
+              </a:cxn>
+              <a:cxn ang="0">
+                <a:pos x="connsiteX4" y="connsiteY4"/>
+              </a:cxn>
+              <a:cxn ang="0">
+                <a:pos x="connsiteX5" y="connsiteY5"/>
+              </a:cxn>
+            </a:cxnLst>
+            <a:rect l="l" t="t" r="r" b="b"/>
+            <a:pathLst>
+              <a:path w="9491133" h="6883400">
+                <a:moveTo>
+                  <a:pt x="9203266" y="16933"/>
+                </a:moveTo>
+                <a:lnTo>
+                  <a:pt x="8339666" y="5240866"/>
+                </a:lnTo>
+                <a:lnTo>
+                  <a:pt x="9491133" y="6883400"/>
+                </a:lnTo>
+                <a:lnTo>
+                  <a:pt x="0" y="6883400"/>
+                </a:lnTo>
+                <a:lnTo>
+                  <a:pt x="8466" y="0"/>
+                </a:lnTo>
+                <a:lnTo>
+                  <a:pt x="9203266" y="16933"/>
+                </a:lnTo>
+                <a:close/>
+              </a:path>
+            </a:pathLst>
+          </a:custGeom>
+          <a:solidFill>
+            <a:schemeClr val="tx1">
+              <a:lumMod val="95000"/>
+              <a:lumOff val="5000"/>
+              <a:alpha val="80000"/>
+            </a:schemeClr>
+          </a:solidFill>
+          <a:ln>
+            <a:noFill/>
+          </a:ln>
+          <a:effectLst/>
+        </p:spPr>
+        <p:style>
+          <a:lnRef idx="1">
+            <a:schemeClr val="accent1"/>
+          </a:lnRef>
+          <a:fillRef idx="3">
+            <a:schemeClr val="accent1"/>
+          </a:fillRef>
+          <a:effectRef idx="2">
+            <a:schemeClr val="accent1"/>
+          </a:effectRef>
+          <a:fontRef idx="minor">
+            <a:schemeClr val="lt1"/>
+          </a:fontRef>
+        </p:style>
+        <p:txBody>
+          <a:bodyPr rtlCol="0" anchor="ctr"/>
+          <a:lstStyle/>
+          <a:p>
+            <a:pPr algn="ctr"/>
+            <a:endParaRPr lang="en-US"/>
+          </a:p>
+        </p:txBody>
+      </p:sp>
+      <p:sp>
+        <p:nvSpPr>
+          <p:cNvPr id="2" name="Title 1">
+            <a:extLst>
+              <a:ext uri="{FF2B5EF4-FFF2-40B4-BE49-F238E27FC236}">
+                <a16:creationId xmlns:a16="http://schemas.microsoft.com/office/drawing/2014/main" id="{2D250286-323D-4722-AAC9-A3BB6AFFB474}"/>
+              </a:ext>
+            </a:extLst>
+          </p:cNvPr>
+          <p:cNvSpPr>
+            <a:spLocks noGrp="1"/>
+          </p:cNvSpPr>
+          <p:nvPr>
+            <p:ph type="title"/>
+          </p:nvPr>
+        </p:nvSpPr>
+        <p:spPr>
+          <a:xfrm>
+            <a:off x="703261" y="355605"/>
+            <a:ext cx="7391400" cy="1176867"/>
+          </a:xfrm>
+        </p:spPr>
+        <p:txBody>
+          <a:bodyPr vert="horz" lIns="91440" tIns="45720" rIns="91440" bIns="45720" rtlCol="0" anchor="ctr">
+            <a:normAutofit/>
+          </a:bodyPr>
+          <a:lstStyle/>
+          <a:p>
+            <a:r>
+              <a:rPr lang="en-US" sz="4800" b="1" dirty="0">
+                <a:solidFill>
+                  <a:schemeClr val="bg1"/>
+                </a:solidFill>
+              </a:rPr>
+              <a:t>Encoding Scenario </a:t>
+            </a:r>
+          </a:p>
+        </p:txBody>
+      </p:sp>
+      <p:sp>
+        <p:nvSpPr>
+          <p:cNvPr id="4" name="TextBox 3">
+            <a:extLst>
+              <a:ext uri="{FF2B5EF4-FFF2-40B4-BE49-F238E27FC236}">
+                <a16:creationId xmlns:a16="http://schemas.microsoft.com/office/drawing/2014/main" id="{1189DDB6-63E8-450B-B66A-C182EE22F5D0}"/>
+              </a:ext>
+            </a:extLst>
+          </p:cNvPr>
+          <p:cNvSpPr txBox="1"/>
+          <p:nvPr/>
+        </p:nvSpPr>
+        <p:spPr>
+          <a:xfrm>
+            <a:off x="273133" y="1888067"/>
+            <a:ext cx="7804068" cy="3970866"/>
+          </a:xfrm>
+          <a:prstGeom prst="rect">
+            <a:avLst/>
+          </a:prstGeom>
+        </p:spPr>
+        <p:txBody>
+          <a:bodyPr rot="0" spcFirstLastPara="0" vertOverflow="overflow" horzOverflow="overflow" vert="horz" lIns="91440" tIns="45720" rIns="91440" bIns="45720" numCol="1" spcCol="0" rtlCol="0" fromWordArt="0" anchor="ctr" anchorCtr="0" forceAA="0" compatLnSpc="1">
+            <a:prstTxWarp prst="textNoShape">
+              <a:avLst/>
+            </a:prstTxWarp>
+            <a:normAutofit fontScale="77500" lnSpcReduction="20000"/>
+          </a:bodyPr>
+          <a:lstStyle/>
+          <a:p>
+            <a:pPr marL="1028700" lvl="1" indent="-571500" defTabSz="457200">
+              <a:lnSpc>
+                <a:spcPct val="150000"/>
+              </a:lnSpc>
+              <a:spcBef>
+                <a:spcPct val="20000"/>
+              </a:spcBef>
+              <a:spcAft>
+                <a:spcPts val="600"/>
+              </a:spcAft>
+              <a:buClr>
+                <a:schemeClr val="accent1">
+                  <a:lumMod val="75000"/>
+                </a:schemeClr>
+              </a:buClr>
+              <a:buSzPct val="145000"/>
+              <a:buFont typeface="Arial" panose="020B0604020202020204" pitchFamily="34" charset="0"/>
+              <a:buChar char="•"/>
+            </a:pPr>
+            <a:r>
+              <a:rPr lang="en-US" sz="4400" dirty="0">
+                <a:solidFill>
+                  <a:schemeClr val="bg1"/>
+                </a:solidFill>
+              </a:rPr>
+              <a:t>4K video in input, 1080p video output (</a:t>
+            </a:r>
+            <a:r>
+              <a:rPr lang="en-US" sz="4400" b="1" i="1" dirty="0">
+                <a:solidFill>
+                  <a:schemeClr val="bg1"/>
+                </a:solidFill>
+              </a:rPr>
+              <a:t>downscale</a:t>
+            </a:r>
+            <a:r>
+              <a:rPr lang="en-US" sz="4400" dirty="0">
+                <a:solidFill>
+                  <a:schemeClr val="bg1"/>
+                </a:solidFill>
+              </a:rPr>
+              <a:t>)</a:t>
+            </a:r>
+          </a:p>
+          <a:p>
+            <a:pPr marL="1028700" lvl="1" indent="-571500" defTabSz="457200">
+              <a:lnSpc>
+                <a:spcPct val="150000"/>
+              </a:lnSpc>
+              <a:spcBef>
+                <a:spcPct val="20000"/>
+              </a:spcBef>
+              <a:spcAft>
+                <a:spcPts val="600"/>
+              </a:spcAft>
+              <a:buClr>
+                <a:schemeClr val="accent1">
+                  <a:lumMod val="75000"/>
+                </a:schemeClr>
+              </a:buClr>
+              <a:buSzPct val="145000"/>
+              <a:buFont typeface="Arial" panose="020B0604020202020204" pitchFamily="34" charset="0"/>
+              <a:buChar char="•"/>
+            </a:pPr>
+            <a:r>
+              <a:rPr lang="en-US" sz="4400" dirty="0">
+                <a:solidFill>
+                  <a:schemeClr val="bg1"/>
+                </a:solidFill>
+              </a:rPr>
+              <a:t>Different quality inputs, constant output quality (</a:t>
+            </a:r>
+            <a:r>
+              <a:rPr lang="en-US" sz="4400" b="1" i="1" dirty="0">
+                <a:solidFill>
+                  <a:schemeClr val="bg1"/>
+                </a:solidFill>
+              </a:rPr>
+              <a:t>preset=24</a:t>
+            </a:r>
+            <a:r>
+              <a:rPr lang="en-US" sz="4400" dirty="0">
+                <a:solidFill>
+                  <a:schemeClr val="bg1"/>
+                </a:solidFill>
+              </a:rPr>
+              <a:t>)</a:t>
+            </a:r>
+          </a:p>
+          <a:p>
+            <a:pPr marL="1028700" lvl="1" indent="-571500" defTabSz="457200">
+              <a:lnSpc>
+                <a:spcPct val="150000"/>
+              </a:lnSpc>
+              <a:spcBef>
+                <a:spcPct val="20000"/>
+              </a:spcBef>
+              <a:spcAft>
+                <a:spcPts val="600"/>
+              </a:spcAft>
+              <a:buClr>
+                <a:schemeClr val="accent1">
+                  <a:lumMod val="75000"/>
+                </a:schemeClr>
+              </a:buClr>
+              <a:buSzPct val="145000"/>
+              <a:buFont typeface="Arial" panose="020B0604020202020204" pitchFamily="34" charset="0"/>
+              <a:buChar char="•"/>
+            </a:pPr>
+            <a:r>
+              <a:rPr lang="en-US" sz="4400" dirty="0">
+                <a:solidFill>
+                  <a:schemeClr val="bg1"/>
+                </a:solidFill>
+              </a:rPr>
+              <a:t>VP9 input encoding</a:t>
+            </a:r>
+          </a:p>
+        </p:txBody>
+      </p:sp>
+      <p:grpSp>
+        <p:nvGrpSpPr>
+          <p:cNvPr id="70" name="Group 69">
+            <a:extLst>
+              <a:ext uri="{FF2B5EF4-FFF2-40B4-BE49-F238E27FC236}">
+                <a16:creationId xmlns:a16="http://schemas.microsoft.com/office/drawing/2014/main" id="{2C58EF69-4C86-43C8-B9E3-778544933C04}"/>
+              </a:ext>
+              <a:ext uri="{C183D7F6-B498-43B3-948B-1728B52AA6E4}">
+                <adec:decorative xmlns:adec="http://schemas.microsoft.com/office/drawing/2017/decorative" val="1"/>
+              </a:ext>
+            </a:extLst>
+          </p:cNvPr>
+          <p:cNvGrpSpPr>
+            <a:grpSpLocks noGrp="1" noUngrp="1" noRot="1" noChangeAspect="1" noMove="1" noResize="1"/>
+          </p:cNvGrpSpPr>
+          <p:nvPr>
+            <p:extLst>
+              <p:ext uri="{386F3935-93C4-4BCD-93E2-E3B085C9AB24}">
+                <p16:designElem xmlns:p16="http://schemas.microsoft.com/office/powerpoint/2015/main" val="1"/>
+              </p:ext>
+            </p:extLst>
+          </p:nvPr>
+        </p:nvGrpSpPr>
+        <p:grpSpPr>
+          <a:xfrm>
+            <a:off x="8405812" y="0"/>
+            <a:ext cx="2436813" cy="6858001"/>
+            <a:chOff x="1320800" y="0"/>
+            <a:chExt cx="2436813" cy="6858001"/>
+          </a:xfrm>
+        </p:grpSpPr>
+        <p:sp>
+          <p:nvSpPr>
+            <p:cNvPr id="71" name="Freeform 6">
+              <a:extLst>
+                <a:ext uri="{FF2B5EF4-FFF2-40B4-BE49-F238E27FC236}">
+                  <a16:creationId xmlns:a16="http://schemas.microsoft.com/office/drawing/2014/main" id="{28004C51-9993-4F72-9444-208E14F42BCB}"/>
+                </a:ext>
+                <a:ext uri="{C183D7F6-B498-43B3-948B-1728B52AA6E4}">
+                  <adec:decorative xmlns:adec="http://schemas.microsoft.com/office/drawing/2017/decorative" val="1"/>
+                </a:ext>
+              </a:extLst>
+            </p:cNvPr>
+            <p:cNvSpPr/>
+            <p:nvPr>
+              <p:extLst>
+                <p:ext uri="{386F3935-93C4-4BCD-93E2-E3B085C9AB24}">
+                  <p16:designElem xmlns:p16="http://schemas.microsoft.com/office/powerpoint/2015/main" val="1"/>
+                </p:ext>
+              </p:extLst>
+            </p:nvPr>
+          </p:nvSpPr>
+          <p:spPr bwMode="auto">
+            <a:xfrm>
+              <a:off x="1627188" y="0"/>
+              <a:ext cx="1122363" cy="5329238"/>
+            </a:xfrm>
+            <a:custGeom>
+              <a:avLst/>
+              <a:gdLst/>
+              <a:ahLst/>
+              <a:cxnLst/>
+              <a:rect l="0" t="0" r="r" b="b"/>
+              <a:pathLst>
+                <a:path w="707" h="3357">
+                  <a:moveTo>
+                    <a:pt x="0" y="3330"/>
+                  </a:moveTo>
+                  <a:lnTo>
+                    <a:pt x="156" y="3357"/>
+                  </a:lnTo>
+                  <a:lnTo>
+                    <a:pt x="707" y="0"/>
+                  </a:lnTo>
+                  <a:lnTo>
+                    <a:pt x="547" y="0"/>
+                  </a:lnTo>
+                  <a:lnTo>
+                    <a:pt x="0" y="3330"/>
+                  </a:lnTo>
+                  <a:close/>
+                </a:path>
+              </a:pathLst>
+            </a:custGeom>
+            <a:solidFill>
+              <a:schemeClr val="accent1"/>
+            </a:solidFill>
+            <a:ln>
+              <a:noFill/>
+            </a:ln>
+          </p:spPr>
+        </p:sp>
+        <p:sp>
+          <p:nvSpPr>
+            <p:cNvPr id="72" name="Freeform 7">
+              <a:extLst>
+                <a:ext uri="{FF2B5EF4-FFF2-40B4-BE49-F238E27FC236}">
+                  <a16:creationId xmlns:a16="http://schemas.microsoft.com/office/drawing/2014/main" id="{9F45FB11-2D69-4F70-8B60-23B0C6B28578}"/>
+                </a:ext>
+                <a:ext uri="{C183D7F6-B498-43B3-948B-1728B52AA6E4}">
+                  <adec:decorative xmlns:adec="http://schemas.microsoft.com/office/drawing/2017/decorative" val="1"/>
+                </a:ext>
+              </a:extLst>
+            </p:cNvPr>
+            <p:cNvSpPr/>
+            <p:nvPr>
+              <p:extLst>
+                <p:ext uri="{386F3935-93C4-4BCD-93E2-E3B085C9AB24}">
+                  <p16:designElem xmlns:p16="http://schemas.microsoft.com/office/powerpoint/2015/main" val="1"/>
+                </p:ext>
+              </p:extLst>
+            </p:nvPr>
+          </p:nvSpPr>
+          <p:spPr bwMode="auto">
+            <a:xfrm>
+              <a:off x="1320800" y="0"/>
+              <a:ext cx="1117600" cy="5276850"/>
+            </a:xfrm>
+            <a:custGeom>
+              <a:avLst/>
+              <a:gdLst/>
+              <a:ahLst/>
+              <a:cxnLst/>
+              <a:rect l="0" t="0" r="r" b="b"/>
+              <a:pathLst>
+                <a:path w="704" h="3324">
+                  <a:moveTo>
+                    <a:pt x="704" y="0"/>
+                  </a:moveTo>
+                  <a:lnTo>
+                    <a:pt x="545" y="0"/>
+                  </a:lnTo>
+                  <a:lnTo>
+                    <a:pt x="0" y="3300"/>
+                  </a:lnTo>
+                  <a:lnTo>
+                    <a:pt x="157" y="3324"/>
+                  </a:lnTo>
+                  <a:lnTo>
+                    <a:pt x="704" y="0"/>
+                  </a:lnTo>
+                  <a:close/>
+                </a:path>
+              </a:pathLst>
+            </a:custGeom>
+            <a:solidFill>
+              <a:schemeClr val="tx1">
+                <a:lumMod val="65000"/>
+                <a:lumOff val="35000"/>
+              </a:schemeClr>
+            </a:solidFill>
+            <a:ln>
+              <a:noFill/>
+            </a:ln>
+          </p:spPr>
+        </p:sp>
+        <p:sp>
+          <p:nvSpPr>
+            <p:cNvPr id="73" name="Freeform 8">
+              <a:extLst>
+                <a:ext uri="{FF2B5EF4-FFF2-40B4-BE49-F238E27FC236}">
+                  <a16:creationId xmlns:a16="http://schemas.microsoft.com/office/drawing/2014/main" id="{5ABA6996-5C50-49CC-A2C8-F43FD5838CA0}"/>
+                </a:ext>
+                <a:ext uri="{C183D7F6-B498-43B3-948B-1728B52AA6E4}">
+                  <adec:decorative xmlns:adec="http://schemas.microsoft.com/office/drawing/2017/decorative" val="1"/>
+                </a:ext>
+              </a:extLst>
+            </p:cNvPr>
+            <p:cNvSpPr/>
+            <p:nvPr>
+              <p:extLst>
+                <p:ext uri="{386F3935-93C4-4BCD-93E2-E3B085C9AB24}">
+                  <p16:designElem xmlns:p16="http://schemas.microsoft.com/office/powerpoint/2015/main" val="1"/>
+                </p:ext>
+              </p:extLst>
+            </p:nvPr>
+          </p:nvSpPr>
+          <p:spPr bwMode="auto">
+            <a:xfrm>
+              <a:off x="1320800" y="5238750"/>
+              <a:ext cx="1228725" cy="1619250"/>
+            </a:xfrm>
+            <a:custGeom>
+              <a:avLst/>
+              <a:gdLst/>
+              <a:ahLst/>
+              <a:cxnLst/>
+              <a:rect l="0" t="0" r="r" b="b"/>
+              <a:pathLst>
+                <a:path w="774" h="1020">
+                  <a:moveTo>
+                    <a:pt x="0" y="0"/>
+                  </a:moveTo>
+                  <a:lnTo>
+                    <a:pt x="740" y="1020"/>
+                  </a:lnTo>
+                  <a:lnTo>
+                    <a:pt x="774" y="1020"/>
+                  </a:lnTo>
+                  <a:lnTo>
+                    <a:pt x="0" y="0"/>
+                  </a:lnTo>
+                  <a:close/>
+                </a:path>
+              </a:pathLst>
+            </a:custGeom>
+            <a:solidFill>
+              <a:schemeClr val="tx1">
+                <a:lumMod val="85000"/>
+                <a:lumOff val="15000"/>
+              </a:schemeClr>
+            </a:solidFill>
+            <a:ln>
+              <a:noFill/>
+            </a:ln>
+          </p:spPr>
+        </p:sp>
+        <p:sp>
+          <p:nvSpPr>
+            <p:cNvPr id="74" name="Freeform 9">
+              <a:extLst>
+                <a:ext uri="{FF2B5EF4-FFF2-40B4-BE49-F238E27FC236}">
+                  <a16:creationId xmlns:a16="http://schemas.microsoft.com/office/drawing/2014/main" id="{54A0AA5F-216D-445A-8C9D-44B6B48264BF}"/>
+                </a:ext>
+                <a:ext uri="{C183D7F6-B498-43B3-948B-1728B52AA6E4}">
+                  <adec:decorative xmlns:adec="http://schemas.microsoft.com/office/drawing/2017/decorative" val="1"/>
+                </a:ext>
+              </a:extLst>
+            </p:cNvPr>
+            <p:cNvSpPr/>
+            <p:nvPr>
+              <p:extLst>
+                <p:ext uri="{386F3935-93C4-4BCD-93E2-E3B085C9AB24}">
+                  <p16:designElem xmlns:p16="http://schemas.microsoft.com/office/powerpoint/2015/main" val="1"/>
+                </p:ext>
+              </p:extLst>
+            </p:nvPr>
+          </p:nvSpPr>
+          <p:spPr bwMode="auto">
+            <a:xfrm>
+              <a:off x="1627188" y="5291138"/>
+              <a:ext cx="1495425" cy="1566863"/>
+            </a:xfrm>
+            <a:custGeom>
+              <a:avLst/>
+              <a:gdLst/>
+              <a:ahLst/>
+              <a:cxnLst/>
+              <a:rect l="0" t="0" r="r" b="b"/>
+              <a:pathLst>
+                <a:path w="942" h="987">
+                  <a:moveTo>
+                    <a:pt x="0" y="0"/>
+                  </a:moveTo>
+                  <a:lnTo>
+                    <a:pt x="909" y="987"/>
+                  </a:lnTo>
+                  <a:lnTo>
+                    <a:pt x="942" y="987"/>
+                  </a:lnTo>
+                  <a:lnTo>
+                    <a:pt x="0" y="0"/>
+                  </a:lnTo>
+                  <a:close/>
+                </a:path>
+              </a:pathLst>
+            </a:custGeom>
+            <a:solidFill>
+              <a:schemeClr val="accent1">
+                <a:lumMod val="50000"/>
+              </a:schemeClr>
+            </a:solidFill>
+            <a:ln>
+              <a:noFill/>
+            </a:ln>
+          </p:spPr>
+        </p:sp>
+        <p:sp>
+          <p:nvSpPr>
+            <p:cNvPr id="75" name="Freeform 10">
+              <a:extLst>
+                <a:ext uri="{FF2B5EF4-FFF2-40B4-BE49-F238E27FC236}">
+                  <a16:creationId xmlns:a16="http://schemas.microsoft.com/office/drawing/2014/main" id="{7DED650F-020C-4B0D-928D-3B70398376B2}"/>
+                </a:ext>
+                <a:ext uri="{C183D7F6-B498-43B3-948B-1728B52AA6E4}">
+                  <adec:decorative xmlns:adec="http://schemas.microsoft.com/office/drawing/2017/decorative" val="1"/>
+                </a:ext>
+              </a:extLst>
+            </p:cNvPr>
+            <p:cNvSpPr/>
+            <p:nvPr>
+              <p:extLst>
+                <p:ext uri="{386F3935-93C4-4BCD-93E2-E3B085C9AB24}">
+                  <p16:designElem xmlns:p16="http://schemas.microsoft.com/office/powerpoint/2015/main" val="1"/>
+                </p:ext>
+              </p:extLst>
+            </p:nvPr>
+          </p:nvSpPr>
+          <p:spPr bwMode="auto">
+            <a:xfrm>
+              <a:off x="1627188" y="5286375"/>
+              <a:ext cx="2130425" cy="1571625"/>
+            </a:xfrm>
+            <a:custGeom>
+              <a:avLst/>
+              <a:gdLst/>
+              <a:ahLst/>
+              <a:cxnLst/>
+              <a:rect l="0" t="0" r="r" b="b"/>
+              <a:pathLst>
+                <a:path w="1342" h="990">
+                  <a:moveTo>
+                    <a:pt x="0" y="3"/>
+                  </a:moveTo>
+                  <a:lnTo>
+                    <a:pt x="942" y="990"/>
+                  </a:lnTo>
+                  <a:lnTo>
+                    <a:pt x="1342" y="990"/>
+                  </a:lnTo>
+                  <a:lnTo>
+                    <a:pt x="156" y="27"/>
+                  </a:lnTo>
+                  <a:lnTo>
+                    <a:pt x="0" y="0"/>
+                  </a:lnTo>
+                  <a:lnTo>
+                    <a:pt x="0" y="3"/>
+                  </a:lnTo>
+                  <a:close/>
+                </a:path>
+              </a:pathLst>
+            </a:custGeom>
+            <a:solidFill>
+              <a:schemeClr val="accent1">
+                <a:lumMod val="75000"/>
+              </a:schemeClr>
+            </a:solidFill>
+            <a:ln>
+              <a:noFill/>
+            </a:ln>
+          </p:spPr>
+        </p:sp>
+        <p:sp>
+          <p:nvSpPr>
+            <p:cNvPr id="76" name="Freeform 11">
+              <a:extLst>
+                <a:ext uri="{FF2B5EF4-FFF2-40B4-BE49-F238E27FC236}">
+                  <a16:creationId xmlns:a16="http://schemas.microsoft.com/office/drawing/2014/main" id="{B1EE80AC-E4F7-497F-AE0B-96084F03C0A1}"/>
+                </a:ext>
+                <a:ext uri="{C183D7F6-B498-43B3-948B-1728B52AA6E4}">
+                  <adec:decorative xmlns:adec="http://schemas.microsoft.com/office/drawing/2017/decorative" val="1"/>
+                </a:ext>
+              </a:extLst>
+            </p:cNvPr>
+            <p:cNvSpPr/>
+            <p:nvPr>
+              <p:extLst>
+                <p:ext uri="{386F3935-93C4-4BCD-93E2-E3B085C9AB24}">
+                  <p16:designElem xmlns:p16="http://schemas.microsoft.com/office/powerpoint/2015/main" val="1"/>
+                </p:ext>
+              </p:extLst>
+            </p:nvPr>
+          </p:nvSpPr>
+          <p:spPr bwMode="auto">
+            <a:xfrm>
+              <a:off x="1320800" y="5238750"/>
+              <a:ext cx="1695450" cy="1619250"/>
+            </a:xfrm>
+            <a:custGeom>
+              <a:avLst/>
+              <a:gdLst/>
+              <a:ahLst/>
+              <a:cxnLst/>
+              <a:rect l="0" t="0" r="r" b="b"/>
+              <a:pathLst>
+                <a:path w="1068" h="1020">
+                  <a:moveTo>
+                    <a:pt x="1068" y="1020"/>
+                  </a:moveTo>
+                  <a:lnTo>
+                    <a:pt x="184" y="60"/>
+                  </a:lnTo>
+                  <a:lnTo>
+                    <a:pt x="154" y="27"/>
+                  </a:lnTo>
+                  <a:lnTo>
+                    <a:pt x="157" y="27"/>
+                  </a:lnTo>
+                  <a:lnTo>
+                    <a:pt x="157" y="24"/>
+                  </a:lnTo>
+                  <a:lnTo>
+                    <a:pt x="154" y="24"/>
+                  </a:lnTo>
+                  <a:lnTo>
+                    <a:pt x="0" y="0"/>
+                  </a:lnTo>
+                  <a:lnTo>
+                    <a:pt x="0" y="0"/>
+                  </a:lnTo>
+                  <a:lnTo>
+                    <a:pt x="774" y="1020"/>
+                  </a:lnTo>
+                  <a:lnTo>
+                    <a:pt x="1068" y="1020"/>
+                  </a:lnTo>
+                  <a:close/>
+                </a:path>
+              </a:pathLst>
+            </a:custGeom>
+            <a:solidFill>
+              <a:schemeClr val="tx1">
+                <a:lumMod val="75000"/>
+                <a:lumOff val="25000"/>
+              </a:schemeClr>
+            </a:solidFill>
+            <a:ln>
+              <a:noFill/>
+            </a:ln>
+          </p:spPr>
+        </p:sp>
+      </p:grpSp>
+    </p:spTree>
+    <p:extLst>
+      <p:ext uri="{BB962C8B-B14F-4D97-AF65-F5344CB8AC3E}">
+        <p14:creationId xmlns:p14="http://schemas.microsoft.com/office/powerpoint/2010/main" val="2119387522"/>
+      </p:ext>
+    </p:extLst>
+  </p:cSld>
+  <p:clrMapOvr>
+    <a:masterClrMapping/>
+  </p:clrMapOvr>
+</p:sld>
+</file>
+
+<file path=ppt/slides/slide9.xml><?xml version="1.0" encoding="utf-8"?>
+<p:sld xmlns:a="http://schemas.openxmlformats.org/drawingml/2006/main" xmlns:r="http://schemas.openxmlformats.org/officeDocument/2006/relationships" xmlns:p="http://schemas.openxmlformats.org/presentationml/2006/main">
+  <p:cSld>
+    <p:bg>
+      <p:bgPr>
+        <a:solidFill>
+          <a:schemeClr val="bg2"/>
+        </a:solidFill>
+        <a:effectLst/>
+      </p:bgPr>
+    </p:bg>
+    <p:spTree>
+      <p:nvGrpSpPr>
+        <p:cNvPr id="1" name=""/>
+        <p:cNvGrpSpPr/>
+        <p:nvPr/>
+      </p:nvGrpSpPr>
+      <p:grpSpPr>
+        <a:xfrm>
+          <a:off x="0" y="0"/>
+          <a:ext cx="0" cy="0"/>
+          <a:chOff x="0" y="0"/>
+          <a:chExt cx="0" cy="0"/>
+        </a:xfrm>
+      </p:grpSpPr>
+      <p:sp useBgFill="1">
+        <p:nvSpPr>
+          <p:cNvPr id="119" name="Rectangle 106">
+            <a:extLst>
+              <a:ext uri="{FF2B5EF4-FFF2-40B4-BE49-F238E27FC236}">
+                <a16:creationId xmlns:a16="http://schemas.microsoft.com/office/drawing/2014/main" id="{2FCD9B94-D70B-4446-85E5-ACD3904289CB}"/>
+              </a:ext>
+              <a:ext uri="{C183D7F6-B498-43B3-948B-1728B52AA6E4}">
+                <adec:decorative xmlns:adec="http://schemas.microsoft.com/office/drawing/2017/decorative" val="1"/>
+              </a:ext>
+            </a:extLst>
+          </p:cNvPr>
+          <p:cNvSpPr>
+            <a:spLocks noGrp="1" noRot="1" noChangeAspect="1" noMove="1" noResize="1" noEditPoints="1" noAdjustHandles="1" noChangeArrowheads="1" noChangeShapeType="1" noTextEdit="1"/>
+          </p:cNvSpPr>
+          <p:nvPr>
+            <p:extLst>
+              <p:ext uri="{386F3935-93C4-4BCD-93E2-E3B085C9AB24}">
+                <p16:designElem xmlns:p16="http://schemas.microsoft.com/office/powerpoint/2015/main" val="1"/>
+              </p:ext>
+            </p:extLst>
+          </p:nvPr>
+        </p:nvSpPr>
+        <p:spPr>
+          <a:xfrm>
+            <a:off x="0" y="0"/>
+            <a:ext cx="12192000" cy="6858000"/>
+          </a:xfrm>
+          <a:prstGeom prst="rect">
+            <a:avLst/>
+          </a:prstGeom>
+          <a:ln>
+            <a:noFill/>
+          </a:ln>
+        </p:spPr>
+        <p:style>
+          <a:lnRef idx="2">
+            <a:schemeClr val="accent1">
+              <a:shade val="50000"/>
+            </a:schemeClr>
+          </a:lnRef>
+          <a:fillRef idx="1">
+            <a:schemeClr val="accent1"/>
+          </a:fillRef>
+          <a:effectRef idx="0">
+            <a:schemeClr val="accent1"/>
+          </a:effectRef>
+          <a:fontRef idx="minor">
+            <a:schemeClr val="lt1"/>
+          </a:fontRef>
+        </p:style>
+        <p:txBody>
+          <a:bodyPr rtlCol="0" anchor="ctr"/>
+          <a:lstStyle/>
+          <a:p>
+            <a:pPr algn="ctr"/>
+            <a:endParaRPr lang="en-US"/>
+          </a:p>
+        </p:txBody>
+      </p:sp>
+      <p:pic>
+        <p:nvPicPr>
+          <p:cNvPr id="14" name="Picture 4" descr="Camera lens">
+            <a:extLst>
+              <a:ext uri="{FF2B5EF4-FFF2-40B4-BE49-F238E27FC236}">
+                <a16:creationId xmlns:a16="http://schemas.microsoft.com/office/drawing/2014/main" id="{EE8FE827-DE07-41C9-AA7C-8D1548D8487B}"/>
+              </a:ext>
+            </a:extLst>
+          </p:cNvPr>
+          <p:cNvPicPr>
+            <a:picLocks noChangeAspect="1"/>
+          </p:cNvPicPr>
+          <p:nvPr/>
+        </p:nvPicPr>
+        <p:blipFill rotWithShape="1">
+          <a:blip r:embed="rId2">
+            <a:duotone>
+              <a:schemeClr val="bg2">
+                <a:shade val="45000"/>
+                <a:satMod val="135000"/>
+              </a:schemeClr>
+              <a:prstClr val="white"/>
+            </a:duotone>
+            <a:alphaModFix amt="25000"/>
+          </a:blip>
+          <a:srcRect t="5457" b="10273"/>
+          <a:stretch/>
+        </p:blipFill>
+        <p:spPr>
+          <a:xfrm>
+            <a:off x="20" y="0"/>
+            <a:ext cx="12191980" cy="6857990"/>
+          </a:xfrm>
+          <a:prstGeom prst="rect">
+            <a:avLst/>
+          </a:prstGeom>
+        </p:spPr>
+      </p:pic>
+      <p:sp>
+        <p:nvSpPr>
+          <p:cNvPr id="2" name="Title 1">
+            <a:extLst>
+              <a:ext uri="{FF2B5EF4-FFF2-40B4-BE49-F238E27FC236}">
+                <a16:creationId xmlns:a16="http://schemas.microsoft.com/office/drawing/2014/main" id="{2D250286-323D-4722-AAC9-A3BB6AFFB474}"/>
+              </a:ext>
+            </a:extLst>
+          </p:cNvPr>
+          <p:cNvSpPr>
+            <a:spLocks noGrp="1"/>
+          </p:cNvSpPr>
+          <p:nvPr>
+            <p:ph type="title"/>
+          </p:nvPr>
+        </p:nvSpPr>
+        <p:spPr>
+          <a:xfrm>
+            <a:off x="412583" y="766099"/>
+            <a:ext cx="3647493" cy="4965833"/>
+          </a:xfrm>
+        </p:spPr>
+        <p:txBody>
+          <a:bodyPr vert="horz" lIns="91440" tIns="45720" rIns="91440" bIns="45720" rtlCol="0" anchor="ctr">
+            <a:normAutofit/>
+          </a:bodyPr>
+          <a:lstStyle/>
+          <a:p>
+            <a:pPr algn="r"/>
+            <a:r>
+              <a:rPr lang="en-US" b="1" dirty="0"/>
+              <a:t>5 different Movies Benchmarks</a:t>
+            </a:r>
+          </a:p>
+        </p:txBody>
+      </p:sp>
+      <p:cxnSp>
+        <p:nvCxnSpPr>
+          <p:cNvPr id="120" name="Straight Connector 108">
+            <a:extLst>
+              <a:ext uri="{FF2B5EF4-FFF2-40B4-BE49-F238E27FC236}">
+                <a16:creationId xmlns:a16="http://schemas.microsoft.com/office/drawing/2014/main" id="{3378FF8B-3743-48E1-88E3-F4CADB3DECE5}"/>
+              </a:ext>
+              <a:ext uri="{C183D7F6-B498-43B3-948B-1728B52AA6E4}">
+                <adec:decorative xmlns:adec="http://schemas.microsoft.com/office/drawing/2017/decorative" val="1"/>
+              </a:ext>
+            </a:extLst>
+          </p:cNvPr>
+          <p:cNvCxnSpPr>
+            <a:cxnSpLocks noGrp="1" noRot="1" noChangeAspect="1" noMove="1" noResize="1" noEditPoints="1" noAdjustHandles="1" noChangeArrowheads="1" noChangeShapeType="1"/>
+          </p:cNvCxnSpPr>
+          <p:nvPr>
+            <p:extLst>
+              <p:ext uri="{386F3935-93C4-4BCD-93E2-E3B085C9AB24}">
+                <p16:designElem xmlns:p16="http://schemas.microsoft.com/office/powerpoint/2015/main" val="1"/>
+              </p:ext>
+            </p:extLst>
+          </p:nvPr>
+        </p:nvCxnSpPr>
+        <p:spPr>
+          <a:xfrm>
+            <a:off x="4654296" y="1406171"/>
+            <a:ext cx="0" cy="3431689"/>
+          </a:xfrm>
+          <a:prstGeom prst="line">
+            <a:avLst/>
+          </a:prstGeom>
+          <a:ln w="19050">
+            <a:solidFill>
+              <a:schemeClr val="accent1"/>
+            </a:solidFill>
+          </a:ln>
+        </p:spPr>
+        <p:style>
+          <a:lnRef idx="1">
+            <a:schemeClr val="accent1"/>
+          </a:lnRef>
+          <a:fillRef idx="0">
+            <a:schemeClr val="accent1"/>
+          </a:fillRef>
+          <a:effectRef idx="0">
+            <a:schemeClr val="accent1"/>
+          </a:effectRef>
+          <a:fontRef idx="minor">
+            <a:schemeClr val="tx1"/>
+          </a:fontRef>
+        </p:style>
+      </p:cxnSp>
+      <p:sp>
+        <p:nvSpPr>
+          <p:cNvPr id="4" name="TextBox 3">
+            <a:extLst>
+              <a:ext uri="{FF2B5EF4-FFF2-40B4-BE49-F238E27FC236}">
+                <a16:creationId xmlns:a16="http://schemas.microsoft.com/office/drawing/2014/main" id="{1189DDB6-63E8-450B-B66A-C182EE22F5D0}"/>
+              </a:ext>
+            </a:extLst>
+          </p:cNvPr>
+          <p:cNvSpPr txBox="1"/>
+          <p:nvPr/>
+        </p:nvSpPr>
+        <p:spPr>
+          <a:xfrm>
+            <a:off x="4472639" y="946078"/>
+            <a:ext cx="7537683" cy="4965833"/>
+          </a:xfrm>
+          <a:prstGeom prst="rect">
+            <a:avLst/>
+          </a:prstGeom>
+        </p:spPr>
+        <p:txBody>
+          <a:bodyPr rot="0" spcFirstLastPara="0" vertOverflow="overflow" horzOverflow="overflow" vert="horz" lIns="91440" tIns="45720" rIns="91440" bIns="45720" numCol="1" spcCol="0" rtlCol="0" fromWordArt="0" anchor="ctr" anchorCtr="0" forceAA="0" compatLnSpc="1">
+            <a:prstTxWarp prst="textNoShape">
+              <a:avLst/>
+            </a:prstTxWarp>
+            <a:normAutofit/>
+          </a:bodyPr>
+          <a:lstStyle/>
+          <a:p>
+            <a:pPr marL="1028700" lvl="1" indent="-571500" defTabSz="457200">
+              <a:lnSpc>
+                <a:spcPct val="150000"/>
+              </a:lnSpc>
+              <a:spcBef>
+                <a:spcPct val="20000"/>
+              </a:spcBef>
+              <a:spcAft>
+                <a:spcPts val="600"/>
+              </a:spcAft>
+              <a:buClr>
+                <a:schemeClr val="accent1">
+                  <a:lumMod val="75000"/>
+                </a:schemeClr>
+              </a:buClr>
+              <a:buSzPct val="145000"/>
+              <a:buFont typeface="Arial"/>
+              <a:buChar char="•"/>
+            </a:pPr>
+            <a:r>
+              <a:rPr lang="en-US" sz="2400" dirty="0">
+                <a:latin typeface="Abadi" panose="020B0604020202020204" pitchFamily="34" charset="0"/>
+              </a:rPr>
+              <a:t>NBA Highlights, 4:41, 30fps, 521.6MB</a:t>
+            </a:r>
+          </a:p>
+          <a:p>
+            <a:pPr marL="1028700" lvl="1" indent="-571500" defTabSz="457200">
+              <a:lnSpc>
+                <a:spcPct val="150000"/>
+              </a:lnSpc>
+              <a:spcBef>
+                <a:spcPct val="20000"/>
+              </a:spcBef>
+              <a:spcAft>
+                <a:spcPts val="600"/>
+              </a:spcAft>
+              <a:buClr>
+                <a:schemeClr val="accent1">
+                  <a:lumMod val="75000"/>
+                </a:schemeClr>
+              </a:buClr>
+              <a:buSzPct val="145000"/>
+              <a:buFont typeface="Arial"/>
+              <a:buChar char="•"/>
+            </a:pPr>
+            <a:r>
+              <a:rPr lang="en-US" sz="2400" dirty="0">
+                <a:latin typeface="Abadi" panose="020B0604020202020204" pitchFamily="34" charset="0"/>
+              </a:rPr>
+              <a:t>New </a:t>
+            </a:r>
+            <a:r>
+              <a:rPr lang="en-US" sz="2400" dirty="0" err="1">
+                <a:latin typeface="Abadi" panose="020B0604020202020204" pitchFamily="34" charset="0"/>
+              </a:rPr>
+              <a:t>Zeland</a:t>
+            </a:r>
+            <a:r>
+              <a:rPr lang="en-US" sz="2400" dirty="0">
+                <a:latin typeface="Abadi" panose="020B0604020202020204" pitchFamily="34" charset="0"/>
+              </a:rPr>
+              <a:t> landscapes, 4:26, 25fps, 529.4MB</a:t>
+            </a:r>
+          </a:p>
+          <a:p>
+            <a:pPr marL="1028700" lvl="1" indent="-571500" defTabSz="457200">
+              <a:lnSpc>
+                <a:spcPct val="150000"/>
+              </a:lnSpc>
+              <a:spcBef>
+                <a:spcPct val="20000"/>
+              </a:spcBef>
+              <a:spcAft>
+                <a:spcPts val="600"/>
+              </a:spcAft>
+              <a:buClr>
+                <a:schemeClr val="accent1">
+                  <a:lumMod val="75000"/>
+                </a:schemeClr>
+              </a:buClr>
+              <a:buSzPct val="145000"/>
+              <a:buFont typeface="Arial"/>
+              <a:buChar char="•"/>
+            </a:pPr>
+            <a:r>
+              <a:rPr lang="en-US" sz="2400" dirty="0">
+                <a:latin typeface="Abadi" panose="020B0604020202020204" pitchFamily="34" charset="0"/>
+              </a:rPr>
+              <a:t>Costa Rica documentary (HDR),5:13, 60fps, 1GB</a:t>
+            </a:r>
+          </a:p>
+          <a:p>
+            <a:pPr marL="1028700" lvl="1" indent="-571500" defTabSz="457200">
+              <a:lnSpc>
+                <a:spcPct val="150000"/>
+              </a:lnSpc>
+              <a:spcBef>
+                <a:spcPct val="20000"/>
+              </a:spcBef>
+              <a:spcAft>
+                <a:spcPts val="600"/>
+              </a:spcAft>
+              <a:buClr>
+                <a:schemeClr val="accent1">
+                  <a:lumMod val="75000"/>
+                </a:schemeClr>
+              </a:buClr>
+              <a:buSzPct val="145000"/>
+              <a:buFont typeface="Arial"/>
+              <a:buChar char="•"/>
+            </a:pPr>
+            <a:r>
+              <a:rPr lang="en-US" sz="2400" dirty="0">
+                <a:latin typeface="Abadi" panose="020B0604020202020204" pitchFamily="34" charset="0"/>
+              </a:rPr>
+              <a:t>Pixar’s Film trailer, 6:05, 60fps, 951.8MB</a:t>
+            </a:r>
+          </a:p>
+          <a:p>
+            <a:pPr marL="1028700" lvl="1" indent="-571500" defTabSz="457200">
+              <a:lnSpc>
+                <a:spcPct val="150000"/>
+              </a:lnSpc>
+              <a:spcBef>
+                <a:spcPct val="20000"/>
+              </a:spcBef>
+              <a:spcAft>
+                <a:spcPts val="600"/>
+              </a:spcAft>
+              <a:buClr>
+                <a:schemeClr val="accent1">
+                  <a:lumMod val="75000"/>
+                </a:schemeClr>
+              </a:buClr>
+              <a:buSzPct val="145000"/>
+              <a:buFont typeface="Arial"/>
+              <a:buChar char="•"/>
+            </a:pPr>
+            <a:r>
+              <a:rPr lang="en-US" sz="2400" dirty="0">
+                <a:latin typeface="Abadi" panose="020B0604020202020204" pitchFamily="34" charset="0"/>
+              </a:rPr>
+              <a:t>Action Film Scene, 4:54, 23fps, 441.2MB</a:t>
+            </a:r>
+          </a:p>
+          <a:p>
+            <a:pPr marL="1028700" lvl="1" indent="-571500" defTabSz="457200">
+              <a:spcBef>
+                <a:spcPct val="20000"/>
+              </a:spcBef>
+              <a:spcAft>
+                <a:spcPts val="600"/>
+              </a:spcAft>
+              <a:buClr>
+                <a:schemeClr val="accent1">
+                  <a:lumMod val="75000"/>
+                </a:schemeClr>
+              </a:buClr>
+              <a:buSzPct val="145000"/>
+              <a:buFont typeface="Arial"/>
+              <a:buChar char="•"/>
+            </a:pPr>
+            <a:endParaRPr lang="en-US" sz="2000" dirty="0">
+              <a:latin typeface="Abadi" panose="020B0604020202020204" pitchFamily="34" charset="0"/>
+            </a:endParaRPr>
+          </a:p>
+        </p:txBody>
+      </p:sp>
+    </p:spTree>
+    <p:extLst>
+      <p:ext uri="{BB962C8B-B14F-4D97-AF65-F5344CB8AC3E}">
+        <p14:creationId xmlns:p14="http://schemas.microsoft.com/office/powerpoint/2010/main" val="740846002"/>
+      </p:ext>
+    </p:extLst>
+  </p:cSld>
+  <p:clrMapOvr>
+    <a:overrideClrMapping bg1="dk1" tx1="lt1" bg2="dk2" tx2="lt2" accent1="accent1" accent2="accent2" accent3="accent3" accent4="accent4" accent5="accent5" accent6="accent6" hlink="hlink" folHlink="folHlink"/>
   </p:clrMapOvr>
 </p:sld>
 </file>

</xml_diff>

<commit_message>
added new consideration to presentaion and graphic improvemets
</commit_message>
<xml_diff>
--- a/presentation.pptx
+++ b/presentation.pptx
@@ -24,6 +24,8 @@
     <p:sldId id="276" r:id="rId18"/>
     <p:sldId id="277" r:id="rId19"/>
     <p:sldId id="278" r:id="rId20"/>
+    <p:sldId id="279" r:id="rId21"/>
+    <p:sldId id="280" r:id="rId22"/>
   </p:sldIdLst>
   <p:sldSz cx="12192000" cy="6858000"/>
   <p:notesSz cx="6858000" cy="9144000"/>
@@ -203,7 +205,7 @@
               <a:solidFill>
                 <a:schemeClr val="accent1"/>
               </a:solidFill>
-              <a:ln w="9525">
+              <a:ln w="63500">
                 <a:solidFill>
                   <a:schemeClr val="accent1"/>
                 </a:solidFill>
@@ -220,7 +222,7 @@
                 <a:solidFill>
                   <a:schemeClr val="accent1"/>
                 </a:solidFill>
-                <a:ln w="9525">
+                <a:ln w="63500">
                   <a:solidFill>
                     <a:schemeClr val="accent1"/>
                   </a:solidFill>
@@ -329,7 +331,7 @@
               <a:solidFill>
                 <a:schemeClr val="accent2"/>
               </a:solidFill>
-              <a:ln w="9525">
+              <a:ln w="63500">
                 <a:solidFill>
                   <a:schemeClr val="accent2"/>
                 </a:solidFill>
@@ -346,7 +348,7 @@
                 <a:solidFill>
                   <a:schemeClr val="accent2"/>
                 </a:solidFill>
-                <a:ln w="9525">
+                <a:ln w="63500">
                   <a:solidFill>
                     <a:schemeClr val="accent2"/>
                   </a:solidFill>
@@ -453,11 +455,11 @@
             <c:size val="5"/>
             <c:spPr>
               <a:solidFill>
-                <a:schemeClr val="accent3"/>
+                <a:srgbClr val="FFFF00"/>
               </a:solidFill>
-              <a:ln w="9525">
+              <a:ln w="63500">
                 <a:solidFill>
-                  <a:schemeClr val="accent3"/>
+                  <a:srgbClr val="FFFF00"/>
                 </a:solidFill>
               </a:ln>
               <a:effectLst/>
@@ -470,11 +472,11 @@
               <c:size val="5"/>
               <c:spPr>
                 <a:solidFill>
-                  <a:schemeClr val="accent3"/>
+                  <a:srgbClr val="FFFF00"/>
                 </a:solidFill>
-                <a:ln w="9525">
+                <a:ln w="63500">
                   <a:solidFill>
-                    <a:schemeClr val="accent3"/>
+                    <a:srgbClr val="FFFF00"/>
                   </a:solidFill>
                 </a:ln>
                 <a:effectLst/>
@@ -579,11 +581,11 @@
             <c:size val="5"/>
             <c:spPr>
               <a:solidFill>
-                <a:schemeClr val="accent4"/>
+                <a:srgbClr val="7030A0"/>
               </a:solidFill>
-              <a:ln w="9525">
+              <a:ln w="63500">
                 <a:solidFill>
-                  <a:schemeClr val="accent4"/>
+                  <a:srgbClr val="7030A0"/>
                 </a:solidFill>
               </a:ln>
               <a:effectLst/>
@@ -596,11 +598,11 @@
               <c:size val="5"/>
               <c:spPr>
                 <a:solidFill>
-                  <a:schemeClr val="accent4"/>
+                  <a:srgbClr val="7030A0"/>
                 </a:solidFill>
-                <a:ln w="9525">
+                <a:ln w="63500">
                   <a:solidFill>
-                    <a:schemeClr val="accent4"/>
+                    <a:srgbClr val="7030A0"/>
                   </a:solidFill>
                 </a:ln>
                 <a:effectLst/>
@@ -707,7 +709,7 @@
               <a:solidFill>
                 <a:schemeClr val="accent5"/>
               </a:solidFill>
-              <a:ln w="9525">
+              <a:ln w="63500">
                 <a:solidFill>
                   <a:schemeClr val="accent5"/>
                 </a:solidFill>
@@ -724,7 +726,7 @@
                 <a:solidFill>
                   <a:schemeClr val="accent5"/>
                 </a:solidFill>
-                <a:ln w="9525">
+                <a:ln w="63500">
                   <a:solidFill>
                     <a:schemeClr val="accent5"/>
                   </a:solidFill>
@@ -917,7 +919,7 @@
           <a:lstStyle/>
           <a:p>
             <a:pPr>
-              <a:defRPr sz="1100" b="0" i="0" u="none" strike="noStrike" kern="1200" baseline="0">
+              <a:defRPr sz="1500" b="0" i="0" u="none" strike="noStrike" kern="1200" baseline="0">
                 <a:solidFill>
                   <a:schemeClr val="tx1">
                     <a:lumMod val="65000"/>
@@ -980,8 +982,20 @@
                   </a:defRPr>
                 </a:pPr>
                 <a:r>
-                  <a:rPr lang="it-IT"/>
-                  <a:t>Encoding time</a:t>
+                  <a:rPr lang="it-IT" sz="2000" dirty="0" err="1"/>
+                  <a:t>Normalized</a:t>
+                </a:r>
+                <a:r>
+                  <a:rPr lang="it-IT" sz="2000" baseline="0" dirty="0"/>
+                  <a:t> </a:t>
+                </a:r>
+                <a:r>
+                  <a:rPr lang="it-IT" sz="2000" dirty="0" err="1"/>
+                  <a:t>Encoding</a:t>
+                </a:r>
+                <a:r>
+                  <a:rPr lang="it-IT" sz="2000" dirty="0"/>
+                  <a:t> time</a:t>
                 </a:r>
               </a:p>
             </c:rich>
@@ -1015,7 +1029,7 @@
             </a:p>
           </c:txPr>
         </c:title>
-        <c:numFmt formatCode="0.00%" sourceLinked="1"/>
+        <c:numFmt formatCode="General" sourceLinked="0"/>
         <c:majorTickMark val="none"/>
         <c:minorTickMark val="none"/>
         <c:tickLblPos val="nextTo"/>
@@ -1037,7 +1051,7 @@
           <a:lstStyle/>
           <a:p>
             <a:pPr>
-              <a:defRPr sz="1100" b="0" i="0" u="none" strike="noStrike" kern="1200" baseline="0">
+              <a:defRPr sz="1500" b="0" i="0" u="none" strike="noStrike" kern="1200" baseline="0">
                 <a:solidFill>
                   <a:schemeClr val="tx1">
                     <a:lumMod val="65000"/>
@@ -1079,7 +1093,7 @@
         <a:lstStyle/>
         <a:p>
           <a:pPr>
-            <a:defRPr sz="1100" b="0" i="0" u="none" strike="noStrike" kern="1200" baseline="0">
+            <a:defRPr sz="1500" b="0" i="0" u="none" strike="noStrike" kern="1200" baseline="0">
               <a:solidFill>
                 <a:schemeClr val="tx1">
                   <a:lumMod val="65000"/>
@@ -1182,7 +1196,7 @@
               <a:solidFill>
                 <a:schemeClr val="accent1"/>
               </a:solidFill>
-              <a:ln w="9525">
+              <a:ln w="63500">
                 <a:solidFill>
                   <a:schemeClr val="accent1"/>
                 </a:solidFill>
@@ -1199,7 +1213,7 @@
                 <a:solidFill>
                   <a:schemeClr val="accent1"/>
                 </a:solidFill>
-                <a:ln w="9525">
+                <a:ln w="63500">
                   <a:solidFill>
                     <a:schemeClr val="accent1"/>
                   </a:solidFill>
@@ -1223,7 +1237,7 @@
                 <a:solidFill>
                   <a:schemeClr val="accent1"/>
                 </a:solidFill>
-                <a:ln w="9525">
+                <a:ln w="63500">
                   <a:solidFill>
                     <a:schemeClr val="accent1"/>
                   </a:solidFill>
@@ -1247,7 +1261,7 @@
                 <a:solidFill>
                   <a:schemeClr val="accent1"/>
                 </a:solidFill>
-                <a:ln w="9525">
+                <a:ln w="63500">
                   <a:solidFill>
                     <a:schemeClr val="accent1"/>
                   </a:solidFill>
@@ -1271,7 +1285,7 @@
                 <a:solidFill>
                   <a:schemeClr val="accent1"/>
                 </a:solidFill>
-                <a:ln w="9525">
+                <a:ln w="63500">
                   <a:solidFill>
                     <a:schemeClr val="accent1"/>
                   </a:solidFill>
@@ -1295,7 +1309,7 @@
                 <a:solidFill>
                   <a:schemeClr val="accent1"/>
                 </a:solidFill>
-                <a:ln w="9525">
+                <a:ln w="63500">
                   <a:solidFill>
                     <a:schemeClr val="accent1"/>
                   </a:solidFill>
@@ -1319,7 +1333,7 @@
                 <a:solidFill>
                   <a:schemeClr val="accent1"/>
                 </a:solidFill>
-                <a:ln w="9525">
+                <a:ln w="63500">
                   <a:solidFill>
                     <a:schemeClr val="accent1"/>
                   </a:solidFill>
@@ -1343,7 +1357,7 @@
                 <a:solidFill>
                   <a:schemeClr val="accent1"/>
                 </a:solidFill>
-                <a:ln w="9525">
+                <a:ln w="63500">
                   <a:solidFill>
                     <a:schemeClr val="accent1"/>
                   </a:solidFill>
@@ -1458,7 +1472,7 @@
               <a:solidFill>
                 <a:schemeClr val="accent2"/>
               </a:solidFill>
-              <a:ln w="9525">
+              <a:ln w="63500">
                 <a:solidFill>
                   <a:schemeClr val="accent2"/>
                 </a:solidFill>
@@ -1475,7 +1489,7 @@
                 <a:solidFill>
                   <a:schemeClr val="accent2"/>
                 </a:solidFill>
-                <a:ln w="9525">
+                <a:ln w="63500">
                   <a:solidFill>
                     <a:schemeClr val="accent2"/>
                   </a:solidFill>
@@ -1588,11 +1602,11 @@
             <c:size val="7"/>
             <c:spPr>
               <a:solidFill>
-                <a:schemeClr val="accent3"/>
+                <a:srgbClr val="FFFF00"/>
               </a:solidFill>
-              <a:ln w="9525">
+              <a:ln w="63500">
                 <a:solidFill>
-                  <a:schemeClr val="accent3"/>
+                  <a:srgbClr val="FFFF00"/>
                 </a:solidFill>
               </a:ln>
               <a:effectLst/>
@@ -1605,11 +1619,11 @@
               <c:size val="7"/>
               <c:spPr>
                 <a:solidFill>
-                  <a:schemeClr val="accent3"/>
+                  <a:srgbClr val="FFFF00"/>
                 </a:solidFill>
-                <a:ln w="9525">
+                <a:ln w="63500">
                   <a:solidFill>
-                    <a:schemeClr val="accent3"/>
+                    <a:srgbClr val="FFFF00"/>
                   </a:solidFill>
                 </a:ln>
                 <a:effectLst/>
@@ -1720,11 +1734,11 @@
             <c:size val="7"/>
             <c:spPr>
               <a:solidFill>
-                <a:schemeClr val="accent4"/>
+                <a:srgbClr val="7030A0"/>
               </a:solidFill>
-              <a:ln w="9525">
+              <a:ln w="63500">
                 <a:solidFill>
-                  <a:schemeClr val="accent4"/>
+                  <a:srgbClr val="7030A0"/>
                 </a:solidFill>
               </a:ln>
               <a:effectLst/>
@@ -1737,11 +1751,11 @@
               <c:size val="7"/>
               <c:spPr>
                 <a:solidFill>
-                  <a:schemeClr val="accent4"/>
+                  <a:srgbClr val="7030A0"/>
                 </a:solidFill>
-                <a:ln w="9525">
+                <a:ln w="63500">
                   <a:solidFill>
-                    <a:schemeClr val="accent4"/>
+                    <a:srgbClr val="7030A0"/>
                   </a:solidFill>
                 </a:ln>
                 <a:effectLst/>
@@ -1854,7 +1868,7 @@
               <a:solidFill>
                 <a:schemeClr val="accent5"/>
               </a:solidFill>
-              <a:ln w="9525">
+              <a:ln w="63500">
                 <a:solidFill>
                   <a:schemeClr val="accent5"/>
                 </a:solidFill>
@@ -1871,7 +1885,7 @@
                 <a:solidFill>
                   <a:schemeClr val="accent5"/>
                 </a:solidFill>
-                <a:ln w="9525">
+                <a:ln w="63500">
                   <a:solidFill>
                     <a:schemeClr val="accent5"/>
                   </a:solidFill>
@@ -1999,7 +2013,7 @@
               <a:lstStyle/>
               <a:p>
                 <a:pPr>
-                  <a:defRPr sz="1100" b="0" i="0" u="none" strike="noStrike" kern="1200" baseline="0">
+                  <a:defRPr sz="2000" b="0" i="0" u="none" strike="noStrike" kern="1200" baseline="0">
                     <a:solidFill>
                       <a:schemeClr val="tx1">
                         <a:lumMod val="65000"/>
@@ -2012,12 +2026,20 @@
                   </a:defRPr>
                 </a:pPr>
                 <a:r>
-                  <a:rPr lang="it-IT"/>
+                  <a:rPr lang="it-IT" sz="2000" b="0" i="0" baseline="0"/>
                   <a:t>Preset</a:t>
                 </a:r>
               </a:p>
             </c:rich>
           </c:tx>
+          <c:layout>
+            <c:manualLayout>
+              <c:xMode val="edge"/>
+              <c:yMode val="edge"/>
+              <c:x val="0.43642554313862719"/>
+              <c:y val="0.93264654286993576"/>
+            </c:manualLayout>
+          </c:layout>
           <c:overlay val="0"/>
           <c:spPr>
             <a:noFill/>
@@ -2031,7 +2053,7 @@
             <a:lstStyle/>
             <a:p>
               <a:pPr>
-                <a:defRPr sz="1100" b="0" i="0" u="none" strike="noStrike" kern="1200" baseline="0">
+                <a:defRPr sz="2000" b="0" i="0" u="none" strike="noStrike" kern="1200" baseline="0">
                   <a:solidFill>
                     <a:schemeClr val="tx1">
                       <a:lumMod val="65000"/>
@@ -2069,7 +2091,7 @@
           <a:lstStyle/>
           <a:p>
             <a:pPr>
-              <a:defRPr sz="1100" b="0" i="0" u="none" strike="noStrike" kern="1200" baseline="0">
+              <a:defRPr sz="1500" b="0" i="0" u="none" strike="noStrike" kern="1200" baseline="0">
                 <a:solidFill>
                   <a:schemeClr val="tx1">
                     <a:lumMod val="65000"/>
@@ -2119,7 +2141,7 @@
               <a:lstStyle/>
               <a:p>
                 <a:pPr>
-                  <a:defRPr sz="1100" b="0" i="0" u="none" strike="noStrike" kern="1200" baseline="0">
+                  <a:defRPr sz="1500" b="0" i="0" u="none" strike="noStrike" kern="1200" baseline="0">
                     <a:solidFill>
                       <a:schemeClr val="tx1">
                         <a:lumMod val="65000"/>
@@ -2151,7 +2173,7 @@
             <a:lstStyle/>
             <a:p>
               <a:pPr>
-                <a:defRPr sz="1100" b="0" i="0" u="none" strike="noStrike" kern="1200" baseline="0">
+                <a:defRPr sz="1500" b="0" i="0" u="none" strike="noStrike" kern="1200" baseline="0">
                   <a:solidFill>
                     <a:schemeClr val="tx1">
                       <a:lumMod val="65000"/>
@@ -2189,7 +2211,7 @@
           <a:lstStyle/>
           <a:p>
             <a:pPr>
-              <a:defRPr sz="1100" b="0" i="0" u="none" strike="noStrike" kern="1200" baseline="0">
+              <a:defRPr sz="1500" b="0" i="0" u="none" strike="noStrike" kern="1200" baseline="0">
                 <a:solidFill>
                   <a:schemeClr val="tx1">
                     <a:lumMod val="65000"/>
@@ -2231,7 +2253,7 @@
         <a:lstStyle/>
         <a:p>
           <a:pPr>
-            <a:defRPr sz="1200" b="0" i="0" u="none" strike="noStrike" kern="1200" baseline="0">
+            <a:defRPr sz="1500" b="0" i="0" u="none" strike="noStrike" kern="1200" baseline="0">
               <a:solidFill>
                 <a:schemeClr val="tx1">
                   <a:lumMod val="65000"/>
@@ -2275,7 +2297,7 @@
     <a:lstStyle/>
     <a:p>
       <a:pPr>
-        <a:defRPr sz="1100" baseline="0"/>
+        <a:defRPr sz="1500" baseline="0"/>
       </a:pPr>
       <a:endParaRPr lang="it-IT"/>
     </a:p>
@@ -9517,7 +9539,7 @@
             <a:fld id="{B61BEF0D-F0BB-DE4B-95CE-6DB70DBA9567}" type="datetimeFigureOut">
               <a:rPr lang="en-US" dirty="0"/>
               <a:pPr/>
-              <a:t>6/2/2021</a:t>
+              <a:t>6/3/2021</a:t>
             </a:fld>
             <a:endParaRPr lang="en-US"/>
           </a:p>
@@ -9810,7 +9832,7 @@
             <a:fld id="{B61BEF0D-F0BB-DE4B-95CE-6DB70DBA9567}" type="datetimeFigureOut">
               <a:rPr lang="en-US" dirty="0"/>
               <a:pPr/>
-              <a:t>6/2/2021</a:t>
+              <a:t>6/3/2021</a:t>
             </a:fld>
             <a:endParaRPr lang="en-US"/>
           </a:p>
@@ -10059,7 +10081,7 @@
             <a:fld id="{B61BEF0D-F0BB-DE4B-95CE-6DB70DBA9567}" type="datetimeFigureOut">
               <a:rPr lang="en-US" dirty="0"/>
               <a:pPr/>
-              <a:t>6/2/2021</a:t>
+              <a:t>6/3/2021</a:t>
             </a:fld>
             <a:endParaRPr lang="en-US"/>
           </a:p>
@@ -10600,7 +10622,7 @@
             <a:fld id="{B61BEF0D-F0BB-DE4B-95CE-6DB70DBA9567}" type="datetimeFigureOut">
               <a:rPr lang="en-US" dirty="0"/>
               <a:pPr/>
-              <a:t>6/2/2021</a:t>
+              <a:t>6/3/2021</a:t>
             </a:fld>
             <a:endParaRPr lang="en-US"/>
           </a:p>
@@ -10849,7 +10871,7 @@
             <a:fld id="{B61BEF0D-F0BB-DE4B-95CE-6DB70DBA9567}" type="datetimeFigureOut">
               <a:rPr lang="en-US" dirty="0"/>
               <a:pPr/>
-              <a:t>6/2/2021</a:t>
+              <a:t>6/3/2021</a:t>
             </a:fld>
             <a:endParaRPr lang="en-US"/>
           </a:p>
@@ -11382,7 +11404,7 @@
             <a:fld id="{B61BEF0D-F0BB-DE4B-95CE-6DB70DBA9567}" type="datetimeFigureOut">
               <a:rPr lang="en-US" dirty="0"/>
               <a:pPr/>
-              <a:t>6/2/2021</a:t>
+              <a:t>6/3/2021</a:t>
             </a:fld>
             <a:endParaRPr lang="en-US"/>
           </a:p>
@@ -11680,7 +11702,7 @@
             <a:fld id="{B61BEF0D-F0BB-DE4B-95CE-6DB70DBA9567}" type="datetimeFigureOut">
               <a:rPr lang="en-US" dirty="0"/>
               <a:pPr/>
-              <a:t>6/2/2021</a:t>
+              <a:t>6/3/2021</a:t>
             </a:fld>
             <a:endParaRPr lang="en-US"/>
           </a:p>
@@ -11854,7 +11876,7 @@
             <a:fld id="{B61BEF0D-F0BB-DE4B-95CE-6DB70DBA9567}" type="datetimeFigureOut">
               <a:rPr lang="en-US" dirty="0"/>
               <a:pPr/>
-              <a:t>6/2/2021</a:t>
+              <a:t>6/3/2021</a:t>
             </a:fld>
             <a:endParaRPr lang="en-US"/>
           </a:p>
@@ -12034,7 +12056,7 @@
             <a:fld id="{B61BEF0D-F0BB-DE4B-95CE-6DB70DBA9567}" type="datetimeFigureOut">
               <a:rPr lang="en-US" dirty="0"/>
               <a:pPr/>
-              <a:t>6/2/2021</a:t>
+              <a:t>6/3/2021</a:t>
             </a:fld>
             <a:endParaRPr lang="en-US"/>
           </a:p>
@@ -12204,7 +12226,7 @@
             <a:fld id="{B61BEF0D-F0BB-DE4B-95CE-6DB70DBA9567}" type="datetimeFigureOut">
               <a:rPr lang="en-US" dirty="0"/>
               <a:pPr/>
-              <a:t>6/2/2021</a:t>
+              <a:t>6/3/2021</a:t>
             </a:fld>
             <a:endParaRPr lang="en-US"/>
           </a:p>
@@ -12456,7 +12478,7 @@
             <a:fld id="{B61BEF0D-F0BB-DE4B-95CE-6DB70DBA9567}" type="datetimeFigureOut">
               <a:rPr lang="en-US" dirty="0"/>
               <a:pPr/>
-              <a:t>6/2/2021</a:t>
+              <a:t>6/3/2021</a:t>
             </a:fld>
             <a:endParaRPr lang="en-US"/>
           </a:p>
@@ -12752,7 +12774,7 @@
             <a:fld id="{B61BEF0D-F0BB-DE4B-95CE-6DB70DBA9567}" type="datetimeFigureOut">
               <a:rPr lang="en-US" dirty="0"/>
               <a:pPr/>
-              <a:t>6/2/2021</a:t>
+              <a:t>6/3/2021</a:t>
             </a:fld>
             <a:endParaRPr lang="en-US"/>
           </a:p>
@@ -13193,7 +13215,7 @@
             <a:fld id="{B61BEF0D-F0BB-DE4B-95CE-6DB70DBA9567}" type="datetimeFigureOut">
               <a:rPr lang="en-US" dirty="0"/>
               <a:pPr/>
-              <a:t>6/2/2021</a:t>
+              <a:t>6/3/2021</a:t>
             </a:fld>
             <a:endParaRPr lang="en-US"/>
           </a:p>
@@ -13312,7 +13334,7 @@
             <a:fld id="{B61BEF0D-F0BB-DE4B-95CE-6DB70DBA9567}" type="datetimeFigureOut">
               <a:rPr lang="en-US" dirty="0"/>
               <a:pPr/>
-              <a:t>6/2/2021</a:t>
+              <a:t>6/3/2021</a:t>
             </a:fld>
             <a:endParaRPr lang="en-US"/>
           </a:p>
@@ -13409,7 +13431,7 @@
             <a:fld id="{B61BEF0D-F0BB-DE4B-95CE-6DB70DBA9567}" type="datetimeFigureOut">
               <a:rPr lang="en-US" dirty="0"/>
               <a:pPr/>
-              <a:t>6/2/2021</a:t>
+              <a:t>6/3/2021</a:t>
             </a:fld>
             <a:endParaRPr lang="en-US"/>
           </a:p>
@@ -13692,7 +13714,7 @@
             <a:fld id="{B61BEF0D-F0BB-DE4B-95CE-6DB70DBA9567}" type="datetimeFigureOut">
               <a:rPr lang="en-US" dirty="0"/>
               <a:pPr/>
-              <a:t>6/2/2021</a:t>
+              <a:t>6/3/2021</a:t>
             </a:fld>
             <a:endParaRPr lang="en-US"/>
           </a:p>
@@ -13980,7 +14002,7 @@
             <a:fld id="{B61BEF0D-F0BB-DE4B-95CE-6DB70DBA9567}" type="datetimeFigureOut">
               <a:rPr lang="en-US" dirty="0"/>
               <a:pPr/>
-              <a:t>6/2/2021</a:t>
+              <a:t>6/3/2021</a:t>
             </a:fld>
             <a:endParaRPr lang="en-US"/>
           </a:p>
@@ -14510,7 +14532,7 @@
             <a:fld id="{B61BEF0D-F0BB-DE4B-95CE-6DB70DBA9567}" type="datetimeFigureOut">
               <a:rPr lang="en-US" dirty="0"/>
               <a:pPr/>
-              <a:t>6/2/2021</a:t>
+              <a:t>6/3/2021</a:t>
             </a:fld>
             <a:endParaRPr lang="en-US"/>
           </a:p>
@@ -20713,7 +20735,7 @@
         </p:nvSpPr>
         <p:spPr>
           <a:xfrm>
-            <a:off x="2617442" y="245810"/>
+            <a:off x="2455173" y="200568"/>
             <a:ext cx="7817538" cy="990306"/>
           </a:xfrm>
         </p:spPr>
@@ -20758,7 +20780,7 @@
           <p:nvPr>
             <p:extLst>
               <p:ext uri="{D42A27DB-BD31-4B8C-83A1-F6EECF244321}">
-                <p14:modId xmlns:p14="http://schemas.microsoft.com/office/powerpoint/2010/main" val="2982805142"/>
+                <p14:modId xmlns:p14="http://schemas.microsoft.com/office/powerpoint/2010/main" val="1289749427"/>
               </p:ext>
             </p:extLst>
           </p:nvPr>
@@ -21425,14 +21447,14 @@
           <p:nvPr>
             <p:extLst>
               <p:ext uri="{D42A27DB-BD31-4B8C-83A1-F6EECF244321}">
-                <p14:modId xmlns:p14="http://schemas.microsoft.com/office/powerpoint/2010/main" val="2289186078"/>
+                <p14:modId xmlns:p14="http://schemas.microsoft.com/office/powerpoint/2010/main" val="3593174767"/>
               </p:ext>
             </p:extLst>
           </p:nvPr>
         </p:nvGraphicFramePr>
         <p:xfrm>
-          <a:off x="1089026" y="1246408"/>
-          <a:ext cx="10009185" cy="5357869"/>
+          <a:off x="1014413" y="1142012"/>
+          <a:ext cx="10009185" cy="5483541"/>
         </p:xfrm>
         <a:graphic>
           <a:graphicData uri="http://schemas.openxmlformats.org/drawingml/2006/chart">
@@ -22051,8 +22073,8 @@
         </p:nvSpPr>
         <p:spPr>
           <a:xfrm>
-            <a:off x="650877" y="859601"/>
-            <a:ext cx="9388471" cy="5138798"/>
+            <a:off x="523876" y="1391444"/>
+            <a:ext cx="8196259" cy="4275138"/>
           </a:xfrm>
           <a:prstGeom prst="rect">
             <a:avLst/>
@@ -22087,8 +22109,8 @@
               <a:buChar char="•"/>
             </a:pPr>
             <a:r>
-              <a:rPr lang="en-US" sz="3200" dirty="0"/>
-              <a:t>Encoding time, as predicted, does get lower with faster presets</a:t>
+              <a:rPr lang="en-US" sz="2800" dirty="0"/>
+              <a:t>Normalized Encoding time, as predicted, does get lower with faster presets</a:t>
             </a:r>
           </a:p>
           <a:p>
@@ -22112,23 +22134,23 @@
               <a:buChar char="•"/>
             </a:pPr>
             <a:r>
-              <a:rPr lang="en-US" sz="3200" dirty="0"/>
+              <a:rPr lang="en-US" sz="2800" dirty="0"/>
               <a:t>Caps at </a:t>
             </a:r>
             <a:r>
-              <a:rPr lang="en-US" sz="3200" i="1" dirty="0"/>
+              <a:rPr lang="en-US" sz="2800" i="1" dirty="0"/>
               <a:t>superfast</a:t>
             </a:r>
             <a:r>
-              <a:rPr lang="en-US" sz="3200" dirty="0"/>
+              <a:rPr lang="en-US" sz="2800" dirty="0"/>
               <a:t> (no significant improvement with </a:t>
             </a:r>
             <a:r>
-              <a:rPr lang="en-US" sz="3200" i="1" dirty="0"/>
+              <a:rPr lang="en-US" sz="2800" i="1" dirty="0"/>
               <a:t>ultrafast</a:t>
             </a:r>
             <a:r>
-              <a:rPr lang="en-US" sz="3200" dirty="0"/>
+              <a:rPr lang="en-US" sz="2800" dirty="0"/>
               <a:t>)</a:t>
             </a:r>
           </a:p>
@@ -22153,8 +22175,8 @@
               <a:buChar char="•"/>
             </a:pPr>
             <a:r>
-              <a:rPr lang="en-US" sz="3200" dirty="0"/>
-              <a:t>Always below 100% ratio (every preset could handle live streaming)</a:t>
+              <a:rPr lang="en-US" sz="2800" dirty="0"/>
+              <a:t>Always below 1 (every preset could handle live streaming)</a:t>
             </a:r>
           </a:p>
           <a:p>
@@ -22178,19 +22200,134 @@
               <a:buChar char="•"/>
             </a:pPr>
             <a:r>
-              <a:rPr lang="en-US" sz="3200" dirty="0"/>
-              <a:t>In any case hardware encoding is</a:t>
+              <a:rPr lang="en-US" sz="2800" dirty="0"/>
+              <a:t>In any case </a:t>
+            </a:r>
+            <a:r>
+              <a:rPr lang="en-US" sz="2800" b="1" dirty="0">
+                <a:solidFill>
+                  <a:srgbClr val="8BB434"/>
+                </a:solidFill>
+              </a:rPr>
+              <a:t>hardware encoding is</a:t>
             </a:r>
             <a:br>
-              <a:rPr lang="en-US" sz="3200" dirty="0"/>
+              <a:rPr lang="en-US" sz="2800" b="1" dirty="0">
+                <a:solidFill>
+                  <a:srgbClr val="8BB434"/>
+                </a:solidFill>
+              </a:rPr>
             </a:br>
             <a:r>
-              <a:rPr lang="en-US" sz="3200" dirty="0"/>
-              <a:t>faster than any software preset</a:t>
+              <a:rPr lang="en-US" sz="2800" b="1" dirty="0">
+                <a:solidFill>
+                  <a:srgbClr val="8BB434"/>
+                </a:solidFill>
+              </a:rPr>
+              <a:t>faster</a:t>
+            </a:r>
+            <a:r>
+              <a:rPr lang="en-US" sz="2800" dirty="0">
+                <a:solidFill>
+                  <a:srgbClr val="8BB434"/>
+                </a:solidFill>
+              </a:rPr>
+              <a:t> </a:t>
+            </a:r>
+            <a:r>
+              <a:rPr lang="en-US" sz="2800" dirty="0"/>
+              <a:t>than any software preset</a:t>
             </a:r>
           </a:p>
         </p:txBody>
       </p:sp>
+      <p:sp>
+        <p:nvSpPr>
+          <p:cNvPr id="16" name="CasellaDiTesto 15">
+            <a:extLst>
+              <a:ext uri="{FF2B5EF4-FFF2-40B4-BE49-F238E27FC236}">
+                <a16:creationId xmlns:a16="http://schemas.microsoft.com/office/drawing/2014/main" id="{EC2277C4-CE6E-432D-8EF4-7134944E5631}"/>
+              </a:ext>
+            </a:extLst>
+          </p:cNvPr>
+          <p:cNvSpPr txBox="1"/>
+          <p:nvPr/>
+        </p:nvSpPr>
+        <p:spPr>
+          <a:xfrm>
+            <a:off x="889794" y="380485"/>
+            <a:ext cx="8259760" cy="707886"/>
+          </a:xfrm>
+          <a:prstGeom prst="rect">
+            <a:avLst/>
+          </a:prstGeom>
+          <a:noFill/>
+        </p:spPr>
+        <p:txBody>
+          <a:bodyPr wrap="square">
+            <a:spAutoFit/>
+          </a:bodyPr>
+          <a:lstStyle/>
+          <a:p>
+            <a:pPr algn="ctr"/>
+            <a:r>
+              <a:rPr lang="it-IT" sz="4000" dirty="0" err="1"/>
+              <a:t>Which</a:t>
+            </a:r>
+            <a:r>
+              <a:rPr lang="it-IT" sz="4000" dirty="0"/>
+              <a:t> </a:t>
+            </a:r>
+            <a:r>
+              <a:rPr lang="it-IT" sz="4000" dirty="0" err="1"/>
+              <a:t>is</a:t>
+            </a:r>
+            <a:r>
+              <a:rPr lang="it-IT" sz="4000" dirty="0"/>
+              <a:t> THE FAST?</a:t>
+            </a:r>
+          </a:p>
+        </p:txBody>
+      </p:sp>
+      <p:pic>
+        <p:nvPicPr>
+          <p:cNvPr id="8" name="Elemento grafico 7" descr="Cronometro 75% con riempimento a tinta unita">
+            <a:extLst>
+              <a:ext uri="{FF2B5EF4-FFF2-40B4-BE49-F238E27FC236}">
+                <a16:creationId xmlns:a16="http://schemas.microsoft.com/office/drawing/2014/main" id="{6625F8B0-A891-4AB5-B298-5D11C283DEA3}"/>
+              </a:ext>
+            </a:extLst>
+          </p:cNvPr>
+          <p:cNvPicPr>
+            <a:picLocks noChangeAspect="1"/>
+          </p:cNvPicPr>
+          <p:nvPr/>
+        </p:nvPicPr>
+        <p:blipFill>
+          <a:blip r:embed="rId2">
+            <a:extLst>
+              <a:ext uri="{28A0092B-C50C-407E-A947-70E740481C1C}">
+                <a14:useLocalDpi xmlns:a14="http://schemas.microsoft.com/office/drawing/2010/main" val="0"/>
+              </a:ext>
+              <a:ext uri="{96DAC541-7B7A-43D3-8B79-37D633B846F1}">
+                <asvg:svgBlip xmlns:asvg="http://schemas.microsoft.com/office/drawing/2016/SVG/main" r:embed="rId3"/>
+              </a:ext>
+            </a:extLst>
+          </a:blip>
+          <a:stretch>
+            <a:fillRect/>
+          </a:stretch>
+        </p:blipFill>
+        <p:spPr>
+          <a:xfrm>
+            <a:off x="7862885" y="277228"/>
+            <a:ext cx="914400" cy="914400"/>
+          </a:xfrm>
+          <a:prstGeom prst="rect">
+            <a:avLst/>
+          </a:prstGeom>
+        </p:spPr>
+      </p:pic>
     </p:spTree>
     <p:extLst>
       <p:ext uri="{BB962C8B-B14F-4D97-AF65-F5344CB8AC3E}">
@@ -22991,8 +23128,8 @@
         </p:nvSpPr>
         <p:spPr>
           <a:xfrm>
-            <a:off x="650877" y="859601"/>
-            <a:ext cx="9388471" cy="5138798"/>
+            <a:off x="174627" y="1294885"/>
+            <a:ext cx="9213844" cy="5138798"/>
           </a:xfrm>
           <a:prstGeom prst="rect">
             <a:avLst/>
@@ -23027,7 +23164,7 @@
               <a:buChar char="•"/>
             </a:pPr>
             <a:r>
-              <a:rPr lang="en-US" sz="3200" dirty="0"/>
+              <a:rPr lang="en-US" sz="3000" dirty="0"/>
               <a:t>Output size gets bigger with faster presets (less optimized encoding)</a:t>
             </a:r>
           </a:p>
@@ -23052,8 +23189,20 @@
               <a:buChar char="•"/>
             </a:pPr>
             <a:r>
-              <a:rPr lang="en-US" sz="3200" dirty="0"/>
-              <a:t>Faster and very fast presets are outliers (as also reported in the documentation): lower time and lower size at the same time</a:t>
+              <a:rPr lang="en-US" sz="3000" dirty="0"/>
+              <a:t>Faster and very fast presets are </a:t>
+            </a:r>
+            <a:r>
+              <a:rPr lang="en-US" sz="3000" b="1" dirty="0">
+                <a:solidFill>
+                  <a:srgbClr val="9900CC"/>
+                </a:solidFill>
+              </a:rPr>
+              <a:t>outliers</a:t>
+            </a:r>
+            <a:r>
+              <a:rPr lang="en-US" sz="3000" dirty="0"/>
+              <a:t> (as also reported in the documentation): lower time and lower size at the same time</a:t>
             </a:r>
           </a:p>
           <a:p>
@@ -23078,40 +23227,200 @@
             </a:pPr>
             <a:r>
               <a:rPr lang="en-US" sz="3200" dirty="0"/>
-              <a:t>Likely due to quality reduction even if it is</a:t>
+              <a:t>HW encoding is capable to obtain a good average result with some limit cases                (San Andreas)</a:t>
             </a:r>
-            <a:br>
-              <a:rPr lang="en-US" sz="3200" dirty="0"/>
-            </a:br>
-            <a:r>
-              <a:rPr lang="en-US" sz="3200" dirty="0"/>
-              <a:t>supposed to be constant</a:t>
-            </a:r>
-          </a:p>
-          <a:p>
-            <a:pPr marL="1028700" lvl="1" indent="-571500" defTabSz="457200">
-              <a:lnSpc>
-                <a:spcPct val="120000"/>
-              </a:lnSpc>
-              <a:spcBef>
-                <a:spcPct val="20000"/>
-              </a:spcBef>
-              <a:spcAft>
-                <a:spcPts val="600"/>
-              </a:spcAft>
-              <a:buClr>
-                <a:schemeClr val="accent1">
-                  <a:lumMod val="75000"/>
-                </a:schemeClr>
-              </a:buClr>
-              <a:buSzPct val="145000"/>
-              <a:buFont typeface="Arial"/>
-              <a:buChar char="•"/>
-            </a:pPr>
-            <a:endParaRPr lang="en-US" sz="3200" dirty="0"/>
           </a:p>
         </p:txBody>
       </p:sp>
+      <p:sp>
+        <p:nvSpPr>
+          <p:cNvPr id="16" name="CasellaDiTesto 15">
+            <a:extLst>
+              <a:ext uri="{FF2B5EF4-FFF2-40B4-BE49-F238E27FC236}">
+                <a16:creationId xmlns:a16="http://schemas.microsoft.com/office/drawing/2014/main" id="{EF7A5337-BBAE-48F7-AB14-F75C5F0BF394}"/>
+              </a:ext>
+            </a:extLst>
+          </p:cNvPr>
+          <p:cNvSpPr txBox="1"/>
+          <p:nvPr/>
+        </p:nvSpPr>
+        <p:spPr>
+          <a:xfrm>
+            <a:off x="651669" y="392588"/>
+            <a:ext cx="8259760" cy="646331"/>
+          </a:xfrm>
+          <a:prstGeom prst="rect">
+            <a:avLst/>
+          </a:prstGeom>
+          <a:noFill/>
+        </p:spPr>
+        <p:txBody>
+          <a:bodyPr wrap="square">
+            <a:spAutoFit/>
+          </a:bodyPr>
+          <a:lstStyle/>
+          <a:p>
+            <a:pPr algn="ctr"/>
+            <a:r>
+              <a:rPr lang="it-IT" sz="3600" dirty="0" err="1"/>
+              <a:t>Which</a:t>
+            </a:r>
+            <a:r>
+              <a:rPr lang="it-IT" sz="3600" dirty="0"/>
+              <a:t> </a:t>
+            </a:r>
+            <a:r>
+              <a:rPr lang="it-IT" sz="3600" dirty="0" err="1"/>
+              <a:t>is</a:t>
+            </a:r>
+            <a:r>
+              <a:rPr lang="it-IT" sz="3600" dirty="0"/>
+              <a:t> </a:t>
+            </a:r>
+            <a:r>
+              <a:rPr lang="it-IT" sz="3600" dirty="0" err="1"/>
+              <a:t>most</a:t>
+            </a:r>
+            <a:r>
+              <a:rPr lang="it-IT" sz="3600" dirty="0"/>
+              <a:t> </a:t>
+            </a:r>
+            <a:r>
+              <a:rPr lang="it-IT" sz="3600" dirty="0" err="1"/>
+              <a:t>compression</a:t>
+            </a:r>
+            <a:r>
+              <a:rPr lang="it-IT" sz="3600" dirty="0"/>
+              <a:t> </a:t>
+            </a:r>
+            <a:r>
+              <a:rPr lang="it-IT" sz="3600" dirty="0" err="1"/>
+              <a:t>effective</a:t>
+            </a:r>
+            <a:r>
+              <a:rPr lang="it-IT" sz="3600" dirty="0"/>
+              <a:t>?</a:t>
+            </a:r>
+          </a:p>
+        </p:txBody>
+      </p:sp>
+      <p:pic>
+        <p:nvPicPr>
+          <p:cNvPr id="3" name="Elemento grafico 2" descr="Scatola con riempimento a tinta unita">
+            <a:extLst>
+              <a:ext uri="{FF2B5EF4-FFF2-40B4-BE49-F238E27FC236}">
+                <a16:creationId xmlns:a16="http://schemas.microsoft.com/office/drawing/2014/main" id="{6D3844FF-D234-4D20-8715-6DB31474DDBF}"/>
+              </a:ext>
+            </a:extLst>
+          </p:cNvPr>
+          <p:cNvPicPr>
+            <a:picLocks noChangeAspect="1"/>
+          </p:cNvPicPr>
+          <p:nvPr/>
+        </p:nvPicPr>
+        <p:blipFill>
+          <a:blip r:embed="rId2">
+            <a:extLst>
+              <a:ext uri="{28A0092B-C50C-407E-A947-70E740481C1C}">
+                <a14:useLocalDpi xmlns:a14="http://schemas.microsoft.com/office/drawing/2010/main" val="0"/>
+              </a:ext>
+              <a:ext uri="{96DAC541-7B7A-43D3-8B79-37D633B846F1}">
+                <asvg:svgBlip xmlns:asvg="http://schemas.microsoft.com/office/drawing/2016/SVG/main" r:embed="rId3"/>
+              </a:ext>
+            </a:extLst>
+          </a:blip>
+          <a:stretch>
+            <a:fillRect/>
+          </a:stretch>
+        </p:blipFill>
+        <p:spPr>
+          <a:xfrm>
+            <a:off x="8636001" y="247535"/>
+            <a:ext cx="1219195" cy="1219195"/>
+          </a:xfrm>
+          <a:prstGeom prst="rect">
+            <a:avLst/>
+          </a:prstGeom>
+        </p:spPr>
+      </p:pic>
+      <p:pic>
+        <p:nvPicPr>
+          <p:cNvPr id="5" name="Elemento grafico 4" descr="Faccia diavolo con riempimento a tinta unita con riempimento a tinta unita">
+            <a:extLst>
+              <a:ext uri="{FF2B5EF4-FFF2-40B4-BE49-F238E27FC236}">
+                <a16:creationId xmlns:a16="http://schemas.microsoft.com/office/drawing/2014/main" id="{98BA19C2-D60F-4C3C-90F5-ECC490C5D6BD}"/>
+              </a:ext>
+            </a:extLst>
+          </p:cNvPr>
+          <p:cNvPicPr>
+            <a:picLocks noChangeAspect="1"/>
+          </p:cNvPicPr>
+          <p:nvPr/>
+        </p:nvPicPr>
+        <p:blipFill>
+          <a:blip r:embed="rId4">
+            <a:extLst>
+              <a:ext uri="{28A0092B-C50C-407E-A947-70E740481C1C}">
+                <a14:useLocalDpi xmlns:a14="http://schemas.microsoft.com/office/drawing/2010/main" val="0"/>
+              </a:ext>
+              <a:ext uri="{96DAC541-7B7A-43D3-8B79-37D633B846F1}">
+                <asvg:svgBlip xmlns:asvg="http://schemas.microsoft.com/office/drawing/2016/SVG/main" r:embed="rId5"/>
+              </a:ext>
+            </a:extLst>
+          </a:blip>
+          <a:stretch>
+            <a:fillRect/>
+          </a:stretch>
+        </p:blipFill>
+        <p:spPr>
+          <a:xfrm>
+            <a:off x="8931271" y="2782888"/>
+            <a:ext cx="771529" cy="771529"/>
+          </a:xfrm>
+          <a:prstGeom prst="rect">
+            <a:avLst/>
+          </a:prstGeom>
+        </p:spPr>
+      </p:pic>
+      <p:pic>
+        <p:nvPicPr>
+          <p:cNvPr id="7" name="Elemento grafico 6" descr="Muro di mattoni contorno">
+            <a:extLst>
+              <a:ext uri="{FF2B5EF4-FFF2-40B4-BE49-F238E27FC236}">
+                <a16:creationId xmlns:a16="http://schemas.microsoft.com/office/drawing/2014/main" id="{6C37184E-4192-4385-A627-17A45384D35A}"/>
+              </a:ext>
+            </a:extLst>
+          </p:cNvPr>
+          <p:cNvPicPr>
+            <a:picLocks noChangeAspect="1"/>
+          </p:cNvPicPr>
+          <p:nvPr/>
+        </p:nvPicPr>
+        <p:blipFill>
+          <a:blip r:embed="rId6">
+            <a:extLst>
+              <a:ext uri="{28A0092B-C50C-407E-A947-70E740481C1C}">
+                <a14:useLocalDpi xmlns:a14="http://schemas.microsoft.com/office/drawing/2010/main" val="0"/>
+              </a:ext>
+              <a:ext uri="{96DAC541-7B7A-43D3-8B79-37D633B846F1}">
+                <asvg:svgBlip xmlns:asvg="http://schemas.microsoft.com/office/drawing/2016/SVG/main" r:embed="rId7"/>
+              </a:ext>
+            </a:extLst>
+          </a:blip>
+          <a:stretch>
+            <a:fillRect/>
+          </a:stretch>
+        </p:blipFill>
+        <p:spPr>
+          <a:xfrm>
+            <a:off x="3867149" y="5488782"/>
+            <a:ext cx="914400" cy="914400"/>
+          </a:xfrm>
+          <a:prstGeom prst="rect">
+            <a:avLst/>
+          </a:prstGeom>
+        </p:spPr>
+      </p:pic>
     </p:spTree>
     <p:extLst>
       <p:ext uri="{BB962C8B-B14F-4D97-AF65-F5344CB8AC3E}">
@@ -23246,33 +23555,15 @@
                                   </p:childTnLst>
                                 </p:cTn>
                               </p:par>
-                            </p:childTnLst>
-                          </p:cTn>
-                        </p:par>
-                      </p:childTnLst>
-                    </p:cTn>
-                  </p:par>
-                  <p:par>
-                    <p:cTn id="13" fill="hold">
-                      <p:stCondLst>
-                        <p:cond delay="indefinite"/>
-                      </p:stCondLst>
-                      <p:childTnLst>
-                        <p:par>
-                          <p:cTn id="14" fill="hold">
-                            <p:stCondLst>
-                              <p:cond delay="0"/>
-                            </p:stCondLst>
-                            <p:childTnLst>
                               <p:par>
-                                <p:cTn id="15" presetID="10" presetClass="entr" presetSubtype="0" fill="hold" grpId="0" nodeType="clickEffect">
+                                <p:cTn id="13" presetID="10" presetClass="entr" presetSubtype="0" fill="hold" grpId="0" nodeType="withEffect">
                                   <p:stCondLst>
                                     <p:cond delay="0"/>
                                   </p:stCondLst>
                                   <p:childTnLst>
                                     <p:set>
                                       <p:cBhvr>
-                                        <p:cTn id="16" dur="1" fill="hold">
+                                        <p:cTn id="14" dur="1" fill="hold">
                                           <p:stCondLst>
                                             <p:cond delay="0"/>
                                           </p:stCondLst>
@@ -23294,7 +23585,7 @@
                                     </p:set>
                                     <p:animEffect transition="in" filter="fade">
                                       <p:cBhvr>
-                                        <p:cTn id="17" dur="500"/>
+                                        <p:cTn id="15" dur="500"/>
                                         <p:tgtEl>
                                           <p:spTgt spid="17">
                                             <p:txEl>
@@ -23851,7 +24142,7 @@
         </p:nvSpPr>
         <p:spPr>
           <a:xfrm>
-            <a:off x="650877" y="859601"/>
+            <a:off x="65089" y="1336675"/>
             <a:ext cx="9388471" cy="5138798"/>
           </a:xfrm>
           <a:prstGeom prst="rect">
@@ -23869,7 +24160,7 @@
           <a:p>
             <a:pPr marL="1028700" lvl="1" indent="-571500" defTabSz="457200">
               <a:lnSpc>
-                <a:spcPct val="120000"/>
+                <a:spcPct val="150000"/>
               </a:lnSpc>
               <a:spcBef>
                 <a:spcPct val="20000"/>
@@ -23888,32 +24179,7 @@
             </a:pPr>
             <a:r>
               <a:rPr lang="en-US" sz="3200" dirty="0"/>
-              <a:t>Software encoding proves to be more versatile</a:t>
-            </a:r>
-          </a:p>
-          <a:p>
-            <a:pPr marL="1028700" lvl="1" indent="-571500" defTabSz="457200">
-              <a:lnSpc>
-                <a:spcPct val="120000"/>
-              </a:lnSpc>
-              <a:spcBef>
-                <a:spcPct val="20000"/>
-              </a:spcBef>
-              <a:spcAft>
-                <a:spcPts val="600"/>
-              </a:spcAft>
-              <a:buClr>
-                <a:schemeClr val="accent1">
-                  <a:lumMod val="75000"/>
-                </a:schemeClr>
-              </a:buClr>
-              <a:buSzPct val="145000"/>
-              <a:buFont typeface="Arial"/>
-              <a:buChar char="•"/>
-            </a:pPr>
-            <a:r>
-              <a:rPr lang="en-US" sz="3200" dirty="0"/>
-              <a:t>High reduction in size, suitable for data to be saved on disk</a:t>
+              <a:t>Encoding is heavy load,  so it leads hardware to per form at 100% of  it’s capabilities;</a:t>
             </a:r>
           </a:p>
           <a:p>
@@ -23938,18 +24204,160 @@
             </a:pPr>
             <a:r>
               <a:rPr lang="en-US" sz="3200" dirty="0"/>
-              <a:t>If encoding speed is the priority, H264 is to be</a:t>
+              <a:t>Components where at their peak of power consumption for the entire time of the  test</a:t>
             </a:r>
-            <a:br>
-              <a:rPr lang="en-US" sz="3200" dirty="0"/>
-            </a:br>
+          </a:p>
+          <a:p>
+            <a:pPr marL="1028700" lvl="1" indent="-571500" defTabSz="457200">
+              <a:lnSpc>
+                <a:spcPct val="150000"/>
+              </a:lnSpc>
+              <a:spcBef>
+                <a:spcPct val="20000"/>
+              </a:spcBef>
+              <a:spcAft>
+                <a:spcPts val="600"/>
+              </a:spcAft>
+              <a:buClr>
+                <a:schemeClr val="accent1">
+                  <a:lumMod val="75000"/>
+                </a:schemeClr>
+              </a:buClr>
+              <a:buSzPct val="145000"/>
+              <a:buFont typeface="Arial"/>
+              <a:buChar char="•"/>
+            </a:pPr>
             <a:r>
               <a:rPr lang="en-US" sz="3200" dirty="0"/>
-              <a:t>preferred</a:t>
+              <a:t>Short time -&gt; less energy drowned</a:t>
+            </a:r>
+          </a:p>
+          <a:p>
+            <a:pPr marL="1028700" lvl="1" indent="-571500" defTabSz="457200">
+              <a:lnSpc>
+                <a:spcPct val="150000"/>
+              </a:lnSpc>
+              <a:spcBef>
+                <a:spcPct val="20000"/>
+              </a:spcBef>
+              <a:spcAft>
+                <a:spcPts val="600"/>
+              </a:spcAft>
+              <a:buClr>
+                <a:schemeClr val="accent1">
+                  <a:lumMod val="75000"/>
+                </a:schemeClr>
+              </a:buClr>
+              <a:buSzPct val="145000"/>
+              <a:buFont typeface="Arial"/>
+              <a:buChar char="•"/>
+            </a:pPr>
+            <a:r>
+              <a:rPr lang="en-US" sz="3200" b="1" dirty="0"/>
+              <a:t>Hardware</a:t>
+            </a:r>
+            <a:r>
+              <a:rPr lang="en-US" sz="3200" dirty="0"/>
+              <a:t> tends to be the best</a:t>
             </a:r>
           </a:p>
         </p:txBody>
       </p:sp>
+      <p:sp>
+        <p:nvSpPr>
+          <p:cNvPr id="20" name="CasellaDiTesto 19">
+            <a:extLst>
+              <a:ext uri="{FF2B5EF4-FFF2-40B4-BE49-F238E27FC236}">
+                <a16:creationId xmlns:a16="http://schemas.microsoft.com/office/drawing/2014/main" id="{EA514CEB-FF32-4918-923E-AFDFC1502D28}"/>
+              </a:ext>
+            </a:extLst>
+          </p:cNvPr>
+          <p:cNvSpPr txBox="1"/>
+          <p:nvPr/>
+        </p:nvSpPr>
+        <p:spPr>
+          <a:xfrm>
+            <a:off x="650877" y="358170"/>
+            <a:ext cx="7697902" cy="769441"/>
+          </a:xfrm>
+          <a:prstGeom prst="rect">
+            <a:avLst/>
+          </a:prstGeom>
+          <a:noFill/>
+        </p:spPr>
+        <p:txBody>
+          <a:bodyPr wrap="square">
+            <a:spAutoFit/>
+          </a:bodyPr>
+          <a:lstStyle/>
+          <a:p>
+            <a:pPr algn="ctr"/>
+            <a:r>
+              <a:rPr lang="it-IT" sz="4400" dirty="0" err="1"/>
+              <a:t>Wath</a:t>
+            </a:r>
+            <a:r>
+              <a:rPr lang="it-IT" sz="4400" dirty="0"/>
+              <a:t> </a:t>
+            </a:r>
+            <a:r>
+              <a:rPr lang="it-IT" sz="4400" dirty="0" err="1"/>
+              <a:t>about</a:t>
+            </a:r>
+            <a:r>
+              <a:rPr lang="it-IT" sz="4400" dirty="0"/>
+              <a:t> energy </a:t>
+            </a:r>
+            <a:r>
+              <a:rPr lang="it-IT" sz="4400" dirty="0" err="1"/>
+              <a:t>efficency</a:t>
+            </a:r>
+            <a:r>
+              <a:rPr lang="it-IT" sz="4400" dirty="0"/>
+              <a:t>?</a:t>
+            </a:r>
+          </a:p>
+        </p:txBody>
+      </p:sp>
+      <p:pic>
+        <p:nvPicPr>
+          <p:cNvPr id="3" name="Elemento grafico 2" descr="Energia rinnovabile con riempimento a tinta unita">
+            <a:extLst>
+              <a:ext uri="{FF2B5EF4-FFF2-40B4-BE49-F238E27FC236}">
+                <a16:creationId xmlns:a16="http://schemas.microsoft.com/office/drawing/2014/main" id="{0EC1F709-EBC1-498D-B62D-4A277901A57B}"/>
+              </a:ext>
+            </a:extLst>
+          </p:cNvPr>
+          <p:cNvPicPr>
+            <a:picLocks noChangeAspect="1"/>
+          </p:cNvPicPr>
+          <p:nvPr/>
+        </p:nvPicPr>
+        <p:blipFill>
+          <a:blip r:embed="rId2">
+            <a:extLst>
+              <a:ext uri="{28A0092B-C50C-407E-A947-70E740481C1C}">
+                <a14:useLocalDpi xmlns:a14="http://schemas.microsoft.com/office/drawing/2010/main" val="0"/>
+              </a:ext>
+              <a:ext uri="{96DAC541-7B7A-43D3-8B79-37D633B846F1}">
+                <asvg:svgBlip xmlns:asvg="http://schemas.microsoft.com/office/drawing/2016/SVG/main" r:embed="rId3"/>
+              </a:ext>
+            </a:extLst>
+          </a:blip>
+          <a:stretch>
+            <a:fillRect/>
+          </a:stretch>
+        </p:blipFill>
+        <p:spPr>
+          <a:xfrm>
+            <a:off x="8266230" y="174510"/>
+            <a:ext cx="1252419" cy="1252419"/>
+          </a:xfrm>
+          <a:prstGeom prst="rect">
+            <a:avLst/>
+          </a:prstGeom>
+        </p:spPr>
+      </p:pic>
     </p:spTree>
     <p:extLst>
       <p:ext uri="{BB962C8B-B14F-4D97-AF65-F5344CB8AC3E}">
@@ -24084,33 +24492,15 @@
                                   </p:childTnLst>
                                 </p:cTn>
                               </p:par>
-                            </p:childTnLst>
-                          </p:cTn>
-                        </p:par>
-                      </p:childTnLst>
-                    </p:cTn>
-                  </p:par>
-                  <p:par>
-                    <p:cTn id="13" fill="hold">
-                      <p:stCondLst>
-                        <p:cond delay="indefinite"/>
-                      </p:stCondLst>
-                      <p:childTnLst>
-                        <p:par>
-                          <p:cTn id="14" fill="hold">
-                            <p:stCondLst>
-                              <p:cond delay="0"/>
-                            </p:stCondLst>
-                            <p:childTnLst>
                               <p:par>
-                                <p:cTn id="15" presetID="10" presetClass="entr" presetSubtype="0" fill="hold" grpId="0" nodeType="clickEffect">
+                                <p:cTn id="13" presetID="10" presetClass="entr" presetSubtype="0" fill="hold" grpId="0" nodeType="withEffect">
                                   <p:stCondLst>
                                     <p:cond delay="0"/>
                                   </p:stCondLst>
                                   <p:childTnLst>
                                     <p:set>
                                       <p:cBhvr>
-                                        <p:cTn id="16" dur="1" fill="hold">
+                                        <p:cTn id="14" dur="1" fill="hold">
                                           <p:stCondLst>
                                             <p:cond delay="0"/>
                                           </p:stCondLst>
@@ -24132,11 +24522,54 @@
                                     </p:set>
                                     <p:animEffect transition="in" filter="fade">
                                       <p:cBhvr>
-                                        <p:cTn id="17" dur="500"/>
+                                        <p:cTn id="15" dur="500"/>
                                         <p:tgtEl>
                                           <p:spTgt spid="17">
                                             <p:txEl>
                                               <p:pRg st="2" end="2"/>
+                                            </p:txEl>
+                                          </p:spTgt>
+                                        </p:tgtEl>
+                                      </p:cBhvr>
+                                    </p:animEffect>
+                                  </p:childTnLst>
+                                </p:cTn>
+                              </p:par>
+                              <p:par>
+                                <p:cTn id="16" presetID="10" presetClass="entr" presetSubtype="0" fill="hold" grpId="0" nodeType="withEffect">
+                                  <p:stCondLst>
+                                    <p:cond delay="0"/>
+                                  </p:stCondLst>
+                                  <p:childTnLst>
+                                    <p:set>
+                                      <p:cBhvr>
+                                        <p:cTn id="17" dur="1" fill="hold">
+                                          <p:stCondLst>
+                                            <p:cond delay="0"/>
+                                          </p:stCondLst>
+                                        </p:cTn>
+                                        <p:tgtEl>
+                                          <p:spTgt spid="17">
+                                            <p:txEl>
+                                              <p:pRg st="3" end="3"/>
+                                            </p:txEl>
+                                          </p:spTgt>
+                                        </p:tgtEl>
+                                        <p:attrNameLst>
+                                          <p:attrName>style.visibility</p:attrName>
+                                        </p:attrNameLst>
+                                      </p:cBhvr>
+                                      <p:to>
+                                        <p:strVal val="visible"/>
+                                      </p:to>
+                                    </p:set>
+                                    <p:animEffect transition="in" filter="fade">
+                                      <p:cBhvr>
+                                        <p:cTn id="18" dur="500"/>
+                                        <p:tgtEl>
+                                          <p:spTgt spid="17">
+                                            <p:txEl>
+                                              <p:pRg st="3" end="3"/>
                                             </p:txEl>
                                           </p:spTgt>
                                         </p:tgtEl>
@@ -24945,6 +25378,1759 @@
   <p:clrMapOvr>
     <a:overrideClrMapping bg1="dk1" tx1="lt1" bg2="dk2" tx2="lt2" accent1="accent1" accent2="accent2" accent3="accent3" accent4="accent4" accent5="accent5" accent6="accent6" hlink="hlink" folHlink="folHlink"/>
   </p:clrMapOvr>
+</p:sld>
+</file>
+
+<file path=ppt/slides/slide20.xml><?xml version="1.0" encoding="utf-8"?>
+<p:sld xmlns:a="http://schemas.openxmlformats.org/drawingml/2006/main" xmlns:r="http://schemas.openxmlformats.org/officeDocument/2006/relationships" xmlns:p="http://schemas.openxmlformats.org/presentationml/2006/main">
+  <p:cSld>
+    <p:bg>
+      <p:bgPr>
+        <a:solidFill>
+          <a:schemeClr val="bg2"/>
+        </a:solidFill>
+        <a:effectLst/>
+      </p:bgPr>
+    </p:bg>
+    <p:spTree>
+      <p:nvGrpSpPr>
+        <p:cNvPr id="1" name=""/>
+        <p:cNvGrpSpPr/>
+        <p:nvPr/>
+      </p:nvGrpSpPr>
+      <p:grpSpPr>
+        <a:xfrm>
+          <a:off x="0" y="0"/>
+          <a:ext cx="0" cy="0"/>
+          <a:chOff x="0" y="0"/>
+          <a:chExt cx="0" cy="0"/>
+        </a:xfrm>
+      </p:grpSpPr>
+      <p:sp useBgFill="1">
+        <p:nvSpPr>
+          <p:cNvPr id="28" name="Rectangle 7">
+            <a:extLst>
+              <a:ext uri="{FF2B5EF4-FFF2-40B4-BE49-F238E27FC236}">
+                <a16:creationId xmlns:a16="http://schemas.microsoft.com/office/drawing/2014/main" id="{99CAC3B1-4879-424D-8F15-206277196159}"/>
+              </a:ext>
+              <a:ext uri="{C183D7F6-B498-43B3-948B-1728B52AA6E4}">
+                <adec:decorative xmlns:adec="http://schemas.microsoft.com/office/drawing/2017/decorative" val="1"/>
+              </a:ext>
+            </a:extLst>
+          </p:cNvPr>
+          <p:cNvSpPr>
+            <a:spLocks noGrp="1" noRot="1" noChangeAspect="1" noMove="1" noResize="1" noEditPoints="1" noAdjustHandles="1" noChangeArrowheads="1" noChangeShapeType="1" noTextEdit="1"/>
+          </p:cNvSpPr>
+          <p:nvPr>
+            <p:extLst>
+              <p:ext uri="{386F3935-93C4-4BCD-93E2-E3B085C9AB24}">
+                <p16:designElem xmlns:p16="http://schemas.microsoft.com/office/powerpoint/2015/main" val="1"/>
+              </p:ext>
+            </p:extLst>
+          </p:nvPr>
+        </p:nvSpPr>
+        <p:spPr>
+          <a:xfrm>
+            <a:off x="0" y="0"/>
+            <a:ext cx="12192000" cy="6858000"/>
+          </a:xfrm>
+          <a:prstGeom prst="rect">
+            <a:avLst/>
+          </a:prstGeom>
+          <a:ln>
+            <a:noFill/>
+          </a:ln>
+        </p:spPr>
+        <p:style>
+          <a:lnRef idx="2">
+            <a:schemeClr val="accent1">
+              <a:shade val="50000"/>
+            </a:schemeClr>
+          </a:lnRef>
+          <a:fillRef idx="1">
+            <a:schemeClr val="accent1"/>
+          </a:fillRef>
+          <a:effectRef idx="0">
+            <a:schemeClr val="accent1"/>
+          </a:effectRef>
+          <a:fontRef idx="minor">
+            <a:schemeClr val="lt1"/>
+          </a:fontRef>
+        </p:style>
+        <p:txBody>
+          <a:bodyPr rtlCol="0" anchor="ctr"/>
+          <a:lstStyle/>
+          <a:p>
+            <a:pPr algn="ctr"/>
+            <a:endParaRPr lang="en-US"/>
+          </a:p>
+        </p:txBody>
+      </p:sp>
+      <p:grpSp>
+        <p:nvGrpSpPr>
+          <p:cNvPr id="10" name="Group 9">
+            <a:extLst>
+              <a:ext uri="{FF2B5EF4-FFF2-40B4-BE49-F238E27FC236}">
+                <a16:creationId xmlns:a16="http://schemas.microsoft.com/office/drawing/2014/main" id="{4B8492CB-DFBA-4A82-9778-F21493DA36C1}"/>
+              </a:ext>
+              <a:ext uri="{C183D7F6-B498-43B3-948B-1728B52AA6E4}">
+                <adec:decorative xmlns:adec="http://schemas.microsoft.com/office/drawing/2017/decorative" val="1"/>
+              </a:ext>
+            </a:extLst>
+          </p:cNvPr>
+          <p:cNvGrpSpPr>
+            <a:grpSpLocks noGrp="1" noUngrp="1" noRot="1" noChangeAspect="1" noMove="1" noResize="1"/>
+          </p:cNvGrpSpPr>
+          <p:nvPr>
+            <p:extLst>
+              <p:ext uri="{386F3935-93C4-4BCD-93E2-E3B085C9AB24}">
+                <p16:designElem xmlns:p16="http://schemas.microsoft.com/office/powerpoint/2015/main" val="1"/>
+              </p:ext>
+            </p:extLst>
+          </p:nvPr>
+        </p:nvGrpSpPr>
+        <p:grpSpPr>
+          <a:xfrm flipH="1">
+            <a:off x="6526211" y="0"/>
+            <a:ext cx="5014912" cy="6862763"/>
+            <a:chOff x="2928938" y="-4763"/>
+            <a:chExt cx="5014912" cy="6862763"/>
+          </a:xfrm>
+        </p:grpSpPr>
+        <p:sp>
+          <p:nvSpPr>
+            <p:cNvPr id="11" name="Freeform 6">
+              <a:extLst>
+                <a:ext uri="{FF2B5EF4-FFF2-40B4-BE49-F238E27FC236}">
+                  <a16:creationId xmlns:a16="http://schemas.microsoft.com/office/drawing/2014/main" id="{E34CC1C8-EBDD-4AEA-83E6-B27575B62E2E}"/>
+                </a:ext>
+                <a:ext uri="{C183D7F6-B498-43B3-948B-1728B52AA6E4}">
+                  <adec:decorative xmlns:adec="http://schemas.microsoft.com/office/drawing/2017/decorative" val="1"/>
+                </a:ext>
+              </a:extLst>
+            </p:cNvPr>
+            <p:cNvSpPr/>
+            <p:nvPr>
+              <p:extLst>
+                <p:ext uri="{386F3935-93C4-4BCD-93E2-E3B085C9AB24}">
+                  <p16:designElem xmlns:p16="http://schemas.microsoft.com/office/powerpoint/2015/main" val="1"/>
+                </p:ext>
+              </p:extLst>
+            </p:nvPr>
+          </p:nvSpPr>
+          <p:spPr bwMode="auto">
+            <a:xfrm>
+              <a:off x="3367088" y="-4763"/>
+              <a:ext cx="1063625" cy="2782888"/>
+            </a:xfrm>
+            <a:custGeom>
+              <a:avLst/>
+              <a:gdLst/>
+              <a:ahLst/>
+              <a:cxnLst/>
+              <a:rect l="0" t="0" r="r" b="b"/>
+              <a:pathLst>
+                <a:path w="670" h="1753">
+                  <a:moveTo>
+                    <a:pt x="0" y="1696"/>
+                  </a:moveTo>
+                  <a:lnTo>
+                    <a:pt x="225" y="1753"/>
+                  </a:lnTo>
+                  <a:lnTo>
+                    <a:pt x="670" y="0"/>
+                  </a:lnTo>
+                  <a:lnTo>
+                    <a:pt x="430" y="0"/>
+                  </a:lnTo>
+                  <a:lnTo>
+                    <a:pt x="0" y="1696"/>
+                  </a:lnTo>
+                  <a:close/>
+                </a:path>
+              </a:pathLst>
+            </a:custGeom>
+            <a:solidFill>
+              <a:schemeClr val="accent1"/>
+            </a:solidFill>
+            <a:ln>
+              <a:noFill/>
+            </a:ln>
+          </p:spPr>
+        </p:sp>
+        <p:sp>
+          <p:nvSpPr>
+            <p:cNvPr id="12" name="Freeform 7">
+              <a:extLst>
+                <a:ext uri="{FF2B5EF4-FFF2-40B4-BE49-F238E27FC236}">
+                  <a16:creationId xmlns:a16="http://schemas.microsoft.com/office/drawing/2014/main" id="{D6B38644-B85D-4211-9526-5B4C2A662BF7}"/>
+                </a:ext>
+                <a:ext uri="{C183D7F6-B498-43B3-948B-1728B52AA6E4}">
+                  <adec:decorative xmlns:adec="http://schemas.microsoft.com/office/drawing/2017/decorative" val="1"/>
+                </a:ext>
+              </a:extLst>
+            </p:cNvPr>
+            <p:cNvSpPr/>
+            <p:nvPr>
+              <p:extLst>
+                <p:ext uri="{386F3935-93C4-4BCD-93E2-E3B085C9AB24}">
+                  <p16:designElem xmlns:p16="http://schemas.microsoft.com/office/powerpoint/2015/main" val="1"/>
+                </p:ext>
+              </p:extLst>
+            </p:nvPr>
+          </p:nvSpPr>
+          <p:spPr bwMode="auto">
+            <a:xfrm>
+              <a:off x="2928938" y="-4763"/>
+              <a:ext cx="1035050" cy="2673350"/>
+            </a:xfrm>
+            <a:custGeom>
+              <a:avLst/>
+              <a:gdLst/>
+              <a:ahLst/>
+              <a:cxnLst/>
+              <a:rect l="0" t="0" r="r" b="b"/>
+              <a:pathLst>
+                <a:path w="652" h="1684">
+                  <a:moveTo>
+                    <a:pt x="225" y="1684"/>
+                  </a:moveTo>
+                  <a:lnTo>
+                    <a:pt x="652" y="0"/>
+                  </a:lnTo>
+                  <a:lnTo>
+                    <a:pt x="411" y="0"/>
+                  </a:lnTo>
+                  <a:lnTo>
+                    <a:pt x="0" y="1627"/>
+                  </a:lnTo>
+                  <a:lnTo>
+                    <a:pt x="219" y="1681"/>
+                  </a:lnTo>
+                  <a:lnTo>
+                    <a:pt x="225" y="1684"/>
+                  </a:lnTo>
+                  <a:close/>
+                </a:path>
+              </a:pathLst>
+            </a:custGeom>
+            <a:solidFill>
+              <a:srgbClr val="595959"/>
+            </a:solidFill>
+            <a:ln>
+              <a:noFill/>
+            </a:ln>
+          </p:spPr>
+        </p:sp>
+        <p:sp>
+          <p:nvSpPr>
+            <p:cNvPr id="13" name="Freeform 12">
+              <a:extLst>
+                <a:ext uri="{FF2B5EF4-FFF2-40B4-BE49-F238E27FC236}">
+                  <a16:creationId xmlns:a16="http://schemas.microsoft.com/office/drawing/2014/main" id="{8A8B2820-6B8F-4C19-BFC5-D28EE44E54CB}"/>
+                </a:ext>
+                <a:ext uri="{C183D7F6-B498-43B3-948B-1728B52AA6E4}">
+                  <adec:decorative xmlns:adec="http://schemas.microsoft.com/office/drawing/2017/decorative" val="1"/>
+                </a:ext>
+              </a:extLst>
+            </p:cNvPr>
+            <p:cNvSpPr/>
+            <p:nvPr>
+              <p:extLst>
+                <p:ext uri="{386F3935-93C4-4BCD-93E2-E3B085C9AB24}">
+                  <p16:designElem xmlns:p16="http://schemas.microsoft.com/office/powerpoint/2015/main" val="1"/>
+                </p:ext>
+              </p:extLst>
+            </p:nvPr>
+          </p:nvSpPr>
+          <p:spPr bwMode="auto">
+            <a:xfrm>
+              <a:off x="2928938" y="2582862"/>
+              <a:ext cx="2693987" cy="4275138"/>
+            </a:xfrm>
+            <a:custGeom>
+              <a:avLst/>
+              <a:gdLst/>
+              <a:ahLst/>
+              <a:cxnLst/>
+              <a:rect l="0" t="0" r="r" b="b"/>
+              <a:pathLst>
+                <a:path w="1697" h="2693">
+                  <a:moveTo>
+                    <a:pt x="0" y="0"/>
+                  </a:moveTo>
+                  <a:lnTo>
+                    <a:pt x="1622" y="2693"/>
+                  </a:lnTo>
+                  <a:lnTo>
+                    <a:pt x="1697" y="2693"/>
+                  </a:lnTo>
+                  <a:lnTo>
+                    <a:pt x="0" y="0"/>
+                  </a:lnTo>
+                  <a:close/>
+                </a:path>
+              </a:pathLst>
+            </a:custGeom>
+            <a:solidFill>
+              <a:srgbClr val="262626"/>
+            </a:solidFill>
+            <a:ln>
+              <a:noFill/>
+            </a:ln>
+          </p:spPr>
+        </p:sp>
+        <p:sp>
+          <p:nvSpPr>
+            <p:cNvPr id="14" name="Freeform 13">
+              <a:extLst>
+                <a:ext uri="{FF2B5EF4-FFF2-40B4-BE49-F238E27FC236}">
+                  <a16:creationId xmlns:a16="http://schemas.microsoft.com/office/drawing/2014/main" id="{773528ED-4D37-4A77-A8CA-86B6221C5E82}"/>
+                </a:ext>
+                <a:ext uri="{C183D7F6-B498-43B3-948B-1728B52AA6E4}">
+                  <adec:decorative xmlns:adec="http://schemas.microsoft.com/office/drawing/2017/decorative" val="1"/>
+                </a:ext>
+              </a:extLst>
+            </p:cNvPr>
+            <p:cNvSpPr/>
+            <p:nvPr>
+              <p:extLst>
+                <p:ext uri="{386F3935-93C4-4BCD-93E2-E3B085C9AB24}">
+                  <p16:designElem xmlns:p16="http://schemas.microsoft.com/office/powerpoint/2015/main" val="1"/>
+                </p:ext>
+              </p:extLst>
+            </p:nvPr>
+          </p:nvSpPr>
+          <p:spPr bwMode="auto">
+            <a:xfrm>
+              <a:off x="3371850" y="2692400"/>
+              <a:ext cx="3332162" cy="4165600"/>
+            </a:xfrm>
+            <a:custGeom>
+              <a:avLst/>
+              <a:gdLst/>
+              <a:ahLst/>
+              <a:cxnLst/>
+              <a:rect l="0" t="0" r="r" b="b"/>
+              <a:pathLst>
+                <a:path w="2099" h="2624">
+                  <a:moveTo>
+                    <a:pt x="2099" y="2624"/>
+                  </a:moveTo>
+                  <a:lnTo>
+                    <a:pt x="0" y="0"/>
+                  </a:lnTo>
+                  <a:lnTo>
+                    <a:pt x="2021" y="2624"/>
+                  </a:lnTo>
+                  <a:lnTo>
+                    <a:pt x="2099" y="2624"/>
+                  </a:lnTo>
+                  <a:close/>
+                </a:path>
+              </a:pathLst>
+            </a:custGeom>
+            <a:solidFill>
+              <a:schemeClr val="accent1">
+                <a:lumMod val="50000"/>
+              </a:schemeClr>
+            </a:solidFill>
+            <a:ln>
+              <a:noFill/>
+            </a:ln>
+          </p:spPr>
+        </p:sp>
+        <p:sp>
+          <p:nvSpPr>
+            <p:cNvPr id="15" name="Freeform 14">
+              <a:extLst>
+                <a:ext uri="{FF2B5EF4-FFF2-40B4-BE49-F238E27FC236}">
+                  <a16:creationId xmlns:a16="http://schemas.microsoft.com/office/drawing/2014/main" id="{8A58A902-E944-4399-9A93-A91A6A82B166}"/>
+                </a:ext>
+                <a:ext uri="{C183D7F6-B498-43B3-948B-1728B52AA6E4}">
+                  <adec:decorative xmlns:adec="http://schemas.microsoft.com/office/drawing/2017/decorative" val="1"/>
+                </a:ext>
+              </a:extLst>
+            </p:cNvPr>
+            <p:cNvSpPr/>
+            <p:nvPr>
+              <p:extLst>
+                <p:ext uri="{386F3935-93C4-4BCD-93E2-E3B085C9AB24}">
+                  <p16:designElem xmlns:p16="http://schemas.microsoft.com/office/powerpoint/2015/main" val="1"/>
+                </p:ext>
+              </p:extLst>
+            </p:nvPr>
+          </p:nvSpPr>
+          <p:spPr bwMode="auto">
+            <a:xfrm>
+              <a:off x="3367088" y="2687637"/>
+              <a:ext cx="4576762" cy="4170363"/>
+            </a:xfrm>
+            <a:custGeom>
+              <a:avLst/>
+              <a:gdLst/>
+              <a:ahLst/>
+              <a:cxnLst/>
+              <a:rect l="0" t="0" r="r" b="b"/>
+              <a:pathLst>
+                <a:path w="2883" h="2627">
+                  <a:moveTo>
+                    <a:pt x="0" y="0"/>
+                  </a:moveTo>
+                  <a:lnTo>
+                    <a:pt x="3" y="3"/>
+                  </a:lnTo>
+                  <a:lnTo>
+                    <a:pt x="2102" y="2627"/>
+                  </a:lnTo>
+                  <a:lnTo>
+                    <a:pt x="2883" y="2627"/>
+                  </a:lnTo>
+                  <a:lnTo>
+                    <a:pt x="225" y="57"/>
+                  </a:lnTo>
+                  <a:lnTo>
+                    <a:pt x="0" y="0"/>
+                  </a:lnTo>
+                  <a:close/>
+                </a:path>
+              </a:pathLst>
+            </a:custGeom>
+            <a:solidFill>
+              <a:schemeClr val="accent1">
+                <a:lumMod val="75000"/>
+              </a:schemeClr>
+            </a:solidFill>
+            <a:ln>
+              <a:noFill/>
+            </a:ln>
+          </p:spPr>
+        </p:sp>
+        <p:sp>
+          <p:nvSpPr>
+            <p:cNvPr id="29" name="Freeform 15">
+              <a:extLst>
+                <a:ext uri="{FF2B5EF4-FFF2-40B4-BE49-F238E27FC236}">
+                  <a16:creationId xmlns:a16="http://schemas.microsoft.com/office/drawing/2014/main" id="{4EDB1155-2E8E-4FB8-AD42-101FE4383231}"/>
+                </a:ext>
+                <a:ext uri="{C183D7F6-B498-43B3-948B-1728B52AA6E4}">
+                  <adec:decorative xmlns:adec="http://schemas.microsoft.com/office/drawing/2017/decorative" val="1"/>
+                </a:ext>
+              </a:extLst>
+            </p:cNvPr>
+            <p:cNvSpPr/>
+            <p:nvPr>
+              <p:extLst>
+                <p:ext uri="{386F3935-93C4-4BCD-93E2-E3B085C9AB24}">
+                  <p16:designElem xmlns:p16="http://schemas.microsoft.com/office/powerpoint/2015/main" val="1"/>
+                </p:ext>
+              </p:extLst>
+            </p:nvPr>
+          </p:nvSpPr>
+          <p:spPr bwMode="auto">
+            <a:xfrm>
+              <a:off x="2928938" y="2578100"/>
+              <a:ext cx="3584575" cy="4279900"/>
+            </a:xfrm>
+            <a:custGeom>
+              <a:avLst/>
+              <a:gdLst/>
+              <a:ahLst/>
+              <a:cxnLst/>
+              <a:rect l="0" t="0" r="r" b="b"/>
+              <a:pathLst>
+                <a:path w="2258" h="2696">
+                  <a:moveTo>
+                    <a:pt x="2258" y="2696"/>
+                  </a:moveTo>
+                  <a:lnTo>
+                    <a:pt x="264" y="111"/>
+                  </a:lnTo>
+                  <a:lnTo>
+                    <a:pt x="228" y="60"/>
+                  </a:lnTo>
+                  <a:lnTo>
+                    <a:pt x="225" y="57"/>
+                  </a:lnTo>
+                  <a:lnTo>
+                    <a:pt x="0" y="0"/>
+                  </a:lnTo>
+                  <a:lnTo>
+                    <a:pt x="0" y="3"/>
+                  </a:lnTo>
+                  <a:lnTo>
+                    <a:pt x="1697" y="2696"/>
+                  </a:lnTo>
+                  <a:lnTo>
+                    <a:pt x="2258" y="2696"/>
+                  </a:lnTo>
+                  <a:close/>
+                </a:path>
+              </a:pathLst>
+            </a:custGeom>
+            <a:solidFill>
+              <a:srgbClr val="404040"/>
+            </a:solidFill>
+            <a:ln>
+              <a:noFill/>
+            </a:ln>
+          </p:spPr>
+        </p:sp>
+      </p:grpSp>
+      <p:sp>
+        <p:nvSpPr>
+          <p:cNvPr id="17" name="TextBox 3">
+            <a:extLst>
+              <a:ext uri="{FF2B5EF4-FFF2-40B4-BE49-F238E27FC236}">
+                <a16:creationId xmlns:a16="http://schemas.microsoft.com/office/drawing/2014/main" id="{2A5FEA72-990F-429C-97C8-1F5D7514F2E8}"/>
+              </a:ext>
+            </a:extLst>
+          </p:cNvPr>
+          <p:cNvSpPr txBox="1"/>
+          <p:nvPr/>
+        </p:nvSpPr>
+        <p:spPr>
+          <a:xfrm>
+            <a:off x="417514" y="1344940"/>
+            <a:ext cx="9621834" cy="2381626"/>
+          </a:xfrm>
+          <a:prstGeom prst="rect">
+            <a:avLst/>
+          </a:prstGeom>
+        </p:spPr>
+        <p:txBody>
+          <a:bodyPr rot="0" spcFirstLastPara="0" vertOverflow="overflow" horzOverflow="overflow" vert="horz" lIns="91440" tIns="45720" rIns="91440" bIns="45720" numCol="1" spcCol="0" rtlCol="0" fromWordArt="0" anchor="t" anchorCtr="0" forceAA="0" compatLnSpc="1">
+            <a:prstTxWarp prst="textNoShape">
+              <a:avLst/>
+            </a:prstTxWarp>
+            <a:noAutofit/>
+          </a:bodyPr>
+          <a:lstStyle/>
+          <a:p>
+            <a:pPr marL="1028700" lvl="1" indent="-571500" defTabSz="457200">
+              <a:lnSpc>
+                <a:spcPct val="120000"/>
+              </a:lnSpc>
+              <a:spcBef>
+                <a:spcPct val="20000"/>
+              </a:spcBef>
+              <a:spcAft>
+                <a:spcPts val="600"/>
+              </a:spcAft>
+              <a:buClr>
+                <a:schemeClr val="accent1">
+                  <a:lumMod val="75000"/>
+                </a:schemeClr>
+              </a:buClr>
+              <a:buSzPct val="145000"/>
+              <a:buFont typeface="Arial"/>
+              <a:buChar char="•"/>
+            </a:pPr>
+            <a:r>
+              <a:rPr lang="en-US" sz="2800" dirty="0"/>
+              <a:t>Faster and very fast presets seems to perform better compression in lower time than slower presets</a:t>
+            </a:r>
+          </a:p>
+          <a:p>
+            <a:pPr marL="1028700" lvl="1" indent="-571500" defTabSz="457200">
+              <a:lnSpc>
+                <a:spcPct val="120000"/>
+              </a:lnSpc>
+              <a:spcBef>
+                <a:spcPct val="20000"/>
+              </a:spcBef>
+              <a:spcAft>
+                <a:spcPts val="600"/>
+              </a:spcAft>
+              <a:buClr>
+                <a:schemeClr val="accent1">
+                  <a:lumMod val="75000"/>
+                </a:schemeClr>
+              </a:buClr>
+              <a:buSzPct val="145000"/>
+              <a:buFont typeface="Arial"/>
+              <a:buChar char="•"/>
+            </a:pPr>
+            <a:r>
+              <a:rPr lang="en-US" sz="2800" dirty="0"/>
+              <a:t>This behavior spot an inaccurate software implementation of the standard</a:t>
+            </a:r>
+          </a:p>
+        </p:txBody>
+      </p:sp>
+      <p:sp>
+        <p:nvSpPr>
+          <p:cNvPr id="18" name="CasellaDiTesto 17">
+            <a:extLst>
+              <a:ext uri="{FF2B5EF4-FFF2-40B4-BE49-F238E27FC236}">
+                <a16:creationId xmlns:a16="http://schemas.microsoft.com/office/drawing/2014/main" id="{4E605B0C-FABE-4BA7-91EE-6E73B62AF6DA}"/>
+              </a:ext>
+            </a:extLst>
+          </p:cNvPr>
+          <p:cNvSpPr txBox="1"/>
+          <p:nvPr/>
+        </p:nvSpPr>
+        <p:spPr>
+          <a:xfrm>
+            <a:off x="970586" y="374262"/>
+            <a:ext cx="7697902" cy="769441"/>
+          </a:xfrm>
+          <a:prstGeom prst="rect">
+            <a:avLst/>
+          </a:prstGeom>
+          <a:noFill/>
+        </p:spPr>
+        <p:txBody>
+          <a:bodyPr wrap="square">
+            <a:spAutoFit/>
+          </a:bodyPr>
+          <a:lstStyle/>
+          <a:p>
+            <a:pPr algn="ctr"/>
+            <a:r>
+              <a:rPr lang="it-IT" sz="4400" dirty="0"/>
+              <a:t>Software </a:t>
+            </a:r>
+            <a:r>
+              <a:rPr lang="it-IT" sz="4400" dirty="0" err="1"/>
+              <a:t>presets</a:t>
+            </a:r>
+            <a:r>
+              <a:rPr lang="it-IT" sz="4400" dirty="0"/>
+              <a:t> </a:t>
+            </a:r>
+            <a:r>
+              <a:rPr lang="it-IT" sz="4400" dirty="0" err="1">
+                <a:solidFill>
+                  <a:srgbClr val="9900CC"/>
+                </a:solidFill>
+              </a:rPr>
+              <a:t>outliers</a:t>
+            </a:r>
+            <a:endParaRPr lang="it-IT" sz="4400" dirty="0">
+              <a:solidFill>
+                <a:srgbClr val="9900CC"/>
+              </a:solidFill>
+            </a:endParaRPr>
+          </a:p>
+        </p:txBody>
+      </p:sp>
+      <p:sp>
+        <p:nvSpPr>
+          <p:cNvPr id="19" name="CasellaDiTesto 18">
+            <a:extLst>
+              <a:ext uri="{FF2B5EF4-FFF2-40B4-BE49-F238E27FC236}">
+                <a16:creationId xmlns:a16="http://schemas.microsoft.com/office/drawing/2014/main" id="{715F0A41-E311-44D4-B9B3-D8A086BB7FD2}"/>
+              </a:ext>
+            </a:extLst>
+          </p:cNvPr>
+          <p:cNvSpPr txBox="1"/>
+          <p:nvPr/>
+        </p:nvSpPr>
+        <p:spPr>
+          <a:xfrm>
+            <a:off x="430211" y="3831341"/>
+            <a:ext cx="7335838" cy="2126095"/>
+          </a:xfrm>
+          <a:prstGeom prst="rect">
+            <a:avLst/>
+          </a:prstGeom>
+          <a:noFill/>
+        </p:spPr>
+        <p:txBody>
+          <a:bodyPr wrap="square">
+            <a:spAutoFit/>
+          </a:bodyPr>
+          <a:lstStyle/>
+          <a:p>
+            <a:pPr marL="1028700" lvl="1" indent="-571500" defTabSz="457200">
+              <a:lnSpc>
+                <a:spcPct val="120000"/>
+              </a:lnSpc>
+              <a:spcBef>
+                <a:spcPct val="20000"/>
+              </a:spcBef>
+              <a:spcAft>
+                <a:spcPts val="600"/>
+              </a:spcAft>
+              <a:buClr>
+                <a:schemeClr val="accent1">
+                  <a:lumMod val="75000"/>
+                </a:schemeClr>
+              </a:buClr>
+              <a:buSzPct val="145000"/>
+              <a:buFont typeface="Arial"/>
+              <a:buChar char="•"/>
+            </a:pPr>
+            <a:r>
+              <a:rPr lang="en-US" sz="2800" dirty="0"/>
+              <a:t>The algorithm is probably degrading the quality of the output in order to obtain better performance, despite the constant quality constraint</a:t>
+            </a:r>
+            <a:endParaRPr lang="en-US" sz="3200" dirty="0"/>
+          </a:p>
+        </p:txBody>
+      </p:sp>
+      <p:pic>
+        <p:nvPicPr>
+          <p:cNvPr id="5" name="Elemento grafico 4" descr="Immagini con riempimento a tinta unita">
+            <a:extLst>
+              <a:ext uri="{FF2B5EF4-FFF2-40B4-BE49-F238E27FC236}">
+                <a16:creationId xmlns:a16="http://schemas.microsoft.com/office/drawing/2014/main" id="{EF91EE6A-9306-4285-A764-C84D0D41178B}"/>
+              </a:ext>
+            </a:extLst>
+          </p:cNvPr>
+          <p:cNvPicPr>
+            <a:picLocks noChangeAspect="1"/>
+          </p:cNvPicPr>
+          <p:nvPr/>
+        </p:nvPicPr>
+        <p:blipFill>
+          <a:blip r:embed="rId2">
+            <a:extLst>
+              <a:ext uri="{28A0092B-C50C-407E-A947-70E740481C1C}">
+                <a14:useLocalDpi xmlns:a14="http://schemas.microsoft.com/office/drawing/2010/main" val="0"/>
+              </a:ext>
+              <a:ext uri="{96DAC541-7B7A-43D3-8B79-37D633B846F1}">
+                <asvg:svgBlip xmlns:asvg="http://schemas.microsoft.com/office/drawing/2016/SVG/main" r:embed="rId3"/>
+              </a:ext>
+            </a:extLst>
+          </a:blip>
+          <a:stretch>
+            <a:fillRect/>
+          </a:stretch>
+        </p:blipFill>
+        <p:spPr>
+          <a:xfrm>
+            <a:off x="7918762" y="2790188"/>
+            <a:ext cx="1277624" cy="1277624"/>
+          </a:xfrm>
+          <a:prstGeom prst="rect">
+            <a:avLst/>
+          </a:prstGeom>
+        </p:spPr>
+      </p:pic>
+    </p:spTree>
+    <p:extLst>
+      <p:ext uri="{BB962C8B-B14F-4D97-AF65-F5344CB8AC3E}">
+        <p14:creationId xmlns:p14="http://schemas.microsoft.com/office/powerpoint/2010/main" val="476016624"/>
+      </p:ext>
+    </p:extLst>
+  </p:cSld>
+  <p:clrMapOvr>
+    <a:overrideClrMapping bg1="dk1" tx1="lt1" bg2="dk2" tx2="lt2" accent1="accent1" accent2="accent2" accent3="accent3" accent4="accent4" accent5="accent5" accent6="accent6" hlink="hlink" folHlink="folHlink"/>
+  </p:clrMapOvr>
+  <p:timing>
+    <p:tnLst>
+      <p:par>
+        <p:cTn id="1" dur="indefinite" restart="never" nodeType="tmRoot">
+          <p:childTnLst>
+            <p:seq concurrent="1" nextAc="seek">
+              <p:cTn id="2" dur="indefinite" nodeType="mainSeq">
+                <p:childTnLst>
+                  <p:par>
+                    <p:cTn id="3" fill="hold">
+                      <p:stCondLst>
+                        <p:cond delay="indefinite"/>
+                      </p:stCondLst>
+                      <p:childTnLst>
+                        <p:par>
+                          <p:cTn id="4" fill="hold">
+                            <p:stCondLst>
+                              <p:cond delay="0"/>
+                            </p:stCondLst>
+                            <p:childTnLst>
+                              <p:par>
+                                <p:cTn id="5" presetID="10" presetClass="entr" presetSubtype="0" fill="hold" grpId="0" nodeType="clickEffect">
+                                  <p:stCondLst>
+                                    <p:cond delay="0"/>
+                                  </p:stCondLst>
+                                  <p:childTnLst>
+                                    <p:set>
+                                      <p:cBhvr>
+                                        <p:cTn id="6" dur="1" fill="hold">
+                                          <p:stCondLst>
+                                            <p:cond delay="0"/>
+                                          </p:stCondLst>
+                                        </p:cTn>
+                                        <p:tgtEl>
+                                          <p:spTgt spid="17">
+                                            <p:txEl>
+                                              <p:pRg st="0" end="0"/>
+                                            </p:txEl>
+                                          </p:spTgt>
+                                        </p:tgtEl>
+                                        <p:attrNameLst>
+                                          <p:attrName>style.visibility</p:attrName>
+                                        </p:attrNameLst>
+                                      </p:cBhvr>
+                                      <p:to>
+                                        <p:strVal val="visible"/>
+                                      </p:to>
+                                    </p:set>
+                                    <p:animEffect transition="in" filter="fade">
+                                      <p:cBhvr>
+                                        <p:cTn id="7" dur="500"/>
+                                        <p:tgtEl>
+                                          <p:spTgt spid="17">
+                                            <p:txEl>
+                                              <p:pRg st="0" end="0"/>
+                                            </p:txEl>
+                                          </p:spTgt>
+                                        </p:tgtEl>
+                                      </p:cBhvr>
+                                    </p:animEffect>
+                                  </p:childTnLst>
+                                </p:cTn>
+                              </p:par>
+                              <p:par>
+                                <p:cTn id="8" presetID="10" presetClass="entr" presetSubtype="0" fill="hold" grpId="0" nodeType="withEffect">
+                                  <p:stCondLst>
+                                    <p:cond delay="0"/>
+                                  </p:stCondLst>
+                                  <p:childTnLst>
+                                    <p:set>
+                                      <p:cBhvr>
+                                        <p:cTn id="9" dur="1" fill="hold">
+                                          <p:stCondLst>
+                                            <p:cond delay="0"/>
+                                          </p:stCondLst>
+                                        </p:cTn>
+                                        <p:tgtEl>
+                                          <p:spTgt spid="17">
+                                            <p:txEl>
+                                              <p:pRg st="1" end="1"/>
+                                            </p:txEl>
+                                          </p:spTgt>
+                                        </p:tgtEl>
+                                        <p:attrNameLst>
+                                          <p:attrName>style.visibility</p:attrName>
+                                        </p:attrNameLst>
+                                      </p:cBhvr>
+                                      <p:to>
+                                        <p:strVal val="visible"/>
+                                      </p:to>
+                                    </p:set>
+                                    <p:animEffect transition="in" filter="fade">
+                                      <p:cBhvr>
+                                        <p:cTn id="10" dur="500"/>
+                                        <p:tgtEl>
+                                          <p:spTgt spid="17">
+                                            <p:txEl>
+                                              <p:pRg st="1" end="1"/>
+                                            </p:txEl>
+                                          </p:spTgt>
+                                        </p:tgtEl>
+                                      </p:cBhvr>
+                                    </p:animEffect>
+                                  </p:childTnLst>
+                                </p:cTn>
+                              </p:par>
+                            </p:childTnLst>
+                          </p:cTn>
+                        </p:par>
+                      </p:childTnLst>
+                    </p:cTn>
+                  </p:par>
+                </p:childTnLst>
+              </p:cTn>
+              <p:prevCondLst>
+                <p:cond evt="onPrev" delay="0">
+                  <p:tgtEl>
+                    <p:sldTgt/>
+                  </p:tgtEl>
+                </p:cond>
+              </p:prevCondLst>
+              <p:nextCondLst>
+                <p:cond evt="onNext" delay="0">
+                  <p:tgtEl>
+                    <p:sldTgt/>
+                  </p:tgtEl>
+                </p:cond>
+              </p:nextCondLst>
+            </p:seq>
+          </p:childTnLst>
+        </p:cTn>
+      </p:par>
+    </p:tnLst>
+    <p:bldLst>
+      <p:bldP spid="17" grpId="0" uiExpand="1" build="p"/>
+    </p:bldLst>
+  </p:timing>
+</p:sld>
+</file>
+
+<file path=ppt/slides/slide21.xml><?xml version="1.0" encoding="utf-8"?>
+<p:sld xmlns:a="http://schemas.openxmlformats.org/drawingml/2006/main" xmlns:r="http://schemas.openxmlformats.org/officeDocument/2006/relationships" xmlns:p="http://schemas.openxmlformats.org/presentationml/2006/main">
+  <p:cSld>
+    <p:bg>
+      <p:bgPr>
+        <a:solidFill>
+          <a:schemeClr val="bg2"/>
+        </a:solidFill>
+        <a:effectLst/>
+      </p:bgPr>
+    </p:bg>
+    <p:spTree>
+      <p:nvGrpSpPr>
+        <p:cNvPr id="1" name=""/>
+        <p:cNvGrpSpPr/>
+        <p:nvPr/>
+      </p:nvGrpSpPr>
+      <p:grpSpPr>
+        <a:xfrm>
+          <a:off x="0" y="0"/>
+          <a:ext cx="0" cy="0"/>
+          <a:chOff x="0" y="0"/>
+          <a:chExt cx="0" cy="0"/>
+        </a:xfrm>
+      </p:grpSpPr>
+      <p:sp useBgFill="1">
+        <p:nvSpPr>
+          <p:cNvPr id="28" name="Rectangle 7">
+            <a:extLst>
+              <a:ext uri="{FF2B5EF4-FFF2-40B4-BE49-F238E27FC236}">
+                <a16:creationId xmlns:a16="http://schemas.microsoft.com/office/drawing/2014/main" id="{99CAC3B1-4879-424D-8F15-206277196159}"/>
+              </a:ext>
+              <a:ext uri="{C183D7F6-B498-43B3-948B-1728B52AA6E4}">
+                <adec:decorative xmlns:adec="http://schemas.microsoft.com/office/drawing/2017/decorative" val="1"/>
+              </a:ext>
+            </a:extLst>
+          </p:cNvPr>
+          <p:cNvSpPr>
+            <a:spLocks noGrp="1" noRot="1" noChangeAspect="1" noMove="1" noResize="1" noEditPoints="1" noAdjustHandles="1" noChangeArrowheads="1" noChangeShapeType="1" noTextEdit="1"/>
+          </p:cNvSpPr>
+          <p:nvPr>
+            <p:extLst>
+              <p:ext uri="{386F3935-93C4-4BCD-93E2-E3B085C9AB24}">
+                <p16:designElem xmlns:p16="http://schemas.microsoft.com/office/powerpoint/2015/main" val="1"/>
+              </p:ext>
+            </p:extLst>
+          </p:nvPr>
+        </p:nvSpPr>
+        <p:spPr>
+          <a:xfrm>
+            <a:off x="0" y="0"/>
+            <a:ext cx="12192000" cy="6858000"/>
+          </a:xfrm>
+          <a:prstGeom prst="rect">
+            <a:avLst/>
+          </a:prstGeom>
+          <a:ln>
+            <a:noFill/>
+          </a:ln>
+        </p:spPr>
+        <p:style>
+          <a:lnRef idx="2">
+            <a:schemeClr val="accent1">
+              <a:shade val="50000"/>
+            </a:schemeClr>
+          </a:lnRef>
+          <a:fillRef idx="1">
+            <a:schemeClr val="accent1"/>
+          </a:fillRef>
+          <a:effectRef idx="0">
+            <a:schemeClr val="accent1"/>
+          </a:effectRef>
+          <a:fontRef idx="minor">
+            <a:schemeClr val="lt1"/>
+          </a:fontRef>
+        </p:style>
+        <p:txBody>
+          <a:bodyPr rtlCol="0" anchor="ctr"/>
+          <a:lstStyle/>
+          <a:p>
+            <a:pPr algn="ctr"/>
+            <a:endParaRPr lang="en-US"/>
+          </a:p>
+        </p:txBody>
+      </p:sp>
+      <p:grpSp>
+        <p:nvGrpSpPr>
+          <p:cNvPr id="10" name="Group 9">
+            <a:extLst>
+              <a:ext uri="{FF2B5EF4-FFF2-40B4-BE49-F238E27FC236}">
+                <a16:creationId xmlns:a16="http://schemas.microsoft.com/office/drawing/2014/main" id="{4B8492CB-DFBA-4A82-9778-F21493DA36C1}"/>
+              </a:ext>
+              <a:ext uri="{C183D7F6-B498-43B3-948B-1728B52AA6E4}">
+                <adec:decorative xmlns:adec="http://schemas.microsoft.com/office/drawing/2017/decorative" val="1"/>
+              </a:ext>
+            </a:extLst>
+          </p:cNvPr>
+          <p:cNvGrpSpPr>
+            <a:grpSpLocks noGrp="1" noUngrp="1" noRot="1" noChangeAspect="1" noMove="1" noResize="1"/>
+          </p:cNvGrpSpPr>
+          <p:nvPr>
+            <p:extLst>
+              <p:ext uri="{386F3935-93C4-4BCD-93E2-E3B085C9AB24}">
+                <p16:designElem xmlns:p16="http://schemas.microsoft.com/office/powerpoint/2015/main" val="1"/>
+              </p:ext>
+            </p:extLst>
+          </p:nvPr>
+        </p:nvGrpSpPr>
+        <p:grpSpPr>
+          <a:xfrm flipH="1">
+            <a:off x="6526211" y="0"/>
+            <a:ext cx="5014912" cy="6862763"/>
+            <a:chOff x="2928938" y="-4763"/>
+            <a:chExt cx="5014912" cy="6862763"/>
+          </a:xfrm>
+        </p:grpSpPr>
+        <p:sp>
+          <p:nvSpPr>
+            <p:cNvPr id="11" name="Freeform 6">
+              <a:extLst>
+                <a:ext uri="{FF2B5EF4-FFF2-40B4-BE49-F238E27FC236}">
+                  <a16:creationId xmlns:a16="http://schemas.microsoft.com/office/drawing/2014/main" id="{E34CC1C8-EBDD-4AEA-83E6-B27575B62E2E}"/>
+                </a:ext>
+                <a:ext uri="{C183D7F6-B498-43B3-948B-1728B52AA6E4}">
+                  <adec:decorative xmlns:adec="http://schemas.microsoft.com/office/drawing/2017/decorative" val="1"/>
+                </a:ext>
+              </a:extLst>
+            </p:cNvPr>
+            <p:cNvSpPr/>
+            <p:nvPr>
+              <p:extLst>
+                <p:ext uri="{386F3935-93C4-4BCD-93E2-E3B085C9AB24}">
+                  <p16:designElem xmlns:p16="http://schemas.microsoft.com/office/powerpoint/2015/main" val="1"/>
+                </p:ext>
+              </p:extLst>
+            </p:nvPr>
+          </p:nvSpPr>
+          <p:spPr bwMode="auto">
+            <a:xfrm>
+              <a:off x="3367088" y="-4763"/>
+              <a:ext cx="1063625" cy="2782888"/>
+            </a:xfrm>
+            <a:custGeom>
+              <a:avLst/>
+              <a:gdLst/>
+              <a:ahLst/>
+              <a:cxnLst/>
+              <a:rect l="0" t="0" r="r" b="b"/>
+              <a:pathLst>
+                <a:path w="670" h="1753">
+                  <a:moveTo>
+                    <a:pt x="0" y="1696"/>
+                  </a:moveTo>
+                  <a:lnTo>
+                    <a:pt x="225" y="1753"/>
+                  </a:lnTo>
+                  <a:lnTo>
+                    <a:pt x="670" y="0"/>
+                  </a:lnTo>
+                  <a:lnTo>
+                    <a:pt x="430" y="0"/>
+                  </a:lnTo>
+                  <a:lnTo>
+                    <a:pt x="0" y="1696"/>
+                  </a:lnTo>
+                  <a:close/>
+                </a:path>
+              </a:pathLst>
+            </a:custGeom>
+            <a:solidFill>
+              <a:schemeClr val="accent1"/>
+            </a:solidFill>
+            <a:ln>
+              <a:noFill/>
+            </a:ln>
+          </p:spPr>
+        </p:sp>
+        <p:sp>
+          <p:nvSpPr>
+            <p:cNvPr id="12" name="Freeform 7">
+              <a:extLst>
+                <a:ext uri="{FF2B5EF4-FFF2-40B4-BE49-F238E27FC236}">
+                  <a16:creationId xmlns:a16="http://schemas.microsoft.com/office/drawing/2014/main" id="{D6B38644-B85D-4211-9526-5B4C2A662BF7}"/>
+                </a:ext>
+                <a:ext uri="{C183D7F6-B498-43B3-948B-1728B52AA6E4}">
+                  <adec:decorative xmlns:adec="http://schemas.microsoft.com/office/drawing/2017/decorative" val="1"/>
+                </a:ext>
+              </a:extLst>
+            </p:cNvPr>
+            <p:cNvSpPr/>
+            <p:nvPr>
+              <p:extLst>
+                <p:ext uri="{386F3935-93C4-4BCD-93E2-E3B085C9AB24}">
+                  <p16:designElem xmlns:p16="http://schemas.microsoft.com/office/powerpoint/2015/main" val="1"/>
+                </p:ext>
+              </p:extLst>
+            </p:nvPr>
+          </p:nvSpPr>
+          <p:spPr bwMode="auto">
+            <a:xfrm>
+              <a:off x="2928938" y="-4763"/>
+              <a:ext cx="1035050" cy="2673350"/>
+            </a:xfrm>
+            <a:custGeom>
+              <a:avLst/>
+              <a:gdLst/>
+              <a:ahLst/>
+              <a:cxnLst/>
+              <a:rect l="0" t="0" r="r" b="b"/>
+              <a:pathLst>
+                <a:path w="652" h="1684">
+                  <a:moveTo>
+                    <a:pt x="225" y="1684"/>
+                  </a:moveTo>
+                  <a:lnTo>
+                    <a:pt x="652" y="0"/>
+                  </a:lnTo>
+                  <a:lnTo>
+                    <a:pt x="411" y="0"/>
+                  </a:lnTo>
+                  <a:lnTo>
+                    <a:pt x="0" y="1627"/>
+                  </a:lnTo>
+                  <a:lnTo>
+                    <a:pt x="219" y="1681"/>
+                  </a:lnTo>
+                  <a:lnTo>
+                    <a:pt x="225" y="1684"/>
+                  </a:lnTo>
+                  <a:close/>
+                </a:path>
+              </a:pathLst>
+            </a:custGeom>
+            <a:solidFill>
+              <a:srgbClr val="595959"/>
+            </a:solidFill>
+            <a:ln>
+              <a:noFill/>
+            </a:ln>
+          </p:spPr>
+        </p:sp>
+        <p:sp>
+          <p:nvSpPr>
+            <p:cNvPr id="13" name="Freeform 12">
+              <a:extLst>
+                <a:ext uri="{FF2B5EF4-FFF2-40B4-BE49-F238E27FC236}">
+                  <a16:creationId xmlns:a16="http://schemas.microsoft.com/office/drawing/2014/main" id="{8A8B2820-6B8F-4C19-BFC5-D28EE44E54CB}"/>
+                </a:ext>
+                <a:ext uri="{C183D7F6-B498-43B3-948B-1728B52AA6E4}">
+                  <adec:decorative xmlns:adec="http://schemas.microsoft.com/office/drawing/2017/decorative" val="1"/>
+                </a:ext>
+              </a:extLst>
+            </p:cNvPr>
+            <p:cNvSpPr/>
+            <p:nvPr>
+              <p:extLst>
+                <p:ext uri="{386F3935-93C4-4BCD-93E2-E3B085C9AB24}">
+                  <p16:designElem xmlns:p16="http://schemas.microsoft.com/office/powerpoint/2015/main" val="1"/>
+                </p:ext>
+              </p:extLst>
+            </p:nvPr>
+          </p:nvSpPr>
+          <p:spPr bwMode="auto">
+            <a:xfrm>
+              <a:off x="2928938" y="2582862"/>
+              <a:ext cx="2693987" cy="4275138"/>
+            </a:xfrm>
+            <a:custGeom>
+              <a:avLst/>
+              <a:gdLst/>
+              <a:ahLst/>
+              <a:cxnLst/>
+              <a:rect l="0" t="0" r="r" b="b"/>
+              <a:pathLst>
+                <a:path w="1697" h="2693">
+                  <a:moveTo>
+                    <a:pt x="0" y="0"/>
+                  </a:moveTo>
+                  <a:lnTo>
+                    <a:pt x="1622" y="2693"/>
+                  </a:lnTo>
+                  <a:lnTo>
+                    <a:pt x="1697" y="2693"/>
+                  </a:lnTo>
+                  <a:lnTo>
+                    <a:pt x="0" y="0"/>
+                  </a:lnTo>
+                  <a:close/>
+                </a:path>
+              </a:pathLst>
+            </a:custGeom>
+            <a:solidFill>
+              <a:srgbClr val="262626"/>
+            </a:solidFill>
+            <a:ln>
+              <a:noFill/>
+            </a:ln>
+          </p:spPr>
+        </p:sp>
+        <p:sp>
+          <p:nvSpPr>
+            <p:cNvPr id="14" name="Freeform 13">
+              <a:extLst>
+                <a:ext uri="{FF2B5EF4-FFF2-40B4-BE49-F238E27FC236}">
+                  <a16:creationId xmlns:a16="http://schemas.microsoft.com/office/drawing/2014/main" id="{773528ED-4D37-4A77-A8CA-86B6221C5E82}"/>
+                </a:ext>
+                <a:ext uri="{C183D7F6-B498-43B3-948B-1728B52AA6E4}">
+                  <adec:decorative xmlns:adec="http://schemas.microsoft.com/office/drawing/2017/decorative" val="1"/>
+                </a:ext>
+              </a:extLst>
+            </p:cNvPr>
+            <p:cNvSpPr/>
+            <p:nvPr>
+              <p:extLst>
+                <p:ext uri="{386F3935-93C4-4BCD-93E2-E3B085C9AB24}">
+                  <p16:designElem xmlns:p16="http://schemas.microsoft.com/office/powerpoint/2015/main" val="1"/>
+                </p:ext>
+              </p:extLst>
+            </p:nvPr>
+          </p:nvSpPr>
+          <p:spPr bwMode="auto">
+            <a:xfrm>
+              <a:off x="3371850" y="2692400"/>
+              <a:ext cx="3332162" cy="4165600"/>
+            </a:xfrm>
+            <a:custGeom>
+              <a:avLst/>
+              <a:gdLst/>
+              <a:ahLst/>
+              <a:cxnLst/>
+              <a:rect l="0" t="0" r="r" b="b"/>
+              <a:pathLst>
+                <a:path w="2099" h="2624">
+                  <a:moveTo>
+                    <a:pt x="2099" y="2624"/>
+                  </a:moveTo>
+                  <a:lnTo>
+                    <a:pt x="0" y="0"/>
+                  </a:lnTo>
+                  <a:lnTo>
+                    <a:pt x="2021" y="2624"/>
+                  </a:lnTo>
+                  <a:lnTo>
+                    <a:pt x="2099" y="2624"/>
+                  </a:lnTo>
+                  <a:close/>
+                </a:path>
+              </a:pathLst>
+            </a:custGeom>
+            <a:solidFill>
+              <a:schemeClr val="accent1">
+                <a:lumMod val="50000"/>
+              </a:schemeClr>
+            </a:solidFill>
+            <a:ln>
+              <a:noFill/>
+            </a:ln>
+          </p:spPr>
+        </p:sp>
+        <p:sp>
+          <p:nvSpPr>
+            <p:cNvPr id="15" name="Freeform 14">
+              <a:extLst>
+                <a:ext uri="{FF2B5EF4-FFF2-40B4-BE49-F238E27FC236}">
+                  <a16:creationId xmlns:a16="http://schemas.microsoft.com/office/drawing/2014/main" id="{8A58A902-E944-4399-9A93-A91A6A82B166}"/>
+                </a:ext>
+                <a:ext uri="{C183D7F6-B498-43B3-948B-1728B52AA6E4}">
+                  <adec:decorative xmlns:adec="http://schemas.microsoft.com/office/drawing/2017/decorative" val="1"/>
+                </a:ext>
+              </a:extLst>
+            </p:cNvPr>
+            <p:cNvSpPr/>
+            <p:nvPr>
+              <p:extLst>
+                <p:ext uri="{386F3935-93C4-4BCD-93E2-E3B085C9AB24}">
+                  <p16:designElem xmlns:p16="http://schemas.microsoft.com/office/powerpoint/2015/main" val="1"/>
+                </p:ext>
+              </p:extLst>
+            </p:nvPr>
+          </p:nvSpPr>
+          <p:spPr bwMode="auto">
+            <a:xfrm>
+              <a:off x="3367088" y="2687637"/>
+              <a:ext cx="4576762" cy="4170363"/>
+            </a:xfrm>
+            <a:custGeom>
+              <a:avLst/>
+              <a:gdLst/>
+              <a:ahLst/>
+              <a:cxnLst/>
+              <a:rect l="0" t="0" r="r" b="b"/>
+              <a:pathLst>
+                <a:path w="2883" h="2627">
+                  <a:moveTo>
+                    <a:pt x="0" y="0"/>
+                  </a:moveTo>
+                  <a:lnTo>
+                    <a:pt x="3" y="3"/>
+                  </a:lnTo>
+                  <a:lnTo>
+                    <a:pt x="2102" y="2627"/>
+                  </a:lnTo>
+                  <a:lnTo>
+                    <a:pt x="2883" y="2627"/>
+                  </a:lnTo>
+                  <a:lnTo>
+                    <a:pt x="225" y="57"/>
+                  </a:lnTo>
+                  <a:lnTo>
+                    <a:pt x="0" y="0"/>
+                  </a:lnTo>
+                  <a:close/>
+                </a:path>
+              </a:pathLst>
+            </a:custGeom>
+            <a:solidFill>
+              <a:schemeClr val="accent1">
+                <a:lumMod val="75000"/>
+              </a:schemeClr>
+            </a:solidFill>
+            <a:ln>
+              <a:noFill/>
+            </a:ln>
+          </p:spPr>
+        </p:sp>
+        <p:sp>
+          <p:nvSpPr>
+            <p:cNvPr id="29" name="Freeform 15">
+              <a:extLst>
+                <a:ext uri="{FF2B5EF4-FFF2-40B4-BE49-F238E27FC236}">
+                  <a16:creationId xmlns:a16="http://schemas.microsoft.com/office/drawing/2014/main" id="{4EDB1155-2E8E-4FB8-AD42-101FE4383231}"/>
+                </a:ext>
+                <a:ext uri="{C183D7F6-B498-43B3-948B-1728B52AA6E4}">
+                  <adec:decorative xmlns:adec="http://schemas.microsoft.com/office/drawing/2017/decorative" val="1"/>
+                </a:ext>
+              </a:extLst>
+            </p:cNvPr>
+            <p:cNvSpPr/>
+            <p:nvPr>
+              <p:extLst>
+                <p:ext uri="{386F3935-93C4-4BCD-93E2-E3B085C9AB24}">
+                  <p16:designElem xmlns:p16="http://schemas.microsoft.com/office/powerpoint/2015/main" val="1"/>
+                </p:ext>
+              </p:extLst>
+            </p:nvPr>
+          </p:nvSpPr>
+          <p:spPr bwMode="auto">
+            <a:xfrm>
+              <a:off x="2928938" y="2578100"/>
+              <a:ext cx="3584575" cy="4279900"/>
+            </a:xfrm>
+            <a:custGeom>
+              <a:avLst/>
+              <a:gdLst/>
+              <a:ahLst/>
+              <a:cxnLst/>
+              <a:rect l="0" t="0" r="r" b="b"/>
+              <a:pathLst>
+                <a:path w="2258" h="2696">
+                  <a:moveTo>
+                    <a:pt x="2258" y="2696"/>
+                  </a:moveTo>
+                  <a:lnTo>
+                    <a:pt x="264" y="111"/>
+                  </a:lnTo>
+                  <a:lnTo>
+                    <a:pt x="228" y="60"/>
+                  </a:lnTo>
+                  <a:lnTo>
+                    <a:pt x="225" y="57"/>
+                  </a:lnTo>
+                  <a:lnTo>
+                    <a:pt x="0" y="0"/>
+                  </a:lnTo>
+                  <a:lnTo>
+                    <a:pt x="0" y="3"/>
+                  </a:lnTo>
+                  <a:lnTo>
+                    <a:pt x="1697" y="2696"/>
+                  </a:lnTo>
+                  <a:lnTo>
+                    <a:pt x="2258" y="2696"/>
+                  </a:lnTo>
+                  <a:close/>
+                </a:path>
+              </a:pathLst>
+            </a:custGeom>
+            <a:solidFill>
+              <a:srgbClr val="404040"/>
+            </a:solidFill>
+            <a:ln>
+              <a:noFill/>
+            </a:ln>
+          </p:spPr>
+        </p:sp>
+      </p:grpSp>
+      <p:sp>
+        <p:nvSpPr>
+          <p:cNvPr id="17" name="TextBox 3">
+            <a:extLst>
+              <a:ext uri="{FF2B5EF4-FFF2-40B4-BE49-F238E27FC236}">
+                <a16:creationId xmlns:a16="http://schemas.microsoft.com/office/drawing/2014/main" id="{2A5FEA72-990F-429C-97C8-1F5D7514F2E8}"/>
+              </a:ext>
+            </a:extLst>
+          </p:cNvPr>
+          <p:cNvSpPr txBox="1"/>
+          <p:nvPr/>
+        </p:nvSpPr>
+        <p:spPr>
+          <a:xfrm>
+            <a:off x="365125" y="1133306"/>
+            <a:ext cx="9045571" cy="1852187"/>
+          </a:xfrm>
+          <a:prstGeom prst="rect">
+            <a:avLst/>
+          </a:prstGeom>
+        </p:spPr>
+        <p:txBody>
+          <a:bodyPr rot="0" spcFirstLastPara="0" vertOverflow="overflow" horzOverflow="overflow" vert="horz" lIns="91440" tIns="45720" rIns="91440" bIns="45720" numCol="1" spcCol="0" rtlCol="0" fromWordArt="0" anchor="t" anchorCtr="0" forceAA="0" compatLnSpc="1">
+            <a:prstTxWarp prst="textNoShape">
+              <a:avLst/>
+            </a:prstTxWarp>
+            <a:noAutofit/>
+          </a:bodyPr>
+          <a:lstStyle/>
+          <a:p>
+            <a:pPr marL="1028700" lvl="1" indent="-571500" defTabSz="457200">
+              <a:lnSpc>
+                <a:spcPct val="150000"/>
+              </a:lnSpc>
+              <a:spcBef>
+                <a:spcPct val="20000"/>
+              </a:spcBef>
+              <a:spcAft>
+                <a:spcPts val="600"/>
+              </a:spcAft>
+              <a:buClr>
+                <a:schemeClr val="accent1">
+                  <a:lumMod val="75000"/>
+                </a:schemeClr>
+              </a:buClr>
+              <a:buSzPct val="145000"/>
+              <a:buFont typeface="Arial"/>
+              <a:buChar char="•"/>
+            </a:pPr>
+            <a:r>
+              <a:rPr lang="en-US" sz="3200" dirty="0"/>
+              <a:t>Software encoding proves to be more versatile</a:t>
+            </a:r>
+          </a:p>
+          <a:p>
+            <a:pPr marL="1028700" lvl="1" indent="-571500" defTabSz="457200">
+              <a:lnSpc>
+                <a:spcPct val="150000"/>
+              </a:lnSpc>
+              <a:spcBef>
+                <a:spcPct val="20000"/>
+              </a:spcBef>
+              <a:spcAft>
+                <a:spcPts val="600"/>
+              </a:spcAft>
+              <a:buClr>
+                <a:schemeClr val="accent1">
+                  <a:lumMod val="75000"/>
+                </a:schemeClr>
+              </a:buClr>
+              <a:buSzPct val="145000"/>
+              <a:buFont typeface="Arial"/>
+              <a:buChar char="•"/>
+            </a:pPr>
+            <a:r>
+              <a:rPr lang="en-US" sz="3200" dirty="0"/>
+              <a:t>High reduction in size, suitable for data to be saved on disk</a:t>
+            </a:r>
+          </a:p>
+        </p:txBody>
+      </p:sp>
+      <p:sp>
+        <p:nvSpPr>
+          <p:cNvPr id="18" name="CasellaDiTesto 17">
+            <a:extLst>
+              <a:ext uri="{FF2B5EF4-FFF2-40B4-BE49-F238E27FC236}">
+                <a16:creationId xmlns:a16="http://schemas.microsoft.com/office/drawing/2014/main" id="{33EC1DCD-4122-4488-AC4F-ED6BC712ACC0}"/>
+              </a:ext>
+            </a:extLst>
+          </p:cNvPr>
+          <p:cNvSpPr txBox="1"/>
+          <p:nvPr/>
+        </p:nvSpPr>
+        <p:spPr>
+          <a:xfrm>
+            <a:off x="1170723" y="339925"/>
+            <a:ext cx="7697902" cy="830997"/>
+          </a:xfrm>
+          <a:prstGeom prst="rect">
+            <a:avLst/>
+          </a:prstGeom>
+          <a:noFill/>
+        </p:spPr>
+        <p:txBody>
+          <a:bodyPr wrap="square">
+            <a:spAutoFit/>
+          </a:bodyPr>
+          <a:lstStyle/>
+          <a:p>
+            <a:pPr algn="ctr"/>
+            <a:r>
+              <a:rPr lang="it-IT" sz="4800" dirty="0" err="1"/>
+              <a:t>Conclusions</a:t>
+            </a:r>
+            <a:endParaRPr lang="it-IT" sz="4400" dirty="0"/>
+          </a:p>
+        </p:txBody>
+      </p:sp>
+      <p:sp>
+        <p:nvSpPr>
+          <p:cNvPr id="19" name="CasellaDiTesto 18">
+            <a:extLst>
+              <a:ext uri="{FF2B5EF4-FFF2-40B4-BE49-F238E27FC236}">
+                <a16:creationId xmlns:a16="http://schemas.microsoft.com/office/drawing/2014/main" id="{2CE26206-708C-4F00-A9F5-493D77E6BAA3}"/>
+              </a:ext>
+            </a:extLst>
+          </p:cNvPr>
+          <p:cNvSpPr txBox="1"/>
+          <p:nvPr/>
+        </p:nvSpPr>
+        <p:spPr>
+          <a:xfrm>
+            <a:off x="237334" y="3606802"/>
+            <a:ext cx="7090565" cy="2232021"/>
+          </a:xfrm>
+          <a:prstGeom prst="rect">
+            <a:avLst/>
+          </a:prstGeom>
+          <a:noFill/>
+        </p:spPr>
+        <p:txBody>
+          <a:bodyPr wrap="square">
+            <a:spAutoFit/>
+          </a:bodyPr>
+          <a:lstStyle/>
+          <a:p>
+            <a:pPr marL="1028700" lvl="1" indent="-571500" defTabSz="457200">
+              <a:lnSpc>
+                <a:spcPct val="150000"/>
+              </a:lnSpc>
+              <a:spcBef>
+                <a:spcPct val="20000"/>
+              </a:spcBef>
+              <a:spcAft>
+                <a:spcPts val="600"/>
+              </a:spcAft>
+              <a:buClr>
+                <a:schemeClr val="accent1">
+                  <a:lumMod val="75000"/>
+                </a:schemeClr>
+              </a:buClr>
+              <a:buSzPct val="145000"/>
+              <a:buFont typeface="Arial"/>
+              <a:buChar char="•"/>
+            </a:pPr>
+            <a:r>
+              <a:rPr lang="en-US" sz="3200" dirty="0"/>
+              <a:t>If encoding speed or energy efficiency is the priority, Hardware implementation is to be preferred</a:t>
+            </a:r>
+          </a:p>
+        </p:txBody>
+      </p:sp>
+      <p:pic>
+        <p:nvPicPr>
+          <p:cNvPr id="5" name="Elemento grafico 4" descr="Bilancia della giustizia con riempimento a tinta unita">
+            <a:extLst>
+              <a:ext uri="{FF2B5EF4-FFF2-40B4-BE49-F238E27FC236}">
+                <a16:creationId xmlns:a16="http://schemas.microsoft.com/office/drawing/2014/main" id="{7768580D-AFDF-4512-BFAF-328BA8F51EE0}"/>
+              </a:ext>
+            </a:extLst>
+          </p:cNvPr>
+          <p:cNvPicPr>
+            <a:picLocks noChangeAspect="1"/>
+          </p:cNvPicPr>
+          <p:nvPr/>
+        </p:nvPicPr>
+        <p:blipFill>
+          <a:blip r:embed="rId2">
+            <a:extLst>
+              <a:ext uri="{28A0092B-C50C-407E-A947-70E740481C1C}">
+                <a14:useLocalDpi xmlns:a14="http://schemas.microsoft.com/office/drawing/2010/main" val="0"/>
+              </a:ext>
+              <a:ext uri="{96DAC541-7B7A-43D3-8B79-37D633B846F1}">
+                <asvg:svgBlip xmlns:asvg="http://schemas.microsoft.com/office/drawing/2016/SVG/main" r:embed="rId3"/>
+              </a:ext>
+            </a:extLst>
+          </a:blip>
+          <a:stretch>
+            <a:fillRect/>
+          </a:stretch>
+        </p:blipFill>
+        <p:spPr>
+          <a:xfrm>
+            <a:off x="6850913" y="2876977"/>
+            <a:ext cx="1558073" cy="1558073"/>
+          </a:xfrm>
+          <a:prstGeom prst="rect">
+            <a:avLst/>
+          </a:prstGeom>
+        </p:spPr>
+      </p:pic>
+    </p:spTree>
+    <p:extLst>
+      <p:ext uri="{BB962C8B-B14F-4D97-AF65-F5344CB8AC3E}">
+        <p14:creationId xmlns:p14="http://schemas.microsoft.com/office/powerpoint/2010/main" val="169592861"/>
+      </p:ext>
+    </p:extLst>
+  </p:cSld>
+  <p:clrMapOvr>
+    <a:overrideClrMapping bg1="dk1" tx1="lt1" bg2="dk2" tx2="lt2" accent1="accent1" accent2="accent2" accent3="accent3" accent4="accent4" accent5="accent5" accent6="accent6" hlink="hlink" folHlink="folHlink"/>
+  </p:clrMapOvr>
+  <p:timing>
+    <p:tnLst>
+      <p:par>
+        <p:cTn id="1" dur="indefinite" restart="never" nodeType="tmRoot">
+          <p:childTnLst>
+            <p:seq concurrent="1" nextAc="seek">
+              <p:cTn id="2" dur="indefinite" nodeType="mainSeq">
+                <p:childTnLst>
+                  <p:par>
+                    <p:cTn id="3" fill="hold">
+                      <p:stCondLst>
+                        <p:cond delay="indefinite"/>
+                      </p:stCondLst>
+                      <p:childTnLst>
+                        <p:par>
+                          <p:cTn id="4" fill="hold">
+                            <p:stCondLst>
+                              <p:cond delay="0"/>
+                            </p:stCondLst>
+                            <p:childTnLst>
+                              <p:par>
+                                <p:cTn id="5" presetID="10" presetClass="entr" presetSubtype="0" fill="hold" grpId="0" nodeType="clickEffect">
+                                  <p:stCondLst>
+                                    <p:cond delay="0"/>
+                                  </p:stCondLst>
+                                  <p:childTnLst>
+                                    <p:set>
+                                      <p:cBhvr>
+                                        <p:cTn id="6" dur="1" fill="hold">
+                                          <p:stCondLst>
+                                            <p:cond delay="0"/>
+                                          </p:stCondLst>
+                                        </p:cTn>
+                                        <p:tgtEl>
+                                          <p:spTgt spid="17">
+                                            <p:txEl>
+                                              <p:pRg st="0" end="0"/>
+                                            </p:txEl>
+                                          </p:spTgt>
+                                        </p:tgtEl>
+                                        <p:attrNameLst>
+                                          <p:attrName>style.visibility</p:attrName>
+                                        </p:attrNameLst>
+                                      </p:cBhvr>
+                                      <p:to>
+                                        <p:strVal val="visible"/>
+                                      </p:to>
+                                    </p:set>
+                                    <p:animEffect transition="in" filter="fade">
+                                      <p:cBhvr>
+                                        <p:cTn id="7" dur="500"/>
+                                        <p:tgtEl>
+                                          <p:spTgt spid="17">
+                                            <p:txEl>
+                                              <p:pRg st="0" end="0"/>
+                                            </p:txEl>
+                                          </p:spTgt>
+                                        </p:tgtEl>
+                                      </p:cBhvr>
+                                    </p:animEffect>
+                                  </p:childTnLst>
+                                </p:cTn>
+                              </p:par>
+                            </p:childTnLst>
+                          </p:cTn>
+                        </p:par>
+                      </p:childTnLst>
+                    </p:cTn>
+                  </p:par>
+                  <p:par>
+                    <p:cTn id="8" fill="hold">
+                      <p:stCondLst>
+                        <p:cond delay="indefinite"/>
+                      </p:stCondLst>
+                      <p:childTnLst>
+                        <p:par>
+                          <p:cTn id="9" fill="hold">
+                            <p:stCondLst>
+                              <p:cond delay="0"/>
+                            </p:stCondLst>
+                            <p:childTnLst>
+                              <p:par>
+                                <p:cTn id="10" presetID="10" presetClass="entr" presetSubtype="0" fill="hold" grpId="0" nodeType="clickEffect">
+                                  <p:stCondLst>
+                                    <p:cond delay="0"/>
+                                  </p:stCondLst>
+                                  <p:childTnLst>
+                                    <p:set>
+                                      <p:cBhvr>
+                                        <p:cTn id="11" dur="1" fill="hold">
+                                          <p:stCondLst>
+                                            <p:cond delay="0"/>
+                                          </p:stCondLst>
+                                        </p:cTn>
+                                        <p:tgtEl>
+                                          <p:spTgt spid="17">
+                                            <p:txEl>
+                                              <p:pRg st="1" end="1"/>
+                                            </p:txEl>
+                                          </p:spTgt>
+                                        </p:tgtEl>
+                                        <p:attrNameLst>
+                                          <p:attrName>style.visibility</p:attrName>
+                                        </p:attrNameLst>
+                                      </p:cBhvr>
+                                      <p:to>
+                                        <p:strVal val="visible"/>
+                                      </p:to>
+                                    </p:set>
+                                    <p:animEffect transition="in" filter="fade">
+                                      <p:cBhvr>
+                                        <p:cTn id="12" dur="500"/>
+                                        <p:tgtEl>
+                                          <p:spTgt spid="17">
+                                            <p:txEl>
+                                              <p:pRg st="1" end="1"/>
+                                            </p:txEl>
+                                          </p:spTgt>
+                                        </p:tgtEl>
+                                      </p:cBhvr>
+                                    </p:animEffect>
+                                  </p:childTnLst>
+                                </p:cTn>
+                              </p:par>
+                            </p:childTnLst>
+                          </p:cTn>
+                        </p:par>
+                      </p:childTnLst>
+                    </p:cTn>
+                  </p:par>
+                </p:childTnLst>
+              </p:cTn>
+              <p:prevCondLst>
+                <p:cond evt="onPrev" delay="0">
+                  <p:tgtEl>
+                    <p:sldTgt/>
+                  </p:tgtEl>
+                </p:cond>
+              </p:prevCondLst>
+              <p:nextCondLst>
+                <p:cond evt="onNext" delay="0">
+                  <p:tgtEl>
+                    <p:sldTgt/>
+                  </p:tgtEl>
+                </p:cond>
+              </p:nextCondLst>
+            </p:seq>
+          </p:childTnLst>
+        </p:cTn>
+      </p:par>
+    </p:tnLst>
+    <p:bldLst>
+      <p:bldP spid="17" grpId="0" uiExpand="1" build="p"/>
+    </p:bldLst>
+  </p:timing>
 </p:sld>
 </file>
 

</xml_diff>

<commit_message>
Fix typos and other minor stuff
</commit_message>
<xml_diff>
--- a/presentation.pptx
+++ b/presentation.pptx
@@ -9539,7 +9539,7 @@
             <a:fld id="{B61BEF0D-F0BB-DE4B-95CE-6DB70DBA9567}" type="datetimeFigureOut">
               <a:rPr lang="en-US" dirty="0"/>
               <a:pPr/>
-              <a:t>6/3/2021</a:t>
+              <a:t>6/6/2021</a:t>
             </a:fld>
             <a:endParaRPr lang="en-US"/>
           </a:p>
@@ -9832,7 +9832,7 @@
             <a:fld id="{B61BEF0D-F0BB-DE4B-95CE-6DB70DBA9567}" type="datetimeFigureOut">
               <a:rPr lang="en-US" dirty="0"/>
               <a:pPr/>
-              <a:t>6/3/2021</a:t>
+              <a:t>6/6/2021</a:t>
             </a:fld>
             <a:endParaRPr lang="en-US"/>
           </a:p>
@@ -10081,7 +10081,7 @@
             <a:fld id="{B61BEF0D-F0BB-DE4B-95CE-6DB70DBA9567}" type="datetimeFigureOut">
               <a:rPr lang="en-US" dirty="0"/>
               <a:pPr/>
-              <a:t>6/3/2021</a:t>
+              <a:t>6/6/2021</a:t>
             </a:fld>
             <a:endParaRPr lang="en-US"/>
           </a:p>
@@ -10622,7 +10622,7 @@
             <a:fld id="{B61BEF0D-F0BB-DE4B-95CE-6DB70DBA9567}" type="datetimeFigureOut">
               <a:rPr lang="en-US" dirty="0"/>
               <a:pPr/>
-              <a:t>6/3/2021</a:t>
+              <a:t>6/6/2021</a:t>
             </a:fld>
             <a:endParaRPr lang="en-US"/>
           </a:p>
@@ -10871,7 +10871,7 @@
             <a:fld id="{B61BEF0D-F0BB-DE4B-95CE-6DB70DBA9567}" type="datetimeFigureOut">
               <a:rPr lang="en-US" dirty="0"/>
               <a:pPr/>
-              <a:t>6/3/2021</a:t>
+              <a:t>6/6/2021</a:t>
             </a:fld>
             <a:endParaRPr lang="en-US"/>
           </a:p>
@@ -11404,7 +11404,7 @@
             <a:fld id="{B61BEF0D-F0BB-DE4B-95CE-6DB70DBA9567}" type="datetimeFigureOut">
               <a:rPr lang="en-US" dirty="0"/>
               <a:pPr/>
-              <a:t>6/3/2021</a:t>
+              <a:t>6/6/2021</a:t>
             </a:fld>
             <a:endParaRPr lang="en-US"/>
           </a:p>
@@ -11702,7 +11702,7 @@
             <a:fld id="{B61BEF0D-F0BB-DE4B-95CE-6DB70DBA9567}" type="datetimeFigureOut">
               <a:rPr lang="en-US" dirty="0"/>
               <a:pPr/>
-              <a:t>6/3/2021</a:t>
+              <a:t>6/6/2021</a:t>
             </a:fld>
             <a:endParaRPr lang="en-US"/>
           </a:p>
@@ -11876,7 +11876,7 @@
             <a:fld id="{B61BEF0D-F0BB-DE4B-95CE-6DB70DBA9567}" type="datetimeFigureOut">
               <a:rPr lang="en-US" dirty="0"/>
               <a:pPr/>
-              <a:t>6/3/2021</a:t>
+              <a:t>6/6/2021</a:t>
             </a:fld>
             <a:endParaRPr lang="en-US"/>
           </a:p>
@@ -12056,7 +12056,7 @@
             <a:fld id="{B61BEF0D-F0BB-DE4B-95CE-6DB70DBA9567}" type="datetimeFigureOut">
               <a:rPr lang="en-US" dirty="0"/>
               <a:pPr/>
-              <a:t>6/3/2021</a:t>
+              <a:t>6/6/2021</a:t>
             </a:fld>
             <a:endParaRPr lang="en-US"/>
           </a:p>
@@ -12226,7 +12226,7 @@
             <a:fld id="{B61BEF0D-F0BB-DE4B-95CE-6DB70DBA9567}" type="datetimeFigureOut">
               <a:rPr lang="en-US" dirty="0"/>
               <a:pPr/>
-              <a:t>6/3/2021</a:t>
+              <a:t>6/6/2021</a:t>
             </a:fld>
             <a:endParaRPr lang="en-US"/>
           </a:p>
@@ -12478,7 +12478,7 @@
             <a:fld id="{B61BEF0D-F0BB-DE4B-95CE-6DB70DBA9567}" type="datetimeFigureOut">
               <a:rPr lang="en-US" dirty="0"/>
               <a:pPr/>
-              <a:t>6/3/2021</a:t>
+              <a:t>6/6/2021</a:t>
             </a:fld>
             <a:endParaRPr lang="en-US"/>
           </a:p>
@@ -12774,7 +12774,7 @@
             <a:fld id="{B61BEF0D-F0BB-DE4B-95CE-6DB70DBA9567}" type="datetimeFigureOut">
               <a:rPr lang="en-US" dirty="0"/>
               <a:pPr/>
-              <a:t>6/3/2021</a:t>
+              <a:t>6/6/2021</a:t>
             </a:fld>
             <a:endParaRPr lang="en-US"/>
           </a:p>
@@ -13215,7 +13215,7 @@
             <a:fld id="{B61BEF0D-F0BB-DE4B-95CE-6DB70DBA9567}" type="datetimeFigureOut">
               <a:rPr lang="en-US" dirty="0"/>
               <a:pPr/>
-              <a:t>6/3/2021</a:t>
+              <a:t>6/6/2021</a:t>
             </a:fld>
             <a:endParaRPr lang="en-US"/>
           </a:p>
@@ -13334,7 +13334,7 @@
             <a:fld id="{B61BEF0D-F0BB-DE4B-95CE-6DB70DBA9567}" type="datetimeFigureOut">
               <a:rPr lang="en-US" dirty="0"/>
               <a:pPr/>
-              <a:t>6/3/2021</a:t>
+              <a:t>6/6/2021</a:t>
             </a:fld>
             <a:endParaRPr lang="en-US"/>
           </a:p>
@@ -13431,7 +13431,7 @@
             <a:fld id="{B61BEF0D-F0BB-DE4B-95CE-6DB70DBA9567}" type="datetimeFigureOut">
               <a:rPr lang="en-US" dirty="0"/>
               <a:pPr/>
-              <a:t>6/3/2021</a:t>
+              <a:t>6/6/2021</a:t>
             </a:fld>
             <a:endParaRPr lang="en-US"/>
           </a:p>
@@ -13714,7 +13714,7 @@
             <a:fld id="{B61BEF0D-F0BB-DE4B-95CE-6DB70DBA9567}" type="datetimeFigureOut">
               <a:rPr lang="en-US" dirty="0"/>
               <a:pPr/>
-              <a:t>6/3/2021</a:t>
+              <a:t>6/6/2021</a:t>
             </a:fld>
             <a:endParaRPr lang="en-US"/>
           </a:p>
@@ -14002,7 +14002,7 @@
             <a:fld id="{B61BEF0D-F0BB-DE4B-95CE-6DB70DBA9567}" type="datetimeFigureOut">
               <a:rPr lang="en-US" dirty="0"/>
               <a:pPr/>
-              <a:t>6/3/2021</a:t>
+              <a:t>6/6/2021</a:t>
             </a:fld>
             <a:endParaRPr lang="en-US"/>
           </a:p>
@@ -14532,7 +14532,7 @@
             <a:fld id="{B61BEF0D-F0BB-DE4B-95CE-6DB70DBA9567}" type="datetimeFigureOut">
               <a:rPr lang="en-US" dirty="0"/>
               <a:pPr/>
-              <a:t>6/3/2021</a:t>
+              <a:t>6/6/2021</a:t>
             </a:fld>
             <a:endParaRPr lang="en-US"/>
           </a:p>
@@ -22074,7 +22074,7 @@
         <p:spPr>
           <a:xfrm>
             <a:off x="523876" y="1391444"/>
-            <a:ext cx="8196259" cy="4275138"/>
+            <a:ext cx="8196259" cy="4685506"/>
           </a:xfrm>
           <a:prstGeom prst="rect">
             <a:avLst/>
@@ -22110,7 +22110,7 @@
             </a:pPr>
             <a:r>
               <a:rPr lang="en-US" sz="2800" dirty="0"/>
-              <a:t>Normalized Encoding time, as predicted, does get lower with faster presets</a:t>
+              <a:t>Normalized encoding time, as predicted, does get lower with faster presets</a:t>
             </a:r>
           </a:p>
           <a:p>
@@ -22276,7 +22276,7 @@
             </a:r>
             <a:r>
               <a:rPr lang="it-IT" sz="4000" dirty="0"/>
-              <a:t> </a:t>
+              <a:t> one </a:t>
             </a:r>
             <a:r>
               <a:rPr lang="it-IT" sz="4000" dirty="0" err="1"/>
@@ -22284,7 +22284,15 @@
             </a:r>
             <a:r>
               <a:rPr lang="it-IT" sz="4000" dirty="0"/>
-              <a:t> THE FAST?</a:t>
+              <a:t> the </a:t>
+            </a:r>
+            <a:r>
+              <a:rPr lang="it-IT" sz="4000" dirty="0" err="1"/>
+              <a:t>fastest</a:t>
+            </a:r>
+            <a:r>
+              <a:rPr lang="it-IT" sz="4000" dirty="0"/>
+              <a:t>?</a:t>
             </a:r>
           </a:p>
         </p:txBody>
@@ -23189,8 +23197,20 @@
               <a:buChar char="•"/>
             </a:pPr>
             <a:r>
+              <a:rPr lang="en-US" sz="3000" i="1" dirty="0"/>
+              <a:t>Faster</a:t>
+            </a:r>
+            <a:r>
               <a:rPr lang="en-US" sz="3000" dirty="0"/>
-              <a:t>Faster and very fast presets are </a:t>
+              <a:t> and </a:t>
+            </a:r>
+            <a:r>
+              <a:rPr lang="en-US" sz="3000" i="1" dirty="0"/>
+              <a:t>very fast </a:t>
+            </a:r>
+            <a:r>
+              <a:rPr lang="en-US" sz="3000" dirty="0"/>
+              <a:t>presets are </a:t>
             </a:r>
             <a:r>
               <a:rPr lang="en-US" sz="3000" b="1" dirty="0">
@@ -23227,7 +23247,7 @@
             </a:pPr>
             <a:r>
               <a:rPr lang="en-US" sz="3200" dirty="0"/>
-              <a:t>HW encoding is capable to obtain a good average result with some limit cases                (San Andreas)</a:t>
+              <a:t>HW encoding is capable of obtaining good average result with some limit cases                (San Andreas)</a:t>
             </a:r>
           </a:p>
         </p:txBody>
@@ -23247,7 +23267,7 @@
         <p:spPr>
           <a:xfrm>
             <a:off x="651669" y="392588"/>
-            <a:ext cx="8259760" cy="646331"/>
+            <a:ext cx="8578056" cy="615553"/>
           </a:xfrm>
           <a:prstGeom prst="rect">
             <a:avLst/>
@@ -23262,43 +23282,35 @@
           <a:p>
             <a:pPr algn="ctr"/>
             <a:r>
-              <a:rPr lang="it-IT" sz="3600" dirty="0" err="1"/>
+              <a:rPr lang="it-IT" sz="3400" dirty="0" err="1"/>
               <a:t>Which</a:t>
             </a:r>
             <a:r>
-              <a:rPr lang="it-IT" sz="3600" dirty="0"/>
+              <a:rPr lang="it-IT" sz="3400" dirty="0"/>
+              <a:t> one </a:t>
+            </a:r>
+            <a:r>
+              <a:rPr lang="it-IT" sz="3400" dirty="0" err="1"/>
+              <a:t>is</a:t>
+            </a:r>
+            <a:r>
+              <a:rPr lang="it-IT" sz="3400" dirty="0"/>
+              <a:t> the </a:t>
+            </a:r>
+            <a:r>
+              <a:rPr lang="it-IT" sz="3400" dirty="0" err="1"/>
+              <a:t>most</a:t>
+            </a:r>
+            <a:r>
+              <a:rPr lang="it-IT" sz="3400" dirty="0"/>
               <a:t> </a:t>
             </a:r>
             <a:r>
-              <a:rPr lang="it-IT" sz="3600" dirty="0" err="1"/>
-              <a:t>is</a:t>
+              <a:rPr lang="it-IT" sz="3400" dirty="0" err="1"/>
+              <a:t>compression-efficient</a:t>
             </a:r>
             <a:r>
-              <a:rPr lang="it-IT" sz="3600" dirty="0"/>
-              <a:t> </a:t>
-            </a:r>
-            <a:r>
-              <a:rPr lang="it-IT" sz="3600" dirty="0" err="1"/>
-              <a:t>most</a:t>
-            </a:r>
-            <a:r>
-              <a:rPr lang="it-IT" sz="3600" dirty="0"/>
-              <a:t> </a:t>
-            </a:r>
-            <a:r>
-              <a:rPr lang="it-IT" sz="3600" dirty="0" err="1"/>
-              <a:t>compression</a:t>
-            </a:r>
-            <a:r>
-              <a:rPr lang="it-IT" sz="3600" dirty="0"/>
-              <a:t> </a:t>
-            </a:r>
-            <a:r>
-              <a:rPr lang="it-IT" sz="3600" dirty="0" err="1"/>
-              <a:t>effective</a:t>
-            </a:r>
-            <a:r>
-              <a:rPr lang="it-IT" sz="3600" dirty="0"/>
+              <a:rPr lang="it-IT" sz="3400" dirty="0"/>
               <a:t>?</a:t>
             </a:r>
           </a:p>
@@ -23335,7 +23347,7 @@
         </p:blipFill>
         <p:spPr>
           <a:xfrm>
-            <a:off x="8636001" y="247535"/>
+            <a:off x="9104312" y="106628"/>
             <a:ext cx="1219195" cy="1219195"/>
           </a:xfrm>
           <a:prstGeom prst="rect">
@@ -24179,7 +24191,7 @@
             </a:pPr>
             <a:r>
               <a:rPr lang="en-US" sz="3200" dirty="0"/>
-              <a:t>Encoding is heavy load,  so it leads hardware to per form at 100% of  it’s capabilities;</a:t>
+              <a:t>Encoding is a heavy task,  so it leads hardware to per form at 100% of  its capabilities</a:t>
             </a:r>
           </a:p>
           <a:p>
@@ -24204,7 +24216,7 @@
             </a:pPr>
             <a:r>
               <a:rPr lang="en-US" sz="3200" dirty="0"/>
-              <a:t>Components where at their peak of power consumption for the entire time of the  test</a:t>
+              <a:t>Components were at their peak of power consumption for the entire time of the  test</a:t>
             </a:r>
           </a:p>
           <a:p>
@@ -24229,7 +24241,7 @@
             </a:pPr>
             <a:r>
               <a:rPr lang="en-US" sz="3200" dirty="0"/>
-              <a:t>Short time -&gt; less energy drowned</a:t>
+              <a:t>Shorter time -&gt; less energy drawn</a:t>
             </a:r>
           </a:p>
           <a:p>
@@ -24294,7 +24306,7 @@
             <a:pPr algn="ctr"/>
             <a:r>
               <a:rPr lang="it-IT" sz="4400" dirty="0" err="1"/>
-              <a:t>Wath</a:t>
+              <a:t>What</a:t>
             </a:r>
             <a:r>
               <a:rPr lang="it-IT" sz="4400" dirty="0"/>
@@ -24310,7 +24322,7 @@
             </a:r>
             <a:r>
               <a:rPr lang="it-IT" sz="4400" dirty="0" err="1"/>
-              <a:t>efficency</a:t>
+              <a:t>efficiency</a:t>
             </a:r>
             <a:r>
               <a:rPr lang="it-IT" sz="4400" dirty="0"/>
@@ -25927,8 +25939,20 @@
               <a:buChar char="•"/>
             </a:pPr>
             <a:r>
+              <a:rPr lang="en-US" sz="2800" i="1" dirty="0"/>
+              <a:t>Faster</a:t>
+            </a:r>
+            <a:r>
               <a:rPr lang="en-US" sz="2800" dirty="0"/>
-              <a:t>Faster and very fast presets seems to perform better compression in lower time than slower presets</a:t>
+              <a:t> and </a:t>
+            </a:r>
+            <a:r>
+              <a:rPr lang="en-US" sz="2800" i="1" dirty="0"/>
+              <a:t>very fast </a:t>
+            </a:r>
+            <a:r>
+              <a:rPr lang="en-US" sz="2800" dirty="0"/>
+              <a:t>presets seems to perform better compression in lower time than slower presets</a:t>
             </a:r>
           </a:p>
           <a:p>
@@ -25953,7 +25977,7 @@
             </a:pPr>
             <a:r>
               <a:rPr lang="en-US" sz="2800" dirty="0"/>
-              <a:t>This behavior spot an inaccurate software implementation of the standard</a:t>
+              <a:t>This behavior shows an inaccurate software implementation of the standard</a:t>
             </a:r>
           </a:p>
         </p:txBody>
@@ -26922,7 +26946,7 @@
             </a:pPr>
             <a:r>
               <a:rPr lang="en-US" sz="3200" dirty="0"/>
-              <a:t>If encoding speed or energy efficiency is the priority, Hardware implementation is to be preferred</a:t>
+              <a:t>If encoding speed or energy efficiency is the priority, hardware implementation is to be preferred</a:t>
             </a:r>
           </a:p>
         </p:txBody>

</xml_diff>

<commit_message>
Minor fixes to presentation
</commit_message>
<xml_diff>
--- a/presentation.pptx
+++ b/presentation.pptx
@@ -9539,7 +9539,7 @@
             <a:fld id="{B61BEF0D-F0BB-DE4B-95CE-6DB70DBA9567}" type="datetimeFigureOut">
               <a:rPr lang="en-US" dirty="0"/>
               <a:pPr/>
-              <a:t>6/8/2021</a:t>
+              <a:t>6/30/2021</a:t>
             </a:fld>
             <a:endParaRPr lang="en-US"/>
           </a:p>
@@ -9832,7 +9832,7 @@
             <a:fld id="{B61BEF0D-F0BB-DE4B-95CE-6DB70DBA9567}" type="datetimeFigureOut">
               <a:rPr lang="en-US" dirty="0"/>
               <a:pPr/>
-              <a:t>6/8/2021</a:t>
+              <a:t>6/30/2021</a:t>
             </a:fld>
             <a:endParaRPr lang="en-US"/>
           </a:p>
@@ -10081,7 +10081,7 @@
             <a:fld id="{B61BEF0D-F0BB-DE4B-95CE-6DB70DBA9567}" type="datetimeFigureOut">
               <a:rPr lang="en-US" dirty="0"/>
               <a:pPr/>
-              <a:t>6/8/2021</a:t>
+              <a:t>6/30/2021</a:t>
             </a:fld>
             <a:endParaRPr lang="en-US"/>
           </a:p>
@@ -10622,7 +10622,7 @@
             <a:fld id="{B61BEF0D-F0BB-DE4B-95CE-6DB70DBA9567}" type="datetimeFigureOut">
               <a:rPr lang="en-US" dirty="0"/>
               <a:pPr/>
-              <a:t>6/8/2021</a:t>
+              <a:t>6/30/2021</a:t>
             </a:fld>
             <a:endParaRPr lang="en-US"/>
           </a:p>
@@ -10871,7 +10871,7 @@
             <a:fld id="{B61BEF0D-F0BB-DE4B-95CE-6DB70DBA9567}" type="datetimeFigureOut">
               <a:rPr lang="en-US" dirty="0"/>
               <a:pPr/>
-              <a:t>6/8/2021</a:t>
+              <a:t>6/30/2021</a:t>
             </a:fld>
             <a:endParaRPr lang="en-US"/>
           </a:p>
@@ -11404,7 +11404,7 @@
             <a:fld id="{B61BEF0D-F0BB-DE4B-95CE-6DB70DBA9567}" type="datetimeFigureOut">
               <a:rPr lang="en-US" dirty="0"/>
               <a:pPr/>
-              <a:t>6/8/2021</a:t>
+              <a:t>6/30/2021</a:t>
             </a:fld>
             <a:endParaRPr lang="en-US"/>
           </a:p>
@@ -11702,7 +11702,7 @@
             <a:fld id="{B61BEF0D-F0BB-DE4B-95CE-6DB70DBA9567}" type="datetimeFigureOut">
               <a:rPr lang="en-US" dirty="0"/>
               <a:pPr/>
-              <a:t>6/8/2021</a:t>
+              <a:t>6/30/2021</a:t>
             </a:fld>
             <a:endParaRPr lang="en-US"/>
           </a:p>
@@ -11876,7 +11876,7 @@
             <a:fld id="{B61BEF0D-F0BB-DE4B-95CE-6DB70DBA9567}" type="datetimeFigureOut">
               <a:rPr lang="en-US" dirty="0"/>
               <a:pPr/>
-              <a:t>6/8/2021</a:t>
+              <a:t>6/30/2021</a:t>
             </a:fld>
             <a:endParaRPr lang="en-US"/>
           </a:p>
@@ -12056,7 +12056,7 @@
             <a:fld id="{B61BEF0D-F0BB-DE4B-95CE-6DB70DBA9567}" type="datetimeFigureOut">
               <a:rPr lang="en-US" dirty="0"/>
               <a:pPr/>
-              <a:t>6/8/2021</a:t>
+              <a:t>6/30/2021</a:t>
             </a:fld>
             <a:endParaRPr lang="en-US"/>
           </a:p>
@@ -12226,7 +12226,7 @@
             <a:fld id="{B61BEF0D-F0BB-DE4B-95CE-6DB70DBA9567}" type="datetimeFigureOut">
               <a:rPr lang="en-US" dirty="0"/>
               <a:pPr/>
-              <a:t>6/8/2021</a:t>
+              <a:t>6/30/2021</a:t>
             </a:fld>
             <a:endParaRPr lang="en-US"/>
           </a:p>
@@ -12478,7 +12478,7 @@
             <a:fld id="{B61BEF0D-F0BB-DE4B-95CE-6DB70DBA9567}" type="datetimeFigureOut">
               <a:rPr lang="en-US" dirty="0"/>
               <a:pPr/>
-              <a:t>6/8/2021</a:t>
+              <a:t>6/30/2021</a:t>
             </a:fld>
             <a:endParaRPr lang="en-US"/>
           </a:p>
@@ -12774,7 +12774,7 @@
             <a:fld id="{B61BEF0D-F0BB-DE4B-95CE-6DB70DBA9567}" type="datetimeFigureOut">
               <a:rPr lang="en-US" dirty="0"/>
               <a:pPr/>
-              <a:t>6/8/2021</a:t>
+              <a:t>6/30/2021</a:t>
             </a:fld>
             <a:endParaRPr lang="en-US"/>
           </a:p>
@@ -13215,7 +13215,7 @@
             <a:fld id="{B61BEF0D-F0BB-DE4B-95CE-6DB70DBA9567}" type="datetimeFigureOut">
               <a:rPr lang="en-US" dirty="0"/>
               <a:pPr/>
-              <a:t>6/8/2021</a:t>
+              <a:t>6/30/2021</a:t>
             </a:fld>
             <a:endParaRPr lang="en-US"/>
           </a:p>
@@ -13334,7 +13334,7 @@
             <a:fld id="{B61BEF0D-F0BB-DE4B-95CE-6DB70DBA9567}" type="datetimeFigureOut">
               <a:rPr lang="en-US" dirty="0"/>
               <a:pPr/>
-              <a:t>6/8/2021</a:t>
+              <a:t>6/30/2021</a:t>
             </a:fld>
             <a:endParaRPr lang="en-US"/>
           </a:p>
@@ -13431,7 +13431,7 @@
             <a:fld id="{B61BEF0D-F0BB-DE4B-95CE-6DB70DBA9567}" type="datetimeFigureOut">
               <a:rPr lang="en-US" dirty="0"/>
               <a:pPr/>
-              <a:t>6/8/2021</a:t>
+              <a:t>6/30/2021</a:t>
             </a:fld>
             <a:endParaRPr lang="en-US"/>
           </a:p>
@@ -13714,7 +13714,7 @@
             <a:fld id="{B61BEF0D-F0BB-DE4B-95CE-6DB70DBA9567}" type="datetimeFigureOut">
               <a:rPr lang="en-US" dirty="0"/>
               <a:pPr/>
-              <a:t>6/8/2021</a:t>
+              <a:t>6/30/2021</a:t>
             </a:fld>
             <a:endParaRPr lang="en-US"/>
           </a:p>
@@ -14002,7 +14002,7 @@
             <a:fld id="{B61BEF0D-F0BB-DE4B-95CE-6DB70DBA9567}" type="datetimeFigureOut">
               <a:rPr lang="en-US" dirty="0"/>
               <a:pPr/>
-              <a:t>6/8/2021</a:t>
+              <a:t>6/30/2021</a:t>
             </a:fld>
             <a:endParaRPr lang="en-US"/>
           </a:p>
@@ -14532,7 +14532,7 @@
             <a:fld id="{B61BEF0D-F0BB-DE4B-95CE-6DB70DBA9567}" type="datetimeFigureOut">
               <a:rPr lang="en-US" dirty="0"/>
               <a:pPr/>
-              <a:t>6/8/2021</a:t>
+              <a:t>6/30/2021</a:t>
             </a:fld>
             <a:endParaRPr lang="en-US"/>
           </a:p>
@@ -18600,6 +18600,59 @@
                       </p:childTnLst>
                     </p:cTn>
                   </p:par>
+                  <p:par>
+                    <p:cTn id="8" fill="hold">
+                      <p:stCondLst>
+                        <p:cond delay="indefinite"/>
+                      </p:stCondLst>
+                      <p:childTnLst>
+                        <p:par>
+                          <p:cTn id="9" fill="hold">
+                            <p:stCondLst>
+                              <p:cond delay="0"/>
+                            </p:stCondLst>
+                            <p:childTnLst>
+                              <p:par>
+                                <p:cTn id="10" presetID="10" presetClass="entr" presetSubtype="0" fill="hold" grpId="0" nodeType="clickEffect">
+                                  <p:stCondLst>
+                                    <p:cond delay="0"/>
+                                  </p:stCondLst>
+                                  <p:childTnLst>
+                                    <p:set>
+                                      <p:cBhvr>
+                                        <p:cTn id="11" dur="1" fill="hold">
+                                          <p:stCondLst>
+                                            <p:cond delay="0"/>
+                                          </p:stCondLst>
+                                        </p:cTn>
+                                        <p:tgtEl>
+                                          <p:spTgt spid="9"/>
+                                        </p:tgtEl>
+                                        <p:attrNameLst>
+                                          <p:attrName>style.visibility</p:attrName>
+                                        </p:attrNameLst>
+                                      </p:cBhvr>
+                                      <p:to>
+                                        <p:strVal val="visible"/>
+                                      </p:to>
+                                    </p:set>
+                                    <p:animEffect transition="in" filter="fade">
+                                      <p:cBhvr>
+                                        <p:cTn id="12" dur="500"/>
+                                        <p:tgtEl>
+                                          <p:spTgt spid="9"/>
+                                        </p:tgtEl>
+                                      </p:cBhvr>
+                                    </p:animEffect>
+                                  </p:childTnLst>
+                                </p:cTn>
+                              </p:par>
+                            </p:childTnLst>
+                          </p:cTn>
+                        </p:par>
+                      </p:childTnLst>
+                    </p:cTn>
+                  </p:par>
                 </p:childTnLst>
               </p:cTn>
               <p:prevCondLst>
@@ -18621,6 +18674,9 @@
         </p:cTn>
       </p:par>
     </p:tnLst>
+    <p:bldLst>
+      <p:bldP spid="9" grpId="0" animBg="1"/>
+    </p:bldLst>
   </p:timing>
 </p:sld>
 </file>
@@ -24463,7 +24519,7 @@
             </a:pPr>
             <a:r>
               <a:rPr lang="en-US" sz="3200" dirty="0"/>
-              <a:t>Components were at their peak of power consumption for the entire time of the  test</a:t>
+              <a:t>Components were at their peak of energy consumption for the entire time of the  test</a:t>
             </a:r>
           </a:p>
           <a:p>

</xml_diff>